<commit_message>
feat: first slide done
</commit_message>
<xml_diff>
--- a/templates/radiografia_bienestar_duoc_2025.pptx
+++ b/templates/radiografia_bienestar_duoc_2025.pptx
@@ -3688,8 +3688,8 @@
         </p:nvSpPr>
         <p:spPr>
           <a:xfrm>
-            <a:off x="6263148" y="1693294"/>
-            <a:ext cx="5250425" cy="432620"/>
+            <a:off x="5614219" y="1693294"/>
+            <a:ext cx="5899354" cy="432620"/>
           </a:xfrm>
           <a:prstGeom prst="rect">
             <a:avLst/>
@@ -3741,7 +3741,7 @@
         <p:spPr>
           <a:xfrm>
             <a:off x="816076" y="1437967"/>
-            <a:ext cx="5112775" cy="4896776"/>
+            <a:ext cx="5142273" cy="4896776"/>
           </a:xfrm>
           <a:prstGeom prst="rect">
             <a:avLst/>
@@ -3770,13 +3770,15 @@
               </a:ext>
             </a:extLst>
           </p:cNvPr>
-          <p:cNvSpPr txBox="1"/>
+          <p:cNvSpPr txBox="1">
+            <a:spLocks/>
+          </p:cNvSpPr>
           <p:nvPr/>
         </p:nvSpPr>
         <p:spPr>
           <a:xfrm>
-            <a:off x="6263148" y="2226384"/>
-            <a:ext cx="5250425" cy="4108359"/>
+            <a:off x="6759973" y="2227923"/>
+            <a:ext cx="4107600" cy="4108359"/>
           </a:xfrm>
           <a:prstGeom prst="rect">
             <a:avLst/>
@@ -4224,7 +4226,7 @@
         </p:nvSpPr>
         <p:spPr>
           <a:xfrm>
-            <a:off x="816076" y="1437967"/>
+            <a:off x="1347019" y="1832175"/>
             <a:ext cx="5112775" cy="4896776"/>
           </a:xfrm>
           <a:prstGeom prst="rect">

</xml_diff>

<commit_message>
feat: second slide done
</commit_message>
<xml_diff>
--- a/templates/radiografia_bienestar_duoc_2025.pptx
+++ b/templates/radiografia_bienestar_duoc_2025.pptx
@@ -4174,8 +4174,8 @@
         </p:nvSpPr>
         <p:spPr>
           <a:xfrm>
-            <a:off x="6263148" y="1693294"/>
-            <a:ext cx="5250425" cy="432620"/>
+            <a:off x="5781368" y="1693294"/>
+            <a:ext cx="5732205" cy="432620"/>
           </a:xfrm>
           <a:prstGeom prst="rect">
             <a:avLst/>
@@ -4261,8 +4261,8 @@
         </p:nvSpPr>
         <p:spPr>
           <a:xfrm>
-            <a:off x="6263148" y="2226384"/>
-            <a:ext cx="5250425" cy="4108359"/>
+            <a:off x="5781367" y="2263375"/>
+            <a:ext cx="4013287" cy="3663139"/>
           </a:xfrm>
           <a:prstGeom prst="rect">
             <a:avLst/>
@@ -4284,6 +4284,759 @@
               <a:t>_PLACEHOLDER_2</a:t>
             </a:r>
             <a:endParaRPr lang="es-CL" dirty="0"/>
+          </a:p>
+        </p:txBody>
+      </p:sp>
+      <p:sp>
+        <p:nvSpPr>
+          <p:cNvPr id="2" name="Rectángulo 1">
+            <a:extLst>
+              <a:ext uri="{FF2B5EF4-FFF2-40B4-BE49-F238E27FC236}">
+                <a16:creationId xmlns:a16="http://schemas.microsoft.com/office/drawing/2014/main" id="{8D0006BD-DFD7-7EBA-FCFF-ABC8FDAF4F61}"/>
+              </a:ext>
+            </a:extLst>
+          </p:cNvPr>
+          <p:cNvSpPr/>
+          <p:nvPr/>
+        </p:nvSpPr>
+        <p:spPr>
+          <a:xfrm>
+            <a:off x="9966960" y="2605884"/>
+            <a:ext cx="121920" cy="127819"/>
+          </a:xfrm>
+          <a:prstGeom prst="rect">
+            <a:avLst/>
+          </a:prstGeom>
+          <a:solidFill>
+            <a:schemeClr val="tx1"/>
+          </a:solidFill>
+        </p:spPr>
+        <p:style>
+          <a:lnRef idx="2">
+            <a:schemeClr val="accent1">
+              <a:shade val="15000"/>
+            </a:schemeClr>
+          </a:lnRef>
+          <a:fillRef idx="1">
+            <a:schemeClr val="accent1"/>
+          </a:fillRef>
+          <a:effectRef idx="0">
+            <a:schemeClr val="accent1"/>
+          </a:effectRef>
+          <a:fontRef idx="minor">
+            <a:schemeClr val="lt1"/>
+          </a:fontRef>
+        </p:style>
+        <p:txBody>
+          <a:bodyPr rtlCol="0" anchor="ctr"/>
+          <a:lstStyle/>
+          <a:p>
+            <a:pPr algn="ctr"/>
+            <a:endParaRPr lang="es-CL"/>
+          </a:p>
+        </p:txBody>
+      </p:sp>
+      <p:sp>
+        <p:nvSpPr>
+          <p:cNvPr id="3" name="Rectángulo 2">
+            <a:extLst>
+              <a:ext uri="{FF2B5EF4-FFF2-40B4-BE49-F238E27FC236}">
+                <a16:creationId xmlns:a16="http://schemas.microsoft.com/office/drawing/2014/main" id="{3ED2C11C-7F43-EC0B-3741-CE3524160574}"/>
+              </a:ext>
+            </a:extLst>
+          </p:cNvPr>
+          <p:cNvSpPr/>
+          <p:nvPr/>
+        </p:nvSpPr>
+        <p:spPr>
+          <a:xfrm>
+            <a:off x="9966960" y="2908716"/>
+            <a:ext cx="121920" cy="127819"/>
+          </a:xfrm>
+          <a:prstGeom prst="rect">
+            <a:avLst/>
+          </a:prstGeom>
+          <a:solidFill>
+            <a:srgbClr val="F78DA7"/>
+          </a:solidFill>
+        </p:spPr>
+        <p:style>
+          <a:lnRef idx="2">
+            <a:schemeClr val="accent1">
+              <a:shade val="15000"/>
+            </a:schemeClr>
+          </a:lnRef>
+          <a:fillRef idx="1">
+            <a:schemeClr val="accent1"/>
+          </a:fillRef>
+          <a:effectRef idx="0">
+            <a:schemeClr val="accent1"/>
+          </a:effectRef>
+          <a:fontRef idx="minor">
+            <a:schemeClr val="lt1"/>
+          </a:fontRef>
+        </p:style>
+        <p:txBody>
+          <a:bodyPr rtlCol="0" anchor="ctr"/>
+          <a:lstStyle/>
+          <a:p>
+            <a:pPr algn="ctr"/>
+            <a:endParaRPr lang="es-CL"/>
+          </a:p>
+        </p:txBody>
+      </p:sp>
+      <p:sp>
+        <p:nvSpPr>
+          <p:cNvPr id="4" name="Rectángulo 3">
+            <a:extLst>
+              <a:ext uri="{FF2B5EF4-FFF2-40B4-BE49-F238E27FC236}">
+                <a16:creationId xmlns:a16="http://schemas.microsoft.com/office/drawing/2014/main" id="{8E363F21-5B21-025F-581B-D03235BFE9AD}"/>
+              </a:ext>
+            </a:extLst>
+          </p:cNvPr>
+          <p:cNvSpPr/>
+          <p:nvPr/>
+        </p:nvSpPr>
+        <p:spPr>
+          <a:xfrm>
+            <a:off x="9966960" y="3213674"/>
+            <a:ext cx="121920" cy="127819"/>
+          </a:xfrm>
+          <a:prstGeom prst="rect">
+            <a:avLst/>
+          </a:prstGeom>
+          <a:solidFill>
+            <a:srgbClr val="CF2E2E"/>
+          </a:solidFill>
+        </p:spPr>
+        <p:style>
+          <a:lnRef idx="2">
+            <a:schemeClr val="accent1">
+              <a:shade val="15000"/>
+            </a:schemeClr>
+          </a:lnRef>
+          <a:fillRef idx="1">
+            <a:schemeClr val="accent1"/>
+          </a:fillRef>
+          <a:effectRef idx="0">
+            <a:schemeClr val="accent1"/>
+          </a:effectRef>
+          <a:fontRef idx="minor">
+            <a:schemeClr val="lt1"/>
+          </a:fontRef>
+        </p:style>
+        <p:txBody>
+          <a:bodyPr rtlCol="0" anchor="ctr"/>
+          <a:lstStyle/>
+          <a:p>
+            <a:pPr algn="ctr"/>
+            <a:endParaRPr lang="es-CL"/>
+          </a:p>
+        </p:txBody>
+      </p:sp>
+      <p:sp>
+        <p:nvSpPr>
+          <p:cNvPr id="9" name="Rectángulo 8">
+            <a:extLst>
+              <a:ext uri="{FF2B5EF4-FFF2-40B4-BE49-F238E27FC236}">
+                <a16:creationId xmlns:a16="http://schemas.microsoft.com/office/drawing/2014/main" id="{BF421BF5-7AFB-AB2F-7738-A1ED9418A33B}"/>
+              </a:ext>
+            </a:extLst>
+          </p:cNvPr>
+          <p:cNvSpPr/>
+          <p:nvPr/>
+        </p:nvSpPr>
+        <p:spPr>
+          <a:xfrm>
+            <a:off x="9966960" y="3516506"/>
+            <a:ext cx="121920" cy="127819"/>
+          </a:xfrm>
+          <a:prstGeom prst="rect">
+            <a:avLst/>
+          </a:prstGeom>
+          <a:solidFill>
+            <a:srgbClr val="FF6900"/>
+          </a:solidFill>
+        </p:spPr>
+        <p:style>
+          <a:lnRef idx="2">
+            <a:schemeClr val="accent1">
+              <a:shade val="15000"/>
+            </a:schemeClr>
+          </a:lnRef>
+          <a:fillRef idx="1">
+            <a:schemeClr val="accent1"/>
+          </a:fillRef>
+          <a:effectRef idx="0">
+            <a:schemeClr val="accent1"/>
+          </a:effectRef>
+          <a:fontRef idx="minor">
+            <a:schemeClr val="lt1"/>
+          </a:fontRef>
+        </p:style>
+        <p:txBody>
+          <a:bodyPr rtlCol="0" anchor="ctr"/>
+          <a:lstStyle/>
+          <a:p>
+            <a:pPr algn="ctr"/>
+            <a:endParaRPr lang="es-CL" dirty="0"/>
+          </a:p>
+        </p:txBody>
+      </p:sp>
+      <p:sp>
+        <p:nvSpPr>
+          <p:cNvPr id="11" name="Rectángulo 10">
+            <a:extLst>
+              <a:ext uri="{FF2B5EF4-FFF2-40B4-BE49-F238E27FC236}">
+                <a16:creationId xmlns:a16="http://schemas.microsoft.com/office/drawing/2014/main" id="{8405F20B-9ED5-0103-62E2-43E5CBF4640E}"/>
+              </a:ext>
+            </a:extLst>
+          </p:cNvPr>
+          <p:cNvSpPr/>
+          <p:nvPr/>
+        </p:nvSpPr>
+        <p:spPr>
+          <a:xfrm>
+            <a:off x="9966960" y="3819338"/>
+            <a:ext cx="121920" cy="127819"/>
+          </a:xfrm>
+          <a:prstGeom prst="rect">
+            <a:avLst/>
+          </a:prstGeom>
+          <a:solidFill>
+            <a:srgbClr val="FCB900"/>
+          </a:solidFill>
+        </p:spPr>
+        <p:style>
+          <a:lnRef idx="2">
+            <a:schemeClr val="accent1">
+              <a:shade val="15000"/>
+            </a:schemeClr>
+          </a:lnRef>
+          <a:fillRef idx="1">
+            <a:schemeClr val="accent1"/>
+          </a:fillRef>
+          <a:effectRef idx="0">
+            <a:schemeClr val="accent1"/>
+          </a:effectRef>
+          <a:fontRef idx="minor">
+            <a:schemeClr val="lt1"/>
+          </a:fontRef>
+        </p:style>
+        <p:txBody>
+          <a:bodyPr rtlCol="0" anchor="ctr"/>
+          <a:lstStyle/>
+          <a:p>
+            <a:pPr algn="ctr"/>
+            <a:endParaRPr lang="es-CL" dirty="0"/>
+          </a:p>
+        </p:txBody>
+      </p:sp>
+      <p:sp>
+        <p:nvSpPr>
+          <p:cNvPr id="12" name="Rectángulo 11">
+            <a:extLst>
+              <a:ext uri="{FF2B5EF4-FFF2-40B4-BE49-F238E27FC236}">
+                <a16:creationId xmlns:a16="http://schemas.microsoft.com/office/drawing/2014/main" id="{3E1C6FE4-B727-26EC-2DC1-36AC8ADF6880}"/>
+              </a:ext>
+            </a:extLst>
+          </p:cNvPr>
+          <p:cNvSpPr/>
+          <p:nvPr/>
+        </p:nvSpPr>
+        <p:spPr>
+          <a:xfrm>
+            <a:off x="9966960" y="4122170"/>
+            <a:ext cx="121920" cy="127819"/>
+          </a:xfrm>
+          <a:prstGeom prst="rect">
+            <a:avLst/>
+          </a:prstGeom>
+          <a:solidFill>
+            <a:srgbClr val="7BDCB5"/>
+          </a:solidFill>
+        </p:spPr>
+        <p:style>
+          <a:lnRef idx="2">
+            <a:schemeClr val="accent1">
+              <a:shade val="15000"/>
+            </a:schemeClr>
+          </a:lnRef>
+          <a:fillRef idx="1">
+            <a:schemeClr val="accent1"/>
+          </a:fillRef>
+          <a:effectRef idx="0">
+            <a:schemeClr val="accent1"/>
+          </a:effectRef>
+          <a:fontRef idx="minor">
+            <a:schemeClr val="lt1"/>
+          </a:fontRef>
+        </p:style>
+        <p:txBody>
+          <a:bodyPr rtlCol="0" anchor="ctr"/>
+          <a:lstStyle/>
+          <a:p>
+            <a:pPr algn="ctr"/>
+            <a:endParaRPr lang="es-CL" dirty="0"/>
+          </a:p>
+        </p:txBody>
+      </p:sp>
+      <p:sp>
+        <p:nvSpPr>
+          <p:cNvPr id="13" name="Rectángulo 12">
+            <a:extLst>
+              <a:ext uri="{FF2B5EF4-FFF2-40B4-BE49-F238E27FC236}">
+                <a16:creationId xmlns:a16="http://schemas.microsoft.com/office/drawing/2014/main" id="{EE10F1C4-B6F5-0F64-BAEF-CD4DF57D6729}"/>
+              </a:ext>
+            </a:extLst>
+          </p:cNvPr>
+          <p:cNvSpPr/>
+          <p:nvPr/>
+        </p:nvSpPr>
+        <p:spPr>
+          <a:xfrm>
+            <a:off x="9966960" y="4425002"/>
+            <a:ext cx="121920" cy="127819"/>
+          </a:xfrm>
+          <a:prstGeom prst="rect">
+            <a:avLst/>
+          </a:prstGeom>
+          <a:solidFill>
+            <a:srgbClr val="00D084"/>
+          </a:solidFill>
+        </p:spPr>
+        <p:style>
+          <a:lnRef idx="2">
+            <a:schemeClr val="accent1">
+              <a:shade val="15000"/>
+            </a:schemeClr>
+          </a:lnRef>
+          <a:fillRef idx="1">
+            <a:schemeClr val="accent1"/>
+          </a:fillRef>
+          <a:effectRef idx="0">
+            <a:schemeClr val="accent1"/>
+          </a:effectRef>
+          <a:fontRef idx="minor">
+            <a:schemeClr val="lt1"/>
+          </a:fontRef>
+        </p:style>
+        <p:txBody>
+          <a:bodyPr rtlCol="0" anchor="ctr"/>
+          <a:lstStyle/>
+          <a:p>
+            <a:pPr algn="ctr"/>
+            <a:endParaRPr lang="es-CL" dirty="0"/>
+          </a:p>
+        </p:txBody>
+      </p:sp>
+      <p:sp>
+        <p:nvSpPr>
+          <p:cNvPr id="14" name="Rectángulo 13">
+            <a:extLst>
+              <a:ext uri="{FF2B5EF4-FFF2-40B4-BE49-F238E27FC236}">
+                <a16:creationId xmlns:a16="http://schemas.microsoft.com/office/drawing/2014/main" id="{C7203CC1-50E4-C2FD-CB74-C4D02F6F1F11}"/>
+              </a:ext>
+            </a:extLst>
+          </p:cNvPr>
+          <p:cNvSpPr/>
+          <p:nvPr/>
+        </p:nvSpPr>
+        <p:spPr>
+          <a:xfrm>
+            <a:off x="9966960" y="4727834"/>
+            <a:ext cx="121920" cy="127819"/>
+          </a:xfrm>
+          <a:prstGeom prst="rect">
+            <a:avLst/>
+          </a:prstGeom>
+          <a:solidFill>
+            <a:srgbClr val="8ED1FC"/>
+          </a:solidFill>
+        </p:spPr>
+        <p:style>
+          <a:lnRef idx="2">
+            <a:schemeClr val="accent1">
+              <a:shade val="15000"/>
+            </a:schemeClr>
+          </a:lnRef>
+          <a:fillRef idx="1">
+            <a:schemeClr val="accent1"/>
+          </a:fillRef>
+          <a:effectRef idx="0">
+            <a:schemeClr val="accent1"/>
+          </a:effectRef>
+          <a:fontRef idx="minor">
+            <a:schemeClr val="lt1"/>
+          </a:fontRef>
+        </p:style>
+        <p:txBody>
+          <a:bodyPr rtlCol="0" anchor="ctr"/>
+          <a:lstStyle/>
+          <a:p>
+            <a:pPr algn="ctr"/>
+            <a:endParaRPr lang="es-CL" dirty="0"/>
+          </a:p>
+        </p:txBody>
+      </p:sp>
+      <p:sp>
+        <p:nvSpPr>
+          <p:cNvPr id="16" name="Rectángulo 15">
+            <a:extLst>
+              <a:ext uri="{FF2B5EF4-FFF2-40B4-BE49-F238E27FC236}">
+                <a16:creationId xmlns:a16="http://schemas.microsoft.com/office/drawing/2014/main" id="{CBEE36F3-FBC6-0D9F-D5F8-50C21A3F5E9F}"/>
+              </a:ext>
+            </a:extLst>
+          </p:cNvPr>
+          <p:cNvSpPr/>
+          <p:nvPr/>
+        </p:nvSpPr>
+        <p:spPr>
+          <a:xfrm>
+            <a:off x="9966960" y="5036887"/>
+            <a:ext cx="121920" cy="127819"/>
+          </a:xfrm>
+          <a:prstGeom prst="rect">
+            <a:avLst/>
+          </a:prstGeom>
+        </p:spPr>
+        <p:style>
+          <a:lnRef idx="2">
+            <a:schemeClr val="accent1">
+              <a:shade val="15000"/>
+            </a:schemeClr>
+          </a:lnRef>
+          <a:fillRef idx="1">
+            <a:schemeClr val="accent1"/>
+          </a:fillRef>
+          <a:effectRef idx="0">
+            <a:schemeClr val="accent1"/>
+          </a:effectRef>
+          <a:fontRef idx="minor">
+            <a:schemeClr val="lt1"/>
+          </a:fontRef>
+        </p:style>
+        <p:txBody>
+          <a:bodyPr rtlCol="0" anchor="ctr"/>
+          <a:lstStyle/>
+          <a:p>
+            <a:pPr algn="ctr"/>
+            <a:endParaRPr lang="es-CL" dirty="0"/>
+          </a:p>
+        </p:txBody>
+      </p:sp>
+      <p:sp>
+        <p:nvSpPr>
+          <p:cNvPr id="19" name="CuadroTexto 18">
+            <a:extLst>
+              <a:ext uri="{FF2B5EF4-FFF2-40B4-BE49-F238E27FC236}">
+                <a16:creationId xmlns:a16="http://schemas.microsoft.com/office/drawing/2014/main" id="{162C8C40-1DF8-2252-7ACF-95D0B49D2A6F}"/>
+              </a:ext>
+            </a:extLst>
+          </p:cNvPr>
+          <p:cNvSpPr txBox="1"/>
+          <p:nvPr/>
+        </p:nvSpPr>
+        <p:spPr>
+          <a:xfrm>
+            <a:off x="10150699" y="2562072"/>
+            <a:ext cx="1362874" cy="215444"/>
+          </a:xfrm>
+          <a:prstGeom prst="rect">
+            <a:avLst/>
+          </a:prstGeom>
+          <a:noFill/>
+        </p:spPr>
+        <p:txBody>
+          <a:bodyPr wrap="none" rtlCol="0">
+            <a:spAutoFit/>
+          </a:bodyPr>
+          <a:lstStyle/>
+          <a:p>
+            <a:r>
+              <a:rPr lang="es-CL" sz="800" dirty="0"/>
+              <a:t>Administración y Negocios</a:t>
+            </a:r>
+          </a:p>
+        </p:txBody>
+      </p:sp>
+      <p:sp>
+        <p:nvSpPr>
+          <p:cNvPr id="23" name="CuadroTexto 22">
+            <a:extLst>
+              <a:ext uri="{FF2B5EF4-FFF2-40B4-BE49-F238E27FC236}">
+                <a16:creationId xmlns:a16="http://schemas.microsoft.com/office/drawing/2014/main" id="{11193A91-E58A-45DF-1778-490B4BFDF212}"/>
+              </a:ext>
+            </a:extLst>
+          </p:cNvPr>
+          <p:cNvSpPr txBox="1"/>
+          <p:nvPr/>
+        </p:nvSpPr>
+        <p:spPr>
+          <a:xfrm>
+            <a:off x="10150699" y="2867105"/>
+            <a:ext cx="837089" cy="215444"/>
+          </a:xfrm>
+          <a:prstGeom prst="rect">
+            <a:avLst/>
+          </a:prstGeom>
+          <a:noFill/>
+        </p:spPr>
+        <p:txBody>
+          <a:bodyPr wrap="none" rtlCol="0">
+            <a:spAutoFit/>
+          </a:bodyPr>
+          <a:lstStyle/>
+          <a:p>
+            <a:r>
+              <a:rPr lang="es-CL" sz="800" dirty="0"/>
+              <a:t>Comunicación</a:t>
+            </a:r>
+          </a:p>
+        </p:txBody>
+      </p:sp>
+      <p:sp>
+        <p:nvSpPr>
+          <p:cNvPr id="24" name="CuadroTexto 23">
+            <a:extLst>
+              <a:ext uri="{FF2B5EF4-FFF2-40B4-BE49-F238E27FC236}">
+                <a16:creationId xmlns:a16="http://schemas.microsoft.com/office/drawing/2014/main" id="{EFDCA0E1-33C0-DF63-438D-51A7C04F09E4}"/>
+              </a:ext>
+            </a:extLst>
+          </p:cNvPr>
+          <p:cNvSpPr txBox="1"/>
+          <p:nvPr/>
+        </p:nvSpPr>
+        <p:spPr>
+          <a:xfrm>
+            <a:off x="10150699" y="3167736"/>
+            <a:ext cx="787395" cy="215444"/>
+          </a:xfrm>
+          <a:prstGeom prst="rect">
+            <a:avLst/>
+          </a:prstGeom>
+          <a:noFill/>
+        </p:spPr>
+        <p:txBody>
+          <a:bodyPr wrap="none" rtlCol="0">
+            <a:spAutoFit/>
+          </a:bodyPr>
+          <a:lstStyle/>
+          <a:p>
+            <a:r>
+              <a:rPr lang="es-CL" sz="800" dirty="0"/>
+              <a:t>Construcción</a:t>
+            </a:r>
+          </a:p>
+        </p:txBody>
+      </p:sp>
+      <p:sp>
+        <p:nvSpPr>
+          <p:cNvPr id="25" name="CuadroTexto 24">
+            <a:extLst>
+              <a:ext uri="{FF2B5EF4-FFF2-40B4-BE49-F238E27FC236}">
+                <a16:creationId xmlns:a16="http://schemas.microsoft.com/office/drawing/2014/main" id="{1D3598BD-2617-5C5F-F9D6-387490C95E7B}"/>
+              </a:ext>
+            </a:extLst>
+          </p:cNvPr>
+          <p:cNvSpPr txBox="1"/>
+          <p:nvPr/>
+        </p:nvSpPr>
+        <p:spPr>
+          <a:xfrm>
+            <a:off x="10150699" y="3467481"/>
+            <a:ext cx="495649" cy="215444"/>
+          </a:xfrm>
+          <a:prstGeom prst="rect">
+            <a:avLst/>
+          </a:prstGeom>
+          <a:noFill/>
+        </p:spPr>
+        <p:txBody>
+          <a:bodyPr wrap="none" rtlCol="0">
+            <a:spAutoFit/>
+          </a:bodyPr>
+          <a:lstStyle/>
+          <a:p>
+            <a:r>
+              <a:rPr lang="es-CL" sz="800" dirty="0"/>
+              <a:t>Diseño</a:t>
+            </a:r>
+          </a:p>
+        </p:txBody>
+      </p:sp>
+      <p:sp>
+        <p:nvSpPr>
+          <p:cNvPr id="26" name="CuadroTexto 25">
+            <a:extLst>
+              <a:ext uri="{FF2B5EF4-FFF2-40B4-BE49-F238E27FC236}">
+                <a16:creationId xmlns:a16="http://schemas.microsoft.com/office/drawing/2014/main" id="{B723A014-AEDD-DF01-66FF-159FFD051835}"/>
+              </a:ext>
+            </a:extLst>
+          </p:cNvPr>
+          <p:cNvSpPr txBox="1"/>
+          <p:nvPr/>
+        </p:nvSpPr>
+        <p:spPr>
+          <a:xfrm>
+            <a:off x="10150699" y="3775450"/>
+            <a:ext cx="1712328" cy="215444"/>
+          </a:xfrm>
+          <a:prstGeom prst="rect">
+            <a:avLst/>
+          </a:prstGeom>
+          <a:noFill/>
+        </p:spPr>
+        <p:txBody>
+          <a:bodyPr wrap="none" rtlCol="0">
+            <a:spAutoFit/>
+          </a:bodyPr>
+          <a:lstStyle/>
+          <a:p>
+            <a:r>
+              <a:rPr lang="es-CL" sz="800" dirty="0"/>
+              <a:t>Informática y Telecomunicaciones</a:t>
+            </a:r>
+          </a:p>
+        </p:txBody>
+      </p:sp>
+      <p:sp>
+        <p:nvSpPr>
+          <p:cNvPr id="27" name="CuadroTexto 26">
+            <a:extLst>
+              <a:ext uri="{FF2B5EF4-FFF2-40B4-BE49-F238E27FC236}">
+                <a16:creationId xmlns:a16="http://schemas.microsoft.com/office/drawing/2014/main" id="{06AE9C65-C167-96E8-F427-692B9DC3084C}"/>
+              </a:ext>
+            </a:extLst>
+          </p:cNvPr>
+          <p:cNvSpPr txBox="1"/>
+          <p:nvPr/>
+        </p:nvSpPr>
+        <p:spPr>
+          <a:xfrm>
+            <a:off x="10150699" y="4016802"/>
+            <a:ext cx="1955957" cy="338554"/>
+          </a:xfrm>
+          <a:prstGeom prst="rect">
+            <a:avLst/>
+          </a:prstGeom>
+          <a:noFill/>
+        </p:spPr>
+        <p:txBody>
+          <a:bodyPr wrap="square" rtlCol="0">
+            <a:spAutoFit/>
+          </a:bodyPr>
+          <a:lstStyle/>
+          <a:p>
+            <a:r>
+              <a:rPr lang="es-CL" sz="800" dirty="0"/>
+              <a:t>Ingeniería, Medio Ambiente y Recursos Naturales</a:t>
+            </a:r>
+          </a:p>
+        </p:txBody>
+      </p:sp>
+      <p:sp>
+        <p:nvSpPr>
+          <p:cNvPr id="28" name="CuadroTexto 27">
+            <a:extLst>
+              <a:ext uri="{FF2B5EF4-FFF2-40B4-BE49-F238E27FC236}">
+                <a16:creationId xmlns:a16="http://schemas.microsoft.com/office/drawing/2014/main" id="{AA996899-21D2-7BCA-4F40-B892823B0C8E}"/>
+              </a:ext>
+            </a:extLst>
+          </p:cNvPr>
+          <p:cNvSpPr txBox="1"/>
+          <p:nvPr/>
+        </p:nvSpPr>
+        <p:spPr>
+          <a:xfrm>
+            <a:off x="10150699" y="4381189"/>
+            <a:ext cx="1061509" cy="215444"/>
+          </a:xfrm>
+          <a:prstGeom prst="rect">
+            <a:avLst/>
+          </a:prstGeom>
+          <a:noFill/>
+        </p:spPr>
+        <p:txBody>
+          <a:bodyPr wrap="none" rtlCol="0">
+            <a:spAutoFit/>
+          </a:bodyPr>
+          <a:lstStyle/>
+          <a:p>
+            <a:r>
+              <a:rPr lang="es-CL" sz="800" dirty="0"/>
+              <a:t>Recursos Naturales</a:t>
+            </a:r>
+          </a:p>
+        </p:txBody>
+      </p:sp>
+      <p:sp>
+        <p:nvSpPr>
+          <p:cNvPr id="29" name="CuadroTexto 28">
+            <a:extLst>
+              <a:ext uri="{FF2B5EF4-FFF2-40B4-BE49-F238E27FC236}">
+                <a16:creationId xmlns:a16="http://schemas.microsoft.com/office/drawing/2014/main" id="{F3238CD4-7082-C81A-1A5A-EAC5BBBC87D8}"/>
+              </a:ext>
+            </a:extLst>
+          </p:cNvPr>
+          <p:cNvSpPr txBox="1"/>
+          <p:nvPr/>
+        </p:nvSpPr>
+        <p:spPr>
+          <a:xfrm>
+            <a:off x="10150699" y="4686717"/>
+            <a:ext cx="950901" cy="215444"/>
+          </a:xfrm>
+          <a:prstGeom prst="rect">
+            <a:avLst/>
+          </a:prstGeom>
+          <a:noFill/>
+        </p:spPr>
+        <p:txBody>
+          <a:bodyPr wrap="none" rtlCol="0">
+            <a:spAutoFit/>
+          </a:bodyPr>
+          <a:lstStyle/>
+          <a:p>
+            <a:r>
+              <a:rPr lang="es-CL" sz="800" dirty="0"/>
+              <a:t>Salud y Bienestar</a:t>
+            </a:r>
+          </a:p>
+        </p:txBody>
+      </p:sp>
+      <p:sp>
+        <p:nvSpPr>
+          <p:cNvPr id="30" name="CuadroTexto 29">
+            <a:extLst>
+              <a:ext uri="{FF2B5EF4-FFF2-40B4-BE49-F238E27FC236}">
+                <a16:creationId xmlns:a16="http://schemas.microsoft.com/office/drawing/2014/main" id="{C6054AB3-A79D-7D6C-5D39-C2DB89A21107}"/>
+              </a:ext>
+            </a:extLst>
+          </p:cNvPr>
+          <p:cNvSpPr txBox="1"/>
+          <p:nvPr/>
+        </p:nvSpPr>
+        <p:spPr>
+          <a:xfrm>
+            <a:off x="10150699" y="4992245"/>
+            <a:ext cx="1200970" cy="215444"/>
+          </a:xfrm>
+          <a:prstGeom prst="rect">
+            <a:avLst/>
+          </a:prstGeom>
+          <a:noFill/>
+        </p:spPr>
+        <p:txBody>
+          <a:bodyPr wrap="none" rtlCol="0">
+            <a:spAutoFit/>
+          </a:bodyPr>
+          <a:lstStyle/>
+          <a:p>
+            <a:r>
+              <a:rPr lang="es-CL" sz="800" dirty="0"/>
+              <a:t>Turismo y Hospitalidad</a:t>
+            </a:r>
           </a:p>
         </p:txBody>
       </p:sp>

</xml_diff>

<commit_message>
hotfix: slides design fixed
</commit_message>
<xml_diff>
--- a/templates/radiografia_bienestar_duoc_2025.pptx
+++ b/templates/radiografia_bienestar_duoc_2025.pptx
@@ -262,7 +262,7 @@
           <a:p>
             <a:fld id="{2CF58384-DFEB-4258-9675-9D7D6D5DB838}" type="datetimeFigureOut">
               <a:rPr lang="es-CL" smtClean="0"/>
-              <a:t>05-09-2025</a:t>
+              <a:t>09-09-2025</a:t>
             </a:fld>
             <a:endParaRPr lang="es-CL"/>
           </a:p>
@@ -462,7 +462,7 @@
           <a:p>
             <a:fld id="{2CF58384-DFEB-4258-9675-9D7D6D5DB838}" type="datetimeFigureOut">
               <a:rPr lang="es-CL" smtClean="0"/>
-              <a:t>05-09-2025</a:t>
+              <a:t>09-09-2025</a:t>
             </a:fld>
             <a:endParaRPr lang="es-CL"/>
           </a:p>
@@ -672,7 +672,7 @@
           <a:p>
             <a:fld id="{2CF58384-DFEB-4258-9675-9D7D6D5DB838}" type="datetimeFigureOut">
               <a:rPr lang="es-CL" smtClean="0"/>
-              <a:t>05-09-2025</a:t>
+              <a:t>09-09-2025</a:t>
             </a:fld>
             <a:endParaRPr lang="es-CL"/>
           </a:p>
@@ -872,7 +872,7 @@
           <a:p>
             <a:fld id="{2CF58384-DFEB-4258-9675-9D7D6D5DB838}" type="datetimeFigureOut">
               <a:rPr lang="es-CL" smtClean="0"/>
-              <a:t>05-09-2025</a:t>
+              <a:t>09-09-2025</a:t>
             </a:fld>
             <a:endParaRPr lang="es-CL"/>
           </a:p>
@@ -1148,7 +1148,7 @@
           <a:p>
             <a:fld id="{2CF58384-DFEB-4258-9675-9D7D6D5DB838}" type="datetimeFigureOut">
               <a:rPr lang="es-CL" smtClean="0"/>
-              <a:t>05-09-2025</a:t>
+              <a:t>09-09-2025</a:t>
             </a:fld>
             <a:endParaRPr lang="es-CL"/>
           </a:p>
@@ -1416,7 +1416,7 @@
           <a:p>
             <a:fld id="{2CF58384-DFEB-4258-9675-9D7D6D5DB838}" type="datetimeFigureOut">
               <a:rPr lang="es-CL" smtClean="0"/>
-              <a:t>05-09-2025</a:t>
+              <a:t>09-09-2025</a:t>
             </a:fld>
             <a:endParaRPr lang="es-CL"/>
           </a:p>
@@ -1831,7 +1831,7 @@
           <a:p>
             <a:fld id="{2CF58384-DFEB-4258-9675-9D7D6D5DB838}" type="datetimeFigureOut">
               <a:rPr lang="es-CL" smtClean="0"/>
-              <a:t>05-09-2025</a:t>
+              <a:t>09-09-2025</a:t>
             </a:fld>
             <a:endParaRPr lang="es-CL"/>
           </a:p>
@@ -1973,7 +1973,7 @@
           <a:p>
             <a:fld id="{2CF58384-DFEB-4258-9675-9D7D6D5DB838}" type="datetimeFigureOut">
               <a:rPr lang="es-CL" smtClean="0"/>
-              <a:t>05-09-2025</a:t>
+              <a:t>09-09-2025</a:t>
             </a:fld>
             <a:endParaRPr lang="es-CL"/>
           </a:p>
@@ -2086,7 +2086,7 @@
           <a:p>
             <a:fld id="{2CF58384-DFEB-4258-9675-9D7D6D5DB838}" type="datetimeFigureOut">
               <a:rPr lang="es-CL" smtClean="0"/>
-              <a:t>05-09-2025</a:t>
+              <a:t>09-09-2025</a:t>
             </a:fld>
             <a:endParaRPr lang="es-CL"/>
           </a:p>
@@ -2399,7 +2399,7 @@
           <a:p>
             <a:fld id="{2CF58384-DFEB-4258-9675-9D7D6D5DB838}" type="datetimeFigureOut">
               <a:rPr lang="es-CL" smtClean="0"/>
-              <a:t>05-09-2025</a:t>
+              <a:t>09-09-2025</a:t>
             </a:fld>
             <a:endParaRPr lang="es-CL"/>
           </a:p>
@@ -2688,7 +2688,7 @@
           <a:p>
             <a:fld id="{2CF58384-DFEB-4258-9675-9D7D6D5DB838}" type="datetimeFigureOut">
               <a:rPr lang="es-CL" smtClean="0"/>
-              <a:t>05-09-2025</a:t>
+              <a:t>09-09-2025</a:t>
             </a:fld>
             <a:endParaRPr lang="es-CL"/>
           </a:p>
@@ -2931,7 +2931,7 @@
           <a:p>
             <a:fld id="{2CF58384-DFEB-4258-9675-9D7D6D5DB838}" type="datetimeFigureOut">
               <a:rPr lang="es-CL" smtClean="0"/>
-              <a:t>05-09-2025</a:t>
+              <a:t>09-09-2025</a:t>
             </a:fld>
             <a:endParaRPr lang="es-CL"/>
           </a:p>
@@ -3566,7 +3566,7 @@
         <p:spPr>
           <a:xfrm>
             <a:off x="678426" y="523257"/>
-            <a:ext cx="5417574" cy="800219"/>
+            <a:ext cx="5417574" cy="584775"/>
           </a:xfrm>
           <a:prstGeom prst="rect">
             <a:avLst/>
@@ -3587,26 +3587,40 @@
                 <a:latin typeface="Arial" panose="020B0604020202020204" pitchFamily="34" charset="0"/>
                 <a:cs typeface="Arial" panose="020B0604020202020204" pitchFamily="34" charset="0"/>
               </a:rPr>
-              <a:t>RADIOGAFÍA DEL BIENESTAR DUOC UC 2025</a:t>
-            </a:r>
-          </a:p>
-          <a:p>
+              <a:t>RADIOGRAFÍA DEL BIENESTAR DUOC UC 2025</a:t>
+            </a:r>
+          </a:p>
+          <a:p>
+            <a:r>
+              <a:rPr lang="es-CL" sz="1400" b="1" dirty="0">
+                <a:solidFill>
+                  <a:schemeClr val="tx1">
+                    <a:lumMod val="50000"/>
+                    <a:lumOff val="50000"/>
+                  </a:schemeClr>
+                </a:solidFill>
+                <a:latin typeface="Arial" panose="020B0604020202020204" pitchFamily="34" charset="0"/>
+                <a:cs typeface="Arial" panose="020B0604020202020204" pitchFamily="34" charset="0"/>
+              </a:rPr>
+              <a:t>Tasa de respuestas por </a:t>
+            </a:r>
             <a:r>
               <a:rPr lang="es-CL" sz="1400" b="1" dirty="0">
                 <a:latin typeface="Arial" panose="020B0604020202020204" pitchFamily="34" charset="0"/>
                 <a:cs typeface="Arial" panose="020B0604020202020204" pitchFamily="34" charset="0"/>
               </a:rPr>
-              <a:t>Tasa de respuestas</a:t>
-            </a:r>
-          </a:p>
-          <a:p>
-            <a:r>
-              <a:rPr lang="es-CL" sz="1400" b="1" dirty="0">
-                <a:latin typeface="Arial" panose="020B0604020202020204" pitchFamily="34" charset="0"/>
-                <a:cs typeface="Arial" panose="020B0604020202020204" pitchFamily="34" charset="0"/>
-              </a:rPr>
-              <a:t>Respuestas por sede</a:t>
-            </a:r>
+              <a:t>SEDE</a:t>
+            </a:r>
+            <a:endParaRPr lang="es-CL" sz="1400" b="1" dirty="0">
+              <a:solidFill>
+                <a:schemeClr val="tx1">
+                  <a:lumMod val="50000"/>
+                  <a:lumOff val="50000"/>
+                </a:schemeClr>
+              </a:solidFill>
+              <a:latin typeface="Arial" panose="020B0604020202020204" pitchFamily="34" charset="0"/>
+              <a:cs typeface="Arial" panose="020B0604020202020204" pitchFamily="34" charset="0"/>
+            </a:endParaRPr>
           </a:p>
         </p:txBody>
       </p:sp>
@@ -4063,7 +4077,7 @@
         <p:spPr>
           <a:xfrm>
             <a:off x="678426" y="523257"/>
-            <a:ext cx="5417574" cy="800219"/>
+            <a:ext cx="5417574" cy="584775"/>
           </a:xfrm>
           <a:prstGeom prst="rect">
             <a:avLst/>
@@ -4084,25 +4098,29 @@
                 <a:latin typeface="Arial" panose="020B0604020202020204" pitchFamily="34" charset="0"/>
                 <a:cs typeface="Arial" panose="020B0604020202020204" pitchFamily="34" charset="0"/>
               </a:rPr>
-              <a:t>RADIOGAFÍA DEL BIENESTAR DUOC UC 2025</a:t>
-            </a:r>
-          </a:p>
-          <a:p>
+              <a:t>RADIOGRAFÍA DEL BIENESTAR DUOC UC 2025</a:t>
+            </a:r>
+          </a:p>
+          <a:p>
+            <a:r>
+              <a:rPr lang="es-CL" sz="1400" b="1" dirty="0">
+                <a:solidFill>
+                  <a:schemeClr val="tx1">
+                    <a:lumMod val="50000"/>
+                    <a:lumOff val="50000"/>
+                  </a:schemeClr>
+                </a:solidFill>
+                <a:latin typeface="Arial" panose="020B0604020202020204" pitchFamily="34" charset="0"/>
+                <a:cs typeface="Arial" panose="020B0604020202020204" pitchFamily="34" charset="0"/>
+              </a:rPr>
+              <a:t>Tasa de respuestas por </a:t>
+            </a:r>
             <a:r>
               <a:rPr lang="es-CL" sz="1400" b="1" dirty="0">
                 <a:latin typeface="Arial" panose="020B0604020202020204" pitchFamily="34" charset="0"/>
                 <a:cs typeface="Arial" panose="020B0604020202020204" pitchFamily="34" charset="0"/>
               </a:rPr>
-              <a:t>Tasa de respuestas</a:t>
-            </a:r>
-          </a:p>
-          <a:p>
-            <a:r>
-              <a:rPr lang="es-CL" sz="1400" b="1" dirty="0">
-                <a:latin typeface="Arial" panose="020B0604020202020204" pitchFamily="34" charset="0"/>
-                <a:cs typeface="Arial" panose="020B0604020202020204" pitchFamily="34" charset="0"/>
-              </a:rPr>
-              <a:t>Respuestas por escuela</a:t>
+              <a:t>ESCUELA</a:t>
             </a:r>
           </a:p>
         </p:txBody>

</xml_diff>

<commit_message>
tasa de respuestas almost done
</commit_message>
<xml_diff>
--- a/templates/radiografia_bienestar_duoc_2025.pptx
+++ b/templates/radiografia_bienestar_duoc_2025.pptx
@@ -7,6 +7,8 @@
   <p:sldIdLst>
     <p:sldId id="256" r:id="rId2"/>
     <p:sldId id="257" r:id="rId3"/>
+    <p:sldId id="258" r:id="rId4"/>
+    <p:sldId id="259" r:id="rId5"/>
   </p:sldIdLst>
   <p:sldSz cx="12192000" cy="6858000"/>
   <p:notesSz cx="6858000" cy="9144000"/>
@@ -262,7 +264,7 @@
           <a:p>
             <a:fld id="{2CF58384-DFEB-4258-9675-9D7D6D5DB838}" type="datetimeFigureOut">
               <a:rPr lang="es-CL" smtClean="0"/>
-              <a:t>09-09-2025</a:t>
+              <a:t>29-09-2025</a:t>
             </a:fld>
             <a:endParaRPr lang="es-CL"/>
           </a:p>
@@ -462,7 +464,7 @@
           <a:p>
             <a:fld id="{2CF58384-DFEB-4258-9675-9D7D6D5DB838}" type="datetimeFigureOut">
               <a:rPr lang="es-CL" smtClean="0"/>
-              <a:t>09-09-2025</a:t>
+              <a:t>29-09-2025</a:t>
             </a:fld>
             <a:endParaRPr lang="es-CL"/>
           </a:p>
@@ -672,7 +674,7 @@
           <a:p>
             <a:fld id="{2CF58384-DFEB-4258-9675-9D7D6D5DB838}" type="datetimeFigureOut">
               <a:rPr lang="es-CL" smtClean="0"/>
-              <a:t>09-09-2025</a:t>
+              <a:t>29-09-2025</a:t>
             </a:fld>
             <a:endParaRPr lang="es-CL"/>
           </a:p>
@@ -872,7 +874,7 @@
           <a:p>
             <a:fld id="{2CF58384-DFEB-4258-9675-9D7D6D5DB838}" type="datetimeFigureOut">
               <a:rPr lang="es-CL" smtClean="0"/>
-              <a:t>09-09-2025</a:t>
+              <a:t>29-09-2025</a:t>
             </a:fld>
             <a:endParaRPr lang="es-CL"/>
           </a:p>
@@ -1148,7 +1150,7 @@
           <a:p>
             <a:fld id="{2CF58384-DFEB-4258-9675-9D7D6D5DB838}" type="datetimeFigureOut">
               <a:rPr lang="es-CL" smtClean="0"/>
-              <a:t>09-09-2025</a:t>
+              <a:t>29-09-2025</a:t>
             </a:fld>
             <a:endParaRPr lang="es-CL"/>
           </a:p>
@@ -1416,7 +1418,7 @@
           <a:p>
             <a:fld id="{2CF58384-DFEB-4258-9675-9D7D6D5DB838}" type="datetimeFigureOut">
               <a:rPr lang="es-CL" smtClean="0"/>
-              <a:t>09-09-2025</a:t>
+              <a:t>29-09-2025</a:t>
             </a:fld>
             <a:endParaRPr lang="es-CL"/>
           </a:p>
@@ -1831,7 +1833,7 @@
           <a:p>
             <a:fld id="{2CF58384-DFEB-4258-9675-9D7D6D5DB838}" type="datetimeFigureOut">
               <a:rPr lang="es-CL" smtClean="0"/>
-              <a:t>09-09-2025</a:t>
+              <a:t>29-09-2025</a:t>
             </a:fld>
             <a:endParaRPr lang="es-CL"/>
           </a:p>
@@ -1973,7 +1975,7 @@
           <a:p>
             <a:fld id="{2CF58384-DFEB-4258-9675-9D7D6D5DB838}" type="datetimeFigureOut">
               <a:rPr lang="es-CL" smtClean="0"/>
-              <a:t>09-09-2025</a:t>
+              <a:t>29-09-2025</a:t>
             </a:fld>
             <a:endParaRPr lang="es-CL"/>
           </a:p>
@@ -2086,7 +2088,7 @@
           <a:p>
             <a:fld id="{2CF58384-DFEB-4258-9675-9D7D6D5DB838}" type="datetimeFigureOut">
               <a:rPr lang="es-CL" smtClean="0"/>
-              <a:t>09-09-2025</a:t>
+              <a:t>29-09-2025</a:t>
             </a:fld>
             <a:endParaRPr lang="es-CL"/>
           </a:p>
@@ -2399,7 +2401,7 @@
           <a:p>
             <a:fld id="{2CF58384-DFEB-4258-9675-9D7D6D5DB838}" type="datetimeFigureOut">
               <a:rPr lang="es-CL" smtClean="0"/>
-              <a:t>09-09-2025</a:t>
+              <a:t>29-09-2025</a:t>
             </a:fld>
             <a:endParaRPr lang="es-CL"/>
           </a:p>
@@ -2688,7 +2690,7 @@
           <a:p>
             <a:fld id="{2CF58384-DFEB-4258-9675-9D7D6D5DB838}" type="datetimeFigureOut">
               <a:rPr lang="es-CL" smtClean="0"/>
-              <a:t>09-09-2025</a:t>
+              <a:t>29-09-2025</a:t>
             </a:fld>
             <a:endParaRPr lang="es-CL"/>
           </a:p>
@@ -2931,7 +2933,7 @@
           <a:p>
             <a:fld id="{2CF58384-DFEB-4258-9675-9D7D6D5DB838}" type="datetimeFigureOut">
               <a:rPr lang="es-CL" smtClean="0"/>
-              <a:t>09-09-2025</a:t>
+              <a:t>29-09-2025</a:t>
             </a:fld>
             <a:endParaRPr lang="es-CL"/>
           </a:p>
@@ -3566,7 +3568,7 @@
         <p:spPr>
           <a:xfrm>
             <a:off x="678426" y="523257"/>
-            <a:ext cx="5417574" cy="584775"/>
+            <a:ext cx="5417574" cy="369332"/>
           </a:xfrm>
           <a:prstGeom prst="rect">
             <a:avLst/>
@@ -3590,38 +3592,6 @@
               <a:t>RADIOGRAFÍA DEL BIENESTAR DUOC UC 2025</a:t>
             </a:r>
           </a:p>
-          <a:p>
-            <a:r>
-              <a:rPr lang="es-CL" sz="1400" b="1" dirty="0">
-                <a:solidFill>
-                  <a:schemeClr val="tx1">
-                    <a:lumMod val="50000"/>
-                    <a:lumOff val="50000"/>
-                  </a:schemeClr>
-                </a:solidFill>
-                <a:latin typeface="Arial" panose="020B0604020202020204" pitchFamily="34" charset="0"/>
-                <a:cs typeface="Arial" panose="020B0604020202020204" pitchFamily="34" charset="0"/>
-              </a:rPr>
-              <a:t>Tasa de respuestas por </a:t>
-            </a:r>
-            <a:r>
-              <a:rPr lang="es-CL" sz="1400" b="1" dirty="0">
-                <a:latin typeface="Arial" panose="020B0604020202020204" pitchFamily="34" charset="0"/>
-                <a:cs typeface="Arial" panose="020B0604020202020204" pitchFamily="34" charset="0"/>
-              </a:rPr>
-              <a:t>SEDE</a:t>
-            </a:r>
-            <a:endParaRPr lang="es-CL" sz="1400" b="1" dirty="0">
-              <a:solidFill>
-                <a:schemeClr val="tx1">
-                  <a:lumMod val="50000"/>
-                  <a:lumOff val="50000"/>
-                </a:schemeClr>
-              </a:solidFill>
-              <a:latin typeface="Arial" panose="020B0604020202020204" pitchFamily="34" charset="0"/>
-              <a:cs typeface="Arial" panose="020B0604020202020204" pitchFamily="34" charset="0"/>
-            </a:endParaRPr>
-          </a:p>
         </p:txBody>
       </p:sp>
       <p:pic>
@@ -3710,7 +3680,7 @@
         </p:nvSpPr>
         <p:spPr>
           <a:xfrm>
-            <a:off x="5614219" y="1693294"/>
+            <a:off x="678426" y="1168121"/>
             <a:ext cx="5899354" cy="432620"/>
           </a:xfrm>
           <a:prstGeom prst="rect">
@@ -3753,20 +3723,22 @@
       </p:sp>
       <p:sp>
         <p:nvSpPr>
-          <p:cNvPr id="21" name="CuadroTexto 20">
-            <a:extLst>
-              <a:ext uri="{FF2B5EF4-FFF2-40B4-BE49-F238E27FC236}">
-                <a16:creationId xmlns:a16="http://schemas.microsoft.com/office/drawing/2014/main" id="{9569CE1F-4ECB-BE39-8021-239FB367CEEE}"/>
-              </a:ext>
-            </a:extLst>
-          </p:cNvPr>
-          <p:cNvSpPr txBox="1"/>
+          <p:cNvPr id="22" name="CuadroTexto 21">
+            <a:extLst>
+              <a:ext uri="{FF2B5EF4-FFF2-40B4-BE49-F238E27FC236}">
+                <a16:creationId xmlns:a16="http://schemas.microsoft.com/office/drawing/2014/main" id="{DA26D035-33CB-70A4-F82D-7A26738CC726}"/>
+              </a:ext>
+            </a:extLst>
+          </p:cNvPr>
+          <p:cNvSpPr txBox="1">
+            <a:spLocks/>
+          </p:cNvSpPr>
           <p:nvPr/>
         </p:nvSpPr>
         <p:spPr>
           <a:xfrm>
-            <a:off x="953727" y="1323476"/>
-            <a:ext cx="5142273" cy="4896776"/>
+            <a:off x="1824180" y="1702750"/>
+            <a:ext cx="4107600" cy="4108359"/>
           </a:xfrm>
           <a:prstGeom prst="rect">
             <a:avLst/>
@@ -3780,46 +3752,10 @@
           <a:lstStyle/>
           <a:p>
             <a:r>
-              <a:rPr lang="es-CL" dirty="0"/>
-              <a:t>TABLE_PLACEHOLDER_1</a:t>
-            </a:r>
-          </a:p>
-        </p:txBody>
-      </p:sp>
-      <p:sp>
-        <p:nvSpPr>
-          <p:cNvPr id="22" name="CuadroTexto 21">
-            <a:extLst>
-              <a:ext uri="{FF2B5EF4-FFF2-40B4-BE49-F238E27FC236}">
-                <a16:creationId xmlns:a16="http://schemas.microsoft.com/office/drawing/2014/main" id="{DA26D035-33CB-70A4-F82D-7A26738CC726}"/>
-              </a:ext>
-            </a:extLst>
-          </p:cNvPr>
-          <p:cNvSpPr txBox="1">
-            <a:spLocks/>
-          </p:cNvSpPr>
-          <p:nvPr/>
-        </p:nvSpPr>
-        <p:spPr>
-          <a:xfrm>
-            <a:off x="6759973" y="2227923"/>
-            <a:ext cx="4107600" cy="4108359"/>
-          </a:xfrm>
-          <a:prstGeom prst="rect">
-            <a:avLst/>
-          </a:prstGeom>
-          <a:noFill/>
-        </p:spPr>
-        <p:txBody>
-          <a:bodyPr wrap="square" rtlCol="0">
-            <a:noAutofit/>
-          </a:bodyPr>
-          <a:lstStyle/>
-          <a:p>
-            <a:r>
-              <a:rPr lang="es-CL" dirty="0"/>
-              <a:t>CHART_PLACEHOLDER_1</a:t>
-            </a:r>
+              <a:rPr lang="es-CL" dirty="0" err="1"/>
+              <a:t>grafico_avance_global</a:t>
+            </a:r>
+            <a:endParaRPr lang="es-CL" dirty="0"/>
           </a:p>
         </p:txBody>
       </p:sp>
@@ -4076,8 +4012,8 @@
         </p:nvSpPr>
         <p:spPr>
           <a:xfrm>
-            <a:off x="678426" y="523257"/>
-            <a:ext cx="5417574" cy="584775"/>
+            <a:off x="7275024" y="530523"/>
+            <a:ext cx="4365524" cy="477054"/>
           </a:xfrm>
           <a:prstGeom prst="rect">
             <a:avLst/>
@@ -4091,7 +4027,7 @@
           <a:lstStyle/>
           <a:p>
             <a:r>
-              <a:rPr lang="es-CL" b="1" dirty="0">
+              <a:rPr lang="es-CL" sz="1400" b="1" dirty="0">
                 <a:solidFill>
                   <a:srgbClr val="F8B416"/>
                 </a:solidFill>
@@ -4103,7 +4039,7 @@
           </a:p>
           <a:p>
             <a:r>
-              <a:rPr lang="es-CL" sz="1400" b="1" dirty="0">
+              <a:rPr lang="es-CL" sz="1100" b="1" dirty="0">
                 <a:solidFill>
                   <a:schemeClr val="tx1">
                     <a:lumMod val="50000"/>
@@ -4116,11 +4052,11 @@
               <a:t>Tasa de respuestas por </a:t>
             </a:r>
             <a:r>
-              <a:rPr lang="es-CL" sz="1400" b="1" dirty="0">
+              <a:rPr lang="es-CL" sz="1100" b="1" dirty="0">
                 <a:latin typeface="Arial" panose="020B0604020202020204" pitchFamily="34" charset="0"/>
                 <a:cs typeface="Arial" panose="020B0604020202020204" pitchFamily="34" charset="0"/>
               </a:rPr>
-              <a:t>ESCUELA</a:t>
+              <a:t>SEDE</a:t>
             </a:r>
           </a:p>
         </p:txBody>
@@ -4153,7 +4089,7 @@
         </p:blipFill>
         <p:spPr>
           <a:xfrm>
-            <a:off x="8062451" y="693767"/>
+            <a:off x="7896147" y="5855033"/>
             <a:ext cx="1502645" cy="353122"/>
           </a:xfrm>
           <a:prstGeom prst="rect">
@@ -4189,7 +4125,7 @@
         </p:blipFill>
         <p:spPr>
           <a:xfrm>
-            <a:off x="9794655" y="693768"/>
+            <a:off x="9565096" y="5857536"/>
             <a:ext cx="1432628" cy="353122"/>
           </a:xfrm>
           <a:prstGeom prst="rect">
@@ -4211,8 +4147,8 @@
         </p:nvSpPr>
         <p:spPr>
           <a:xfrm>
-            <a:off x="5781368" y="1693294"/>
-            <a:ext cx="5732205" cy="432620"/>
+            <a:off x="6725264" y="1399761"/>
+            <a:ext cx="4788309" cy="432620"/>
           </a:xfrm>
           <a:prstGeom prst="rect">
             <a:avLst/>
@@ -4247,7 +4183,7 @@
                 <a:latin typeface="Arial" panose="020B0604020202020204" pitchFamily="34" charset="0"/>
                 <a:cs typeface="Arial" panose="020B0604020202020204" pitchFamily="34" charset="0"/>
               </a:rPr>
-              <a:t>Porcentaje de Avance por Escuela</a:t>
+              <a:t>Porcentaje de avance por sedes</a:t>
             </a:r>
           </a:p>
         </p:txBody>
@@ -4266,8 +4202,8 @@
         </p:nvSpPr>
         <p:spPr>
           <a:xfrm>
-            <a:off x="830825" y="1737691"/>
-            <a:ext cx="5112775" cy="4896776"/>
+            <a:off x="678426" y="618886"/>
+            <a:ext cx="6980903" cy="5589269"/>
           </a:xfrm>
           <a:prstGeom prst="rect">
             <a:avLst/>
@@ -4281,9 +4217,10 @@
           <a:lstStyle/>
           <a:p>
             <a:r>
-              <a:rPr lang="es-CL" dirty="0"/>
-              <a:t>TABLE_PLACEHOLDER_2</a:t>
-            </a:r>
+              <a:rPr lang="es-CL" dirty="0" err="1"/>
+              <a:t>tabla_avance_sedes</a:t>
+            </a:r>
+            <a:endParaRPr lang="es-CL" dirty="0"/>
           </a:p>
         </p:txBody>
       </p:sp>
@@ -4301,13 +4238,20 @@
         </p:nvSpPr>
         <p:spPr>
           <a:xfrm>
-            <a:off x="5781367" y="2263375"/>
-            <a:ext cx="4013287" cy="3663139"/>
+            <a:off x="6725264" y="1969843"/>
+            <a:ext cx="4788310" cy="3369074"/>
           </a:xfrm>
           <a:prstGeom prst="rect">
             <a:avLst/>
           </a:prstGeom>
           <a:noFill/>
+          <a:ln>
+            <a:solidFill>
+              <a:schemeClr val="bg2">
+                <a:lumMod val="50000"/>
+              </a:schemeClr>
+            </a:solidFill>
+          </a:ln>
         </p:spPr>
         <p:txBody>
           <a:bodyPr wrap="square" rtlCol="0">
@@ -4316,23 +4260,55 @@
           <a:lstStyle/>
           <a:p>
             <a:r>
-              <a:rPr lang="es-CL" dirty="0"/>
-              <a:t>CHART</a:t>
-            </a:r>
-            <a:r>
-              <a:rPr lang="es-CL"/>
-              <a:t>_PLACEHOLDER_2</a:t>
+              <a:rPr lang="es-CL" dirty="0" err="1"/>
+              <a:t>grafico_avance_sedes</a:t>
             </a:r>
             <a:endParaRPr lang="es-CL" dirty="0"/>
           </a:p>
         </p:txBody>
       </p:sp>
-      <p:sp>
-        <p:nvSpPr>
-          <p:cNvPr id="2" name="Rectángulo 1">
-            <a:extLst>
-              <a:ext uri="{FF2B5EF4-FFF2-40B4-BE49-F238E27FC236}">
-                <a16:creationId xmlns:a16="http://schemas.microsoft.com/office/drawing/2014/main" id="{8D0006BD-DFD7-7EBA-FCFF-ABC8FDAF4F61}"/>
+    </p:spTree>
+    <p:extLst>
+      <p:ext uri="{BB962C8B-B14F-4D97-AF65-F5344CB8AC3E}">
+        <p14:creationId xmlns:p14="http://schemas.microsoft.com/office/powerpoint/2010/main" val="704473501"/>
+      </p:ext>
+    </p:extLst>
+  </p:cSld>
+  <p:clrMapOvr>
+    <a:masterClrMapping/>
+  </p:clrMapOvr>
+</p:sld>
+</file>
+
+<file path=ppt/slides/slide3.xml><?xml version="1.0" encoding="utf-8"?>
+<p:sld xmlns:a="http://schemas.openxmlformats.org/drawingml/2006/main" xmlns:r="http://schemas.openxmlformats.org/officeDocument/2006/relationships" xmlns:p="http://schemas.openxmlformats.org/presentationml/2006/main">
+  <p:cSld>
+    <p:spTree>
+      <p:nvGrpSpPr>
+        <p:cNvPr id="1" name="">
+          <a:extLst>
+            <a:ext uri="{FF2B5EF4-FFF2-40B4-BE49-F238E27FC236}">
+              <a16:creationId xmlns:a16="http://schemas.microsoft.com/office/drawing/2014/main" id="{5FD21F72-639A-D400-1403-C3ED8B8448F0}"/>
+            </a:ext>
+          </a:extLst>
+        </p:cNvPr>
+        <p:cNvGrpSpPr/>
+        <p:nvPr/>
+      </p:nvGrpSpPr>
+      <p:grpSpPr>
+        <a:xfrm>
+          <a:off x="0" y="0"/>
+          <a:ext cx="0" cy="0"/>
+          <a:chOff x="0" y="0"/>
+          <a:chExt cx="0" cy="0"/>
+        </a:xfrm>
+      </p:grpSpPr>
+      <p:sp>
+        <p:nvSpPr>
+          <p:cNvPr id="5" name="Rectángulo 4">
+            <a:extLst>
+              <a:ext uri="{FF2B5EF4-FFF2-40B4-BE49-F238E27FC236}">
+                <a16:creationId xmlns:a16="http://schemas.microsoft.com/office/drawing/2014/main" id="{C75283A1-E651-EC36-CB4D-20B31AE6ABF5}"/>
               </a:ext>
             </a:extLst>
           </p:cNvPr>
@@ -4341,8 +4317,8 @@
         </p:nvSpPr>
         <p:spPr>
           <a:xfrm>
-            <a:off x="9966960" y="2605884"/>
-            <a:ext cx="121920" cy="127819"/>
+            <a:off x="678426" y="294968"/>
+            <a:ext cx="4168877" cy="127819"/>
           </a:xfrm>
           <a:prstGeom prst="rect">
             <a:avLst/>
@@ -4378,10 +4354,10 @@
       </p:sp>
       <p:sp>
         <p:nvSpPr>
-          <p:cNvPr id="3" name="Rectángulo 2">
-            <a:extLst>
-              <a:ext uri="{FF2B5EF4-FFF2-40B4-BE49-F238E27FC236}">
-                <a16:creationId xmlns:a16="http://schemas.microsoft.com/office/drawing/2014/main" id="{3ED2C11C-7F43-EC0B-3741-CE3524160574}"/>
+          <p:cNvPr id="6" name="Rectángulo 5">
+            <a:extLst>
+              <a:ext uri="{FF2B5EF4-FFF2-40B4-BE49-F238E27FC236}">
+                <a16:creationId xmlns:a16="http://schemas.microsoft.com/office/drawing/2014/main" id="{32B813EA-AA55-C3E0-8D03-BEC4403DB855}"/>
               </a:ext>
             </a:extLst>
           </p:cNvPr>
@@ -4390,14 +4366,14 @@
         </p:nvSpPr>
         <p:spPr>
           <a:xfrm>
-            <a:off x="9966960" y="2908716"/>
-            <a:ext cx="121920" cy="127819"/>
+            <a:off x="678426" y="6435213"/>
+            <a:ext cx="4168877" cy="127819"/>
           </a:xfrm>
           <a:prstGeom prst="rect">
             <a:avLst/>
           </a:prstGeom>
           <a:solidFill>
-            <a:srgbClr val="F78DA7"/>
+            <a:schemeClr val="tx1"/>
           </a:solidFill>
         </p:spPr>
         <p:style>
@@ -4427,10 +4403,10 @@
       </p:sp>
       <p:sp>
         <p:nvSpPr>
-          <p:cNvPr id="4" name="Rectángulo 3">
-            <a:extLst>
-              <a:ext uri="{FF2B5EF4-FFF2-40B4-BE49-F238E27FC236}">
-                <a16:creationId xmlns:a16="http://schemas.microsoft.com/office/drawing/2014/main" id="{8E363F21-5B21-025F-581B-D03235BFE9AD}"/>
+          <p:cNvPr id="7" name="Rectángulo 6">
+            <a:extLst>
+              <a:ext uri="{FF2B5EF4-FFF2-40B4-BE49-F238E27FC236}">
+                <a16:creationId xmlns:a16="http://schemas.microsoft.com/office/drawing/2014/main" id="{F88B10A1-08AE-0472-6A6B-2C5630CEE59F}"/>
               </a:ext>
             </a:extLst>
           </p:cNvPr>
@@ -4439,14 +4415,14 @@
         </p:nvSpPr>
         <p:spPr>
           <a:xfrm>
-            <a:off x="9966960" y="3213674"/>
-            <a:ext cx="121920" cy="127819"/>
+            <a:off x="4847303" y="294967"/>
+            <a:ext cx="6666271" cy="127819"/>
           </a:xfrm>
           <a:prstGeom prst="rect">
             <a:avLst/>
           </a:prstGeom>
           <a:solidFill>
-            <a:srgbClr val="CF2E2E"/>
+            <a:srgbClr val="F8B416"/>
           </a:solidFill>
         </p:spPr>
         <p:style>
@@ -4470,16 +4446,23 @@
           <a:lstStyle/>
           <a:p>
             <a:pPr algn="ctr"/>
-            <a:endParaRPr lang="es-CL"/>
-          </a:p>
-        </p:txBody>
-      </p:sp>
-      <p:sp>
-        <p:nvSpPr>
-          <p:cNvPr id="9" name="Rectángulo 8">
-            <a:extLst>
-              <a:ext uri="{FF2B5EF4-FFF2-40B4-BE49-F238E27FC236}">
-                <a16:creationId xmlns:a16="http://schemas.microsoft.com/office/drawing/2014/main" id="{BF421BF5-7AFB-AB2F-7738-A1ED9418A33B}"/>
+            <a:endParaRPr lang="es-CL" dirty="0">
+              <a:solidFill>
+                <a:srgbClr val="F8B416"/>
+              </a:solidFill>
+              <a:highlight>
+                <a:srgbClr val="FFFF00"/>
+              </a:highlight>
+            </a:endParaRPr>
+          </a:p>
+        </p:txBody>
+      </p:sp>
+      <p:sp>
+        <p:nvSpPr>
+          <p:cNvPr id="8" name="Rectángulo 7">
+            <a:extLst>
+              <a:ext uri="{FF2B5EF4-FFF2-40B4-BE49-F238E27FC236}">
+                <a16:creationId xmlns:a16="http://schemas.microsoft.com/office/drawing/2014/main" id="{639209E8-2B64-3646-254C-C039BC35AD4B}"/>
               </a:ext>
             </a:extLst>
           </p:cNvPr>
@@ -4488,14 +4471,14 @@
         </p:nvSpPr>
         <p:spPr>
           <a:xfrm>
-            <a:off x="9966960" y="3516506"/>
-            <a:ext cx="121920" cy="127819"/>
+            <a:off x="4847303" y="6435213"/>
+            <a:ext cx="6666271" cy="127819"/>
           </a:xfrm>
           <a:prstGeom prst="rect">
             <a:avLst/>
           </a:prstGeom>
           <a:solidFill>
-            <a:srgbClr val="FF6900"/>
+            <a:srgbClr val="F8B416"/>
           </a:solidFill>
         </p:spPr>
         <p:style>
@@ -4519,16 +4502,88 @@
           <a:lstStyle/>
           <a:p>
             <a:pPr algn="ctr"/>
-            <a:endParaRPr lang="es-CL" dirty="0"/>
-          </a:p>
-        </p:txBody>
-      </p:sp>
-      <p:sp>
-        <p:nvSpPr>
-          <p:cNvPr id="11" name="Rectángulo 10">
-            <a:extLst>
-              <a:ext uri="{FF2B5EF4-FFF2-40B4-BE49-F238E27FC236}">
-                <a16:creationId xmlns:a16="http://schemas.microsoft.com/office/drawing/2014/main" id="{8405F20B-9ED5-0103-62E2-43E5CBF4640E}"/>
+            <a:endParaRPr lang="es-CL"/>
+          </a:p>
+        </p:txBody>
+      </p:sp>
+      <p:pic>
+        <p:nvPicPr>
+          <p:cNvPr id="15" name="Imagen 14" descr="Imagen que contiene Texto&#10;&#10;El contenido generado por IA puede ser incorrecto.">
+            <a:extLst>
+              <a:ext uri="{FF2B5EF4-FFF2-40B4-BE49-F238E27FC236}">
+                <a16:creationId xmlns:a16="http://schemas.microsoft.com/office/drawing/2014/main" id="{815608A6-791C-04D3-5DC1-1637A6D50FF9}"/>
+              </a:ext>
+            </a:extLst>
+          </p:cNvPr>
+          <p:cNvPicPr>
+            <a:picLocks noChangeAspect="1"/>
+          </p:cNvPicPr>
+          <p:nvPr/>
+        </p:nvPicPr>
+        <p:blipFill>
+          <a:blip r:embed="rId2">
+            <a:extLst>
+              <a:ext uri="{28A0092B-C50C-407E-A947-70E740481C1C}">
+                <a14:useLocalDpi xmlns:a14="http://schemas.microsoft.com/office/drawing/2010/main" val="0"/>
+              </a:ext>
+            </a:extLst>
+          </a:blip>
+          <a:stretch>
+            <a:fillRect/>
+          </a:stretch>
+        </p:blipFill>
+        <p:spPr>
+          <a:xfrm>
+            <a:off x="7896147" y="5855033"/>
+            <a:ext cx="1502645" cy="353122"/>
+          </a:xfrm>
+          <a:prstGeom prst="rect">
+            <a:avLst/>
+          </a:prstGeom>
+        </p:spPr>
+      </p:pic>
+      <p:pic>
+        <p:nvPicPr>
+          <p:cNvPr id="17" name="Imagen 16" descr="Logotipo&#10;&#10;El contenido generado por IA puede ser incorrecto.">
+            <a:extLst>
+              <a:ext uri="{FF2B5EF4-FFF2-40B4-BE49-F238E27FC236}">
+                <a16:creationId xmlns:a16="http://schemas.microsoft.com/office/drawing/2014/main" id="{D96D96F8-E5D4-E07F-1B3C-D77D31EFAEAF}"/>
+              </a:ext>
+            </a:extLst>
+          </p:cNvPr>
+          <p:cNvPicPr>
+            <a:picLocks noChangeAspect="1"/>
+          </p:cNvPicPr>
+          <p:nvPr/>
+        </p:nvPicPr>
+        <p:blipFill>
+          <a:blip r:embed="rId3">
+            <a:extLst>
+              <a:ext uri="{28A0092B-C50C-407E-A947-70E740481C1C}">
+                <a14:useLocalDpi xmlns:a14="http://schemas.microsoft.com/office/drawing/2010/main" val="0"/>
+              </a:ext>
+            </a:extLst>
+          </a:blip>
+          <a:stretch>
+            <a:fillRect/>
+          </a:stretch>
+        </p:blipFill>
+        <p:spPr>
+          <a:xfrm>
+            <a:off x="9565096" y="5857536"/>
+            <a:ext cx="1432628" cy="353122"/>
+          </a:xfrm>
+          <a:prstGeom prst="rect">
+            <a:avLst/>
+          </a:prstGeom>
+        </p:spPr>
+      </p:pic>
+      <p:sp>
+        <p:nvSpPr>
+          <p:cNvPr id="18" name="Rectángulo 17">
+            <a:extLst>
+              <a:ext uri="{FF2B5EF4-FFF2-40B4-BE49-F238E27FC236}">
+                <a16:creationId xmlns:a16="http://schemas.microsoft.com/office/drawing/2014/main" id="{A4E72236-EF0B-9BBC-7B1C-47CDBF4C72F9}"/>
               </a:ext>
             </a:extLst>
           </p:cNvPr>
@@ -4537,14 +4592,14 @@
         </p:nvSpPr>
         <p:spPr>
           <a:xfrm>
-            <a:off x="9966960" y="3819338"/>
-            <a:ext cx="121920" cy="127819"/>
+            <a:off x="5781369" y="1399761"/>
+            <a:ext cx="5732205" cy="432620"/>
           </a:xfrm>
           <a:prstGeom prst="rect">
             <a:avLst/>
           </a:prstGeom>
           <a:solidFill>
-            <a:srgbClr val="FCB900"/>
+            <a:schemeClr val="tx1"/>
           </a:solidFill>
         </p:spPr>
         <p:style>
@@ -4568,16 +4623,200 @@
           <a:lstStyle/>
           <a:p>
             <a:pPr algn="ctr"/>
+            <a:r>
+              <a:rPr lang="es-CL" b="1" dirty="0">
+                <a:latin typeface="Arial" panose="020B0604020202020204" pitchFamily="34" charset="0"/>
+                <a:cs typeface="Arial" panose="020B0604020202020204" pitchFamily="34" charset="0"/>
+              </a:rPr>
+              <a:t>Porcentaje de avance escuela</a:t>
+            </a:r>
+          </a:p>
+        </p:txBody>
+      </p:sp>
+      <p:sp>
+        <p:nvSpPr>
+          <p:cNvPr id="21" name="CuadroTexto 20">
+            <a:extLst>
+              <a:ext uri="{FF2B5EF4-FFF2-40B4-BE49-F238E27FC236}">
+                <a16:creationId xmlns:a16="http://schemas.microsoft.com/office/drawing/2014/main" id="{EB627756-59F3-1483-B6BB-A9824B46A370}"/>
+              </a:ext>
+            </a:extLst>
+          </p:cNvPr>
+          <p:cNvSpPr txBox="1"/>
+          <p:nvPr/>
+        </p:nvSpPr>
+        <p:spPr>
+          <a:xfrm>
+            <a:off x="1061886" y="1399761"/>
+            <a:ext cx="4936638" cy="5215933"/>
+          </a:xfrm>
+          <a:prstGeom prst="rect">
+            <a:avLst/>
+          </a:prstGeom>
+          <a:noFill/>
+        </p:spPr>
+        <p:txBody>
+          <a:bodyPr wrap="square" rtlCol="0">
+            <a:noAutofit/>
+          </a:bodyPr>
+          <a:lstStyle/>
+          <a:p>
+            <a:r>
+              <a:rPr lang="es-CL" dirty="0" err="1"/>
+              <a:t>tabla_avance_escuelas</a:t>
+            </a:r>
             <a:endParaRPr lang="es-CL" dirty="0"/>
           </a:p>
         </p:txBody>
       </p:sp>
       <p:sp>
         <p:nvSpPr>
-          <p:cNvPr id="12" name="Rectángulo 11">
-            <a:extLst>
-              <a:ext uri="{FF2B5EF4-FFF2-40B4-BE49-F238E27FC236}">
-                <a16:creationId xmlns:a16="http://schemas.microsoft.com/office/drawing/2014/main" id="{3E1C6FE4-B727-26EC-2DC1-36AC8ADF6880}"/>
+          <p:cNvPr id="22" name="CuadroTexto 21">
+            <a:extLst>
+              <a:ext uri="{FF2B5EF4-FFF2-40B4-BE49-F238E27FC236}">
+                <a16:creationId xmlns:a16="http://schemas.microsoft.com/office/drawing/2014/main" id="{BCB0B142-10B0-A0DE-B2FE-FDB39243A0A8}"/>
+              </a:ext>
+            </a:extLst>
+          </p:cNvPr>
+          <p:cNvSpPr txBox="1"/>
+          <p:nvPr/>
+        </p:nvSpPr>
+        <p:spPr>
+          <a:xfrm>
+            <a:off x="5781368" y="1969842"/>
+            <a:ext cx="5732205" cy="3663139"/>
+          </a:xfrm>
+          <a:prstGeom prst="rect">
+            <a:avLst/>
+          </a:prstGeom>
+          <a:noFill/>
+          <a:ln>
+            <a:solidFill>
+              <a:schemeClr val="bg2">
+                <a:lumMod val="50000"/>
+              </a:schemeClr>
+            </a:solidFill>
+          </a:ln>
+        </p:spPr>
+        <p:txBody>
+          <a:bodyPr wrap="square" rtlCol="0">
+            <a:noAutofit/>
+          </a:bodyPr>
+          <a:lstStyle/>
+          <a:p>
+            <a:r>
+              <a:rPr lang="es-CL" dirty="0" err="1"/>
+              <a:t>grafico_avance_escuelas</a:t>
+            </a:r>
+            <a:endParaRPr lang="es-CL" dirty="0"/>
+          </a:p>
+        </p:txBody>
+      </p:sp>
+      <p:sp>
+        <p:nvSpPr>
+          <p:cNvPr id="2" name="CuadroTexto 1">
+            <a:extLst>
+              <a:ext uri="{FF2B5EF4-FFF2-40B4-BE49-F238E27FC236}">
+                <a16:creationId xmlns:a16="http://schemas.microsoft.com/office/drawing/2014/main" id="{6BEDBDD7-B688-F34D-CFEA-9815F73DF71C}"/>
+              </a:ext>
+            </a:extLst>
+          </p:cNvPr>
+          <p:cNvSpPr txBox="1"/>
+          <p:nvPr/>
+        </p:nvSpPr>
+        <p:spPr>
+          <a:xfrm>
+            <a:off x="7275024" y="530523"/>
+            <a:ext cx="4365524" cy="477054"/>
+          </a:xfrm>
+          <a:prstGeom prst="rect">
+            <a:avLst/>
+          </a:prstGeom>
+          <a:noFill/>
+        </p:spPr>
+        <p:txBody>
+          <a:bodyPr wrap="square" rtlCol="0">
+            <a:spAutoFit/>
+          </a:bodyPr>
+          <a:lstStyle/>
+          <a:p>
+            <a:r>
+              <a:rPr lang="es-CL" sz="1400" b="1" dirty="0">
+                <a:solidFill>
+                  <a:srgbClr val="F8B416"/>
+                </a:solidFill>
+                <a:latin typeface="Arial" panose="020B0604020202020204" pitchFamily="34" charset="0"/>
+                <a:cs typeface="Arial" panose="020B0604020202020204" pitchFamily="34" charset="0"/>
+              </a:rPr>
+              <a:t>RADIOGRAFÍA DEL BIENESTAR DUOC UC 2025</a:t>
+            </a:r>
+          </a:p>
+          <a:p>
+            <a:r>
+              <a:rPr lang="es-CL" sz="1100" b="1" dirty="0">
+                <a:solidFill>
+                  <a:schemeClr val="tx1">
+                    <a:lumMod val="50000"/>
+                    <a:lumOff val="50000"/>
+                  </a:schemeClr>
+                </a:solidFill>
+                <a:latin typeface="Arial" panose="020B0604020202020204" pitchFamily="34" charset="0"/>
+                <a:cs typeface="Arial" panose="020B0604020202020204" pitchFamily="34" charset="0"/>
+              </a:rPr>
+              <a:t>Tasa de respuestas por </a:t>
+            </a:r>
+            <a:r>
+              <a:rPr lang="es-CL" sz="1100" b="1" dirty="0">
+                <a:latin typeface="Arial" panose="020B0604020202020204" pitchFamily="34" charset="0"/>
+                <a:cs typeface="Arial" panose="020B0604020202020204" pitchFamily="34" charset="0"/>
+              </a:rPr>
+              <a:t>ESCUELA</a:t>
+            </a:r>
+          </a:p>
+        </p:txBody>
+      </p:sp>
+    </p:spTree>
+    <p:extLst>
+      <p:ext uri="{BB962C8B-B14F-4D97-AF65-F5344CB8AC3E}">
+        <p14:creationId xmlns:p14="http://schemas.microsoft.com/office/powerpoint/2010/main" val="427825150"/>
+      </p:ext>
+    </p:extLst>
+  </p:cSld>
+  <p:clrMapOvr>
+    <a:masterClrMapping/>
+  </p:clrMapOvr>
+</p:sld>
+</file>
+
+<file path=ppt/slides/slide4.xml><?xml version="1.0" encoding="utf-8"?>
+<p:sld xmlns:a="http://schemas.openxmlformats.org/drawingml/2006/main" xmlns:r="http://schemas.openxmlformats.org/officeDocument/2006/relationships" xmlns:p="http://schemas.openxmlformats.org/presentationml/2006/main">
+  <p:cSld>
+    <p:spTree>
+      <p:nvGrpSpPr>
+        <p:cNvPr id="1" name="">
+          <a:extLst>
+            <a:ext uri="{FF2B5EF4-FFF2-40B4-BE49-F238E27FC236}">
+              <a16:creationId xmlns:a16="http://schemas.microsoft.com/office/drawing/2014/main" id="{8BBDB7BE-2CC9-00C3-7306-C18BB9A89430}"/>
+            </a:ext>
+          </a:extLst>
+        </p:cNvPr>
+        <p:cNvGrpSpPr/>
+        <p:nvPr/>
+      </p:nvGrpSpPr>
+      <p:grpSpPr>
+        <a:xfrm>
+          <a:off x="0" y="0"/>
+          <a:ext cx="0" cy="0"/>
+          <a:chOff x="0" y="0"/>
+          <a:chExt cx="0" cy="0"/>
+        </a:xfrm>
+      </p:grpSpPr>
+      <p:sp>
+        <p:nvSpPr>
+          <p:cNvPr id="5" name="Rectángulo 4">
+            <a:extLst>
+              <a:ext uri="{FF2B5EF4-FFF2-40B4-BE49-F238E27FC236}">
+                <a16:creationId xmlns:a16="http://schemas.microsoft.com/office/drawing/2014/main" id="{D690F53B-8732-9638-2211-A111EA81125A}"/>
               </a:ext>
             </a:extLst>
           </p:cNvPr>
@@ -4586,14 +4825,14 @@
         </p:nvSpPr>
         <p:spPr>
           <a:xfrm>
-            <a:off x="9966960" y="4122170"/>
-            <a:ext cx="121920" cy="127819"/>
+            <a:off x="678426" y="294968"/>
+            <a:ext cx="4168877" cy="127819"/>
           </a:xfrm>
           <a:prstGeom prst="rect">
             <a:avLst/>
           </a:prstGeom>
           <a:solidFill>
-            <a:srgbClr val="7BDCB5"/>
+            <a:schemeClr val="tx1"/>
           </a:solidFill>
         </p:spPr>
         <p:style>
@@ -4617,16 +4856,16 @@
           <a:lstStyle/>
           <a:p>
             <a:pPr algn="ctr"/>
-            <a:endParaRPr lang="es-CL" dirty="0"/>
-          </a:p>
-        </p:txBody>
-      </p:sp>
-      <p:sp>
-        <p:nvSpPr>
-          <p:cNvPr id="13" name="Rectángulo 12">
-            <a:extLst>
-              <a:ext uri="{FF2B5EF4-FFF2-40B4-BE49-F238E27FC236}">
-                <a16:creationId xmlns:a16="http://schemas.microsoft.com/office/drawing/2014/main" id="{EE10F1C4-B6F5-0F64-BAEF-CD4DF57D6729}"/>
+            <a:endParaRPr lang="es-CL"/>
+          </a:p>
+        </p:txBody>
+      </p:sp>
+      <p:sp>
+        <p:nvSpPr>
+          <p:cNvPr id="6" name="Rectángulo 5">
+            <a:extLst>
+              <a:ext uri="{FF2B5EF4-FFF2-40B4-BE49-F238E27FC236}">
+                <a16:creationId xmlns:a16="http://schemas.microsoft.com/office/drawing/2014/main" id="{B573767B-08EB-17B1-4AAE-2059D60ABDE7}"/>
               </a:ext>
             </a:extLst>
           </p:cNvPr>
@@ -4635,14 +4874,14 @@
         </p:nvSpPr>
         <p:spPr>
           <a:xfrm>
-            <a:off x="9966960" y="4425002"/>
-            <a:ext cx="121920" cy="127819"/>
+            <a:off x="678426" y="6435213"/>
+            <a:ext cx="4168877" cy="127819"/>
           </a:xfrm>
           <a:prstGeom prst="rect">
             <a:avLst/>
           </a:prstGeom>
           <a:solidFill>
-            <a:srgbClr val="00D084"/>
+            <a:schemeClr val="tx1"/>
           </a:solidFill>
         </p:spPr>
         <p:style>
@@ -4666,16 +4905,16 @@
           <a:lstStyle/>
           <a:p>
             <a:pPr algn="ctr"/>
-            <a:endParaRPr lang="es-CL" dirty="0"/>
-          </a:p>
-        </p:txBody>
-      </p:sp>
-      <p:sp>
-        <p:nvSpPr>
-          <p:cNvPr id="14" name="Rectángulo 13">
-            <a:extLst>
-              <a:ext uri="{FF2B5EF4-FFF2-40B4-BE49-F238E27FC236}">
-                <a16:creationId xmlns:a16="http://schemas.microsoft.com/office/drawing/2014/main" id="{C7203CC1-50E4-C2FD-CB74-C4D02F6F1F11}"/>
+            <a:endParaRPr lang="es-CL"/>
+          </a:p>
+        </p:txBody>
+      </p:sp>
+      <p:sp>
+        <p:nvSpPr>
+          <p:cNvPr id="7" name="Rectángulo 6">
+            <a:extLst>
+              <a:ext uri="{FF2B5EF4-FFF2-40B4-BE49-F238E27FC236}">
+                <a16:creationId xmlns:a16="http://schemas.microsoft.com/office/drawing/2014/main" id="{A4057927-E0B7-EFFA-992D-51130F4A26B0}"/>
               </a:ext>
             </a:extLst>
           </p:cNvPr>
@@ -4684,14 +4923,14 @@
         </p:nvSpPr>
         <p:spPr>
           <a:xfrm>
-            <a:off x="9966960" y="4727834"/>
-            <a:ext cx="121920" cy="127819"/>
+            <a:off x="4847303" y="294967"/>
+            <a:ext cx="6666271" cy="127819"/>
           </a:xfrm>
           <a:prstGeom prst="rect">
             <a:avLst/>
           </a:prstGeom>
           <a:solidFill>
-            <a:srgbClr val="8ED1FC"/>
+            <a:srgbClr val="F8B416"/>
           </a:solidFill>
         </p:spPr>
         <p:style>
@@ -4715,16 +4954,23 @@
           <a:lstStyle/>
           <a:p>
             <a:pPr algn="ctr"/>
-            <a:endParaRPr lang="es-CL" dirty="0"/>
-          </a:p>
-        </p:txBody>
-      </p:sp>
-      <p:sp>
-        <p:nvSpPr>
-          <p:cNvPr id="16" name="Rectángulo 15">
-            <a:extLst>
-              <a:ext uri="{FF2B5EF4-FFF2-40B4-BE49-F238E27FC236}">
-                <a16:creationId xmlns:a16="http://schemas.microsoft.com/office/drawing/2014/main" id="{CBEE36F3-FBC6-0D9F-D5F8-50C21A3F5E9F}"/>
+            <a:endParaRPr lang="es-CL" dirty="0">
+              <a:solidFill>
+                <a:srgbClr val="F8B416"/>
+              </a:solidFill>
+              <a:highlight>
+                <a:srgbClr val="FFFF00"/>
+              </a:highlight>
+            </a:endParaRPr>
+          </a:p>
+        </p:txBody>
+      </p:sp>
+      <p:sp>
+        <p:nvSpPr>
+          <p:cNvPr id="8" name="Rectángulo 7">
+            <a:extLst>
+              <a:ext uri="{FF2B5EF4-FFF2-40B4-BE49-F238E27FC236}">
+                <a16:creationId xmlns:a16="http://schemas.microsoft.com/office/drawing/2014/main" id="{841128F9-A902-2B20-DCC3-5C3E1DC500B5}"/>
               </a:ext>
             </a:extLst>
           </p:cNvPr>
@@ -4733,12 +4979,15 @@
         </p:nvSpPr>
         <p:spPr>
           <a:xfrm>
-            <a:off x="9966960" y="5036887"/>
-            <a:ext cx="121920" cy="127819"/>
+            <a:off x="4847303" y="6435213"/>
+            <a:ext cx="6666271" cy="127819"/>
           </a:xfrm>
           <a:prstGeom prst="rect">
             <a:avLst/>
           </a:prstGeom>
+          <a:solidFill>
+            <a:srgbClr val="F8B416"/>
+          </a:solidFill>
         </p:spPr>
         <p:style>
           <a:lnRef idx="2">
@@ -4761,16 +5010,16 @@
           <a:lstStyle/>
           <a:p>
             <a:pPr algn="ctr"/>
-            <a:endParaRPr lang="es-CL" dirty="0"/>
-          </a:p>
-        </p:txBody>
-      </p:sp>
-      <p:sp>
-        <p:nvSpPr>
-          <p:cNvPr id="19" name="CuadroTexto 18">
-            <a:extLst>
-              <a:ext uri="{FF2B5EF4-FFF2-40B4-BE49-F238E27FC236}">
-                <a16:creationId xmlns:a16="http://schemas.microsoft.com/office/drawing/2014/main" id="{162C8C40-1DF8-2252-7ACF-95D0B49D2A6F}"/>
+            <a:endParaRPr lang="es-CL"/>
+          </a:p>
+        </p:txBody>
+      </p:sp>
+      <p:sp>
+        <p:nvSpPr>
+          <p:cNvPr id="10" name="CuadroTexto 9">
+            <a:extLst>
+              <a:ext uri="{FF2B5EF4-FFF2-40B4-BE49-F238E27FC236}">
+                <a16:creationId xmlns:a16="http://schemas.microsoft.com/office/drawing/2014/main" id="{9FFA73CD-5A51-7FDE-D803-AFEA30DB018C}"/>
               </a:ext>
             </a:extLst>
           </p:cNvPr>
@@ -4779,8 +5028,8 @@
         </p:nvSpPr>
         <p:spPr>
           <a:xfrm>
-            <a:off x="10150699" y="2562072"/>
-            <a:ext cx="1398140" cy="215444"/>
+            <a:off x="678426" y="523257"/>
+            <a:ext cx="5996694" cy="923330"/>
           </a:xfrm>
           <a:prstGeom prst="rect">
             <a:avLst/>
@@ -4788,37 +5037,145 @@
           <a:noFill/>
         </p:spPr>
         <p:txBody>
-          <a:bodyPr wrap="none" rtlCol="0">
+          <a:bodyPr wrap="square" rtlCol="0">
             <a:spAutoFit/>
           </a:bodyPr>
           <a:lstStyle/>
           <a:p>
             <a:r>
-              <a:rPr lang="es-CL" sz="800" dirty="0">
+              <a:rPr lang="es-CL" b="1" dirty="0">
+                <a:solidFill>
+                  <a:srgbClr val="F8B416"/>
+                </a:solidFill>
                 <a:latin typeface="Arial" panose="020B0604020202020204" pitchFamily="34" charset="0"/>
                 <a:cs typeface="Arial" panose="020B0604020202020204" pitchFamily="34" charset="0"/>
               </a:rPr>
-              <a:t>Administración y Negocios</a:t>
-            </a:r>
-          </a:p>
-        </p:txBody>
-      </p:sp>
-      <p:sp>
-        <p:nvSpPr>
-          <p:cNvPr id="23" name="CuadroTexto 22">
-            <a:extLst>
-              <a:ext uri="{FF2B5EF4-FFF2-40B4-BE49-F238E27FC236}">
-                <a16:creationId xmlns:a16="http://schemas.microsoft.com/office/drawing/2014/main" id="{11193A91-E58A-45DF-1778-490B4BFDF212}"/>
-              </a:ext>
-            </a:extLst>
-          </p:cNvPr>
-          <p:cNvSpPr txBox="1"/>
+              <a:t>RADIOGRAFÍA DEL BIENESTAR DUOC UC 2025</a:t>
+            </a:r>
+          </a:p>
+          <a:p>
+            <a:r>
+              <a:rPr lang="es-CL" b="1" dirty="0">
+                <a:solidFill>
+                  <a:schemeClr val="tx1">
+                    <a:lumMod val="50000"/>
+                    <a:lumOff val="50000"/>
+                  </a:schemeClr>
+                </a:solidFill>
+                <a:latin typeface="Arial" panose="020B0604020202020204" pitchFamily="34" charset="0"/>
+                <a:cs typeface="Arial" panose="020B0604020202020204" pitchFamily="34" charset="0"/>
+              </a:rPr>
+              <a:t>Tasa de respuestas por </a:t>
+            </a:r>
+            <a:r>
+              <a:rPr lang="es-CL" b="1" dirty="0">
+                <a:latin typeface="Arial" panose="020B0604020202020204" pitchFamily="34" charset="0"/>
+                <a:cs typeface="Arial" panose="020B0604020202020204" pitchFamily="34" charset="0"/>
+              </a:rPr>
+              <a:t>ESCUELA EN CADA SEDE</a:t>
+            </a:r>
+          </a:p>
+          <a:p>
+            <a:endParaRPr lang="es-CL" b="1" dirty="0">
+              <a:solidFill>
+                <a:srgbClr val="F8B416"/>
+              </a:solidFill>
+              <a:latin typeface="Arial" panose="020B0604020202020204" pitchFamily="34" charset="0"/>
+              <a:cs typeface="Arial" panose="020B0604020202020204" pitchFamily="34" charset="0"/>
+            </a:endParaRPr>
+          </a:p>
+        </p:txBody>
+      </p:sp>
+      <p:pic>
+        <p:nvPicPr>
+          <p:cNvPr id="15" name="Imagen 14" descr="Imagen que contiene Texto&#10;&#10;El contenido generado por IA puede ser incorrecto.">
+            <a:extLst>
+              <a:ext uri="{FF2B5EF4-FFF2-40B4-BE49-F238E27FC236}">
+                <a16:creationId xmlns:a16="http://schemas.microsoft.com/office/drawing/2014/main" id="{1009EBEC-7B46-BD65-BBC1-607E5A70AFCF}"/>
+              </a:ext>
+            </a:extLst>
+          </p:cNvPr>
+          <p:cNvPicPr>
+            <a:picLocks noChangeAspect="1"/>
+          </p:cNvPicPr>
           <p:nvPr/>
-        </p:nvSpPr>
-        <p:spPr>
-          <a:xfrm>
-            <a:off x="10150699" y="2867105"/>
-            <a:ext cx="837089" cy="215444"/>
+        </p:nvPicPr>
+        <p:blipFill>
+          <a:blip r:embed="rId2">
+            <a:extLst>
+              <a:ext uri="{28A0092B-C50C-407E-A947-70E740481C1C}">
+                <a14:useLocalDpi xmlns:a14="http://schemas.microsoft.com/office/drawing/2010/main" val="0"/>
+              </a:ext>
+            </a:extLst>
+          </a:blip>
+          <a:stretch>
+            <a:fillRect/>
+          </a:stretch>
+        </p:blipFill>
+        <p:spPr>
+          <a:xfrm>
+            <a:off x="8062451" y="693767"/>
+            <a:ext cx="1502645" cy="353122"/>
+          </a:xfrm>
+          <a:prstGeom prst="rect">
+            <a:avLst/>
+          </a:prstGeom>
+        </p:spPr>
+      </p:pic>
+      <p:pic>
+        <p:nvPicPr>
+          <p:cNvPr id="17" name="Imagen 16" descr="Logotipo&#10;&#10;El contenido generado por IA puede ser incorrecto.">
+            <a:extLst>
+              <a:ext uri="{FF2B5EF4-FFF2-40B4-BE49-F238E27FC236}">
+                <a16:creationId xmlns:a16="http://schemas.microsoft.com/office/drawing/2014/main" id="{AE985C7F-7FA5-017B-EF37-9463116024D5}"/>
+              </a:ext>
+            </a:extLst>
+          </p:cNvPr>
+          <p:cNvPicPr>
+            <a:picLocks noChangeAspect="1"/>
+          </p:cNvPicPr>
+          <p:nvPr/>
+        </p:nvPicPr>
+        <p:blipFill>
+          <a:blip r:embed="rId3">
+            <a:extLst>
+              <a:ext uri="{28A0092B-C50C-407E-A947-70E740481C1C}">
+                <a14:useLocalDpi xmlns:a14="http://schemas.microsoft.com/office/drawing/2010/main" val="0"/>
+              </a:ext>
+            </a:extLst>
+          </a:blip>
+          <a:stretch>
+            <a:fillRect/>
+          </a:stretch>
+        </p:blipFill>
+        <p:spPr>
+          <a:xfrm>
+            <a:off x="9794655" y="693768"/>
+            <a:ext cx="1432628" cy="353122"/>
+          </a:xfrm>
+          <a:prstGeom prst="rect">
+            <a:avLst/>
+          </a:prstGeom>
+        </p:spPr>
+      </p:pic>
+      <p:sp>
+        <p:nvSpPr>
+          <p:cNvPr id="22" name="CuadroTexto 21">
+            <a:extLst>
+              <a:ext uri="{FF2B5EF4-FFF2-40B4-BE49-F238E27FC236}">
+                <a16:creationId xmlns:a16="http://schemas.microsoft.com/office/drawing/2014/main" id="{D05CA286-B5D2-CCC1-15D7-335C7455A000}"/>
+              </a:ext>
+            </a:extLst>
+          </p:cNvPr>
+          <p:cNvSpPr txBox="1">
+            <a:spLocks/>
+          </p:cNvSpPr>
+          <p:nvPr/>
+        </p:nvSpPr>
+        <p:spPr>
+          <a:xfrm>
+            <a:off x="1622973" y="1702750"/>
+            <a:ext cx="8171682" cy="4108359"/>
           </a:xfrm>
           <a:prstGeom prst="rect">
             <a:avLst/>
@@ -4826,291 +5183,23 @@
           <a:noFill/>
         </p:spPr>
         <p:txBody>
-          <a:bodyPr wrap="none" rtlCol="0">
-            <a:spAutoFit/>
+          <a:bodyPr wrap="square" rtlCol="0">
+            <a:noAutofit/>
           </a:bodyPr>
           <a:lstStyle/>
           <a:p>
             <a:r>
-              <a:rPr lang="es-CL" sz="800" dirty="0">
-                <a:latin typeface="Arial" panose="020B0604020202020204" pitchFamily="34" charset="0"/>
-                <a:cs typeface="Arial" panose="020B0604020202020204" pitchFamily="34" charset="0"/>
-              </a:rPr>
-              <a:t>Comunicación</a:t>
-            </a:r>
-          </a:p>
-        </p:txBody>
-      </p:sp>
-      <p:sp>
-        <p:nvSpPr>
-          <p:cNvPr id="24" name="CuadroTexto 23">
-            <a:extLst>
-              <a:ext uri="{FF2B5EF4-FFF2-40B4-BE49-F238E27FC236}">
-                <a16:creationId xmlns:a16="http://schemas.microsoft.com/office/drawing/2014/main" id="{EFDCA0E1-33C0-DF63-438D-51A7C04F09E4}"/>
-              </a:ext>
-            </a:extLst>
-          </p:cNvPr>
-          <p:cNvSpPr txBox="1"/>
-          <p:nvPr/>
-        </p:nvSpPr>
-        <p:spPr>
-          <a:xfrm>
-            <a:off x="10150699" y="3167736"/>
-            <a:ext cx="787395" cy="215444"/>
-          </a:xfrm>
-          <a:prstGeom prst="rect">
-            <a:avLst/>
-          </a:prstGeom>
-          <a:noFill/>
-        </p:spPr>
-        <p:txBody>
-          <a:bodyPr wrap="none" rtlCol="0">
-            <a:spAutoFit/>
-          </a:bodyPr>
-          <a:lstStyle/>
-          <a:p>
-            <a:r>
-              <a:rPr lang="es-CL" sz="800" dirty="0">
-                <a:latin typeface="Arial" panose="020B0604020202020204" pitchFamily="34" charset="0"/>
-                <a:cs typeface="Arial" panose="020B0604020202020204" pitchFamily="34" charset="0"/>
-              </a:rPr>
-              <a:t>Construcción</a:t>
-            </a:r>
-          </a:p>
-        </p:txBody>
-      </p:sp>
-      <p:sp>
-        <p:nvSpPr>
-          <p:cNvPr id="25" name="CuadroTexto 24">
-            <a:extLst>
-              <a:ext uri="{FF2B5EF4-FFF2-40B4-BE49-F238E27FC236}">
-                <a16:creationId xmlns:a16="http://schemas.microsoft.com/office/drawing/2014/main" id="{1D3598BD-2617-5C5F-F9D6-387490C95E7B}"/>
-              </a:ext>
-            </a:extLst>
-          </p:cNvPr>
-          <p:cNvSpPr txBox="1"/>
-          <p:nvPr/>
-        </p:nvSpPr>
-        <p:spPr>
-          <a:xfrm>
-            <a:off x="10150699" y="3467481"/>
-            <a:ext cx="505267" cy="215444"/>
-          </a:xfrm>
-          <a:prstGeom prst="rect">
-            <a:avLst/>
-          </a:prstGeom>
-          <a:noFill/>
-        </p:spPr>
-        <p:txBody>
-          <a:bodyPr wrap="none" rtlCol="0">
-            <a:spAutoFit/>
-          </a:bodyPr>
-          <a:lstStyle/>
-          <a:p>
-            <a:r>
-              <a:rPr lang="es-CL" sz="800" dirty="0">
-                <a:latin typeface="Arial" panose="020B0604020202020204" pitchFamily="34" charset="0"/>
-                <a:cs typeface="Arial" panose="020B0604020202020204" pitchFamily="34" charset="0"/>
-              </a:rPr>
-              <a:t>Diseño</a:t>
-            </a:r>
-          </a:p>
-        </p:txBody>
-      </p:sp>
-      <p:sp>
-        <p:nvSpPr>
-          <p:cNvPr id="26" name="CuadroTexto 25">
-            <a:extLst>
-              <a:ext uri="{FF2B5EF4-FFF2-40B4-BE49-F238E27FC236}">
-                <a16:creationId xmlns:a16="http://schemas.microsoft.com/office/drawing/2014/main" id="{B723A014-AEDD-DF01-66FF-159FFD051835}"/>
-              </a:ext>
-            </a:extLst>
-          </p:cNvPr>
-          <p:cNvSpPr txBox="1"/>
-          <p:nvPr/>
-        </p:nvSpPr>
-        <p:spPr>
-          <a:xfrm>
-            <a:off x="10150699" y="3775450"/>
-            <a:ext cx="1742785" cy="215444"/>
-          </a:xfrm>
-          <a:prstGeom prst="rect">
-            <a:avLst/>
-          </a:prstGeom>
-          <a:noFill/>
-        </p:spPr>
-        <p:txBody>
-          <a:bodyPr wrap="none" rtlCol="0">
-            <a:spAutoFit/>
-          </a:bodyPr>
-          <a:lstStyle/>
-          <a:p>
-            <a:r>
-              <a:rPr lang="es-CL" sz="800" dirty="0">
-                <a:latin typeface="Arial" panose="020B0604020202020204" pitchFamily="34" charset="0"/>
-                <a:cs typeface="Arial" panose="020B0604020202020204" pitchFamily="34" charset="0"/>
-              </a:rPr>
-              <a:t>Informática y Telecomunicaciones</a:t>
-            </a:r>
-          </a:p>
-        </p:txBody>
-      </p:sp>
-      <p:sp>
-        <p:nvSpPr>
-          <p:cNvPr id="27" name="CuadroTexto 26">
-            <a:extLst>
-              <a:ext uri="{FF2B5EF4-FFF2-40B4-BE49-F238E27FC236}">
-                <a16:creationId xmlns:a16="http://schemas.microsoft.com/office/drawing/2014/main" id="{06AE9C65-C167-96E8-F427-692B9DC3084C}"/>
-              </a:ext>
-            </a:extLst>
-          </p:cNvPr>
-          <p:cNvSpPr txBox="1"/>
-          <p:nvPr/>
-        </p:nvSpPr>
-        <p:spPr>
-          <a:xfrm>
-            <a:off x="10150699" y="4016802"/>
-            <a:ext cx="1955957" cy="338554"/>
-          </a:xfrm>
-          <a:prstGeom prst="rect">
-            <a:avLst/>
-          </a:prstGeom>
-          <a:noFill/>
-        </p:spPr>
-        <p:txBody>
-          <a:bodyPr wrap="square" rtlCol="0">
-            <a:spAutoFit/>
-          </a:bodyPr>
-          <a:lstStyle/>
-          <a:p>
-            <a:r>
-              <a:rPr lang="es-CL" sz="800" dirty="0">
-                <a:latin typeface="Arial" panose="020B0604020202020204" pitchFamily="34" charset="0"/>
-                <a:cs typeface="Arial" panose="020B0604020202020204" pitchFamily="34" charset="0"/>
-              </a:rPr>
-              <a:t>Ingeniería, Medio Ambiente y Recursos Naturales</a:t>
-            </a:r>
-          </a:p>
-        </p:txBody>
-      </p:sp>
-      <p:sp>
-        <p:nvSpPr>
-          <p:cNvPr id="28" name="CuadroTexto 27">
-            <a:extLst>
-              <a:ext uri="{FF2B5EF4-FFF2-40B4-BE49-F238E27FC236}">
-                <a16:creationId xmlns:a16="http://schemas.microsoft.com/office/drawing/2014/main" id="{AA996899-21D2-7BCA-4F40-B892823B0C8E}"/>
-              </a:ext>
-            </a:extLst>
-          </p:cNvPr>
-          <p:cNvSpPr txBox="1"/>
-          <p:nvPr/>
-        </p:nvSpPr>
-        <p:spPr>
-          <a:xfrm>
-            <a:off x="10150699" y="4381189"/>
-            <a:ext cx="1088760" cy="215444"/>
-          </a:xfrm>
-          <a:prstGeom prst="rect">
-            <a:avLst/>
-          </a:prstGeom>
-          <a:noFill/>
-        </p:spPr>
-        <p:txBody>
-          <a:bodyPr wrap="none" rtlCol="0">
-            <a:spAutoFit/>
-          </a:bodyPr>
-          <a:lstStyle/>
-          <a:p>
-            <a:r>
-              <a:rPr lang="es-CL" sz="800" dirty="0">
-                <a:latin typeface="Arial" panose="020B0604020202020204" pitchFamily="34" charset="0"/>
-                <a:cs typeface="Arial" panose="020B0604020202020204" pitchFamily="34" charset="0"/>
-              </a:rPr>
-              <a:t>Recursos Naturales</a:t>
-            </a:r>
-          </a:p>
-        </p:txBody>
-      </p:sp>
-      <p:sp>
-        <p:nvSpPr>
-          <p:cNvPr id="29" name="CuadroTexto 28">
-            <a:extLst>
-              <a:ext uri="{FF2B5EF4-FFF2-40B4-BE49-F238E27FC236}">
-                <a16:creationId xmlns:a16="http://schemas.microsoft.com/office/drawing/2014/main" id="{F3238CD4-7082-C81A-1A5A-EAC5BBBC87D8}"/>
-              </a:ext>
-            </a:extLst>
-          </p:cNvPr>
-          <p:cNvSpPr txBox="1"/>
-          <p:nvPr/>
-        </p:nvSpPr>
-        <p:spPr>
-          <a:xfrm>
-            <a:off x="10150699" y="4686717"/>
-            <a:ext cx="994183" cy="215444"/>
-          </a:xfrm>
-          <a:prstGeom prst="rect">
-            <a:avLst/>
-          </a:prstGeom>
-          <a:noFill/>
-        </p:spPr>
-        <p:txBody>
-          <a:bodyPr wrap="none" rtlCol="0">
-            <a:spAutoFit/>
-          </a:bodyPr>
-          <a:lstStyle/>
-          <a:p>
-            <a:r>
-              <a:rPr lang="es-CL" sz="800" dirty="0">
-                <a:latin typeface="Arial" panose="020B0604020202020204" pitchFamily="34" charset="0"/>
-                <a:cs typeface="Arial" panose="020B0604020202020204" pitchFamily="34" charset="0"/>
-              </a:rPr>
-              <a:t>Salud y Bienestar</a:t>
-            </a:r>
-          </a:p>
-        </p:txBody>
-      </p:sp>
-      <p:sp>
-        <p:nvSpPr>
-          <p:cNvPr id="30" name="CuadroTexto 29">
-            <a:extLst>
-              <a:ext uri="{FF2B5EF4-FFF2-40B4-BE49-F238E27FC236}">
-                <a16:creationId xmlns:a16="http://schemas.microsoft.com/office/drawing/2014/main" id="{C6054AB3-A79D-7D6C-5D39-C2DB89A21107}"/>
-              </a:ext>
-            </a:extLst>
-          </p:cNvPr>
-          <p:cNvSpPr txBox="1"/>
-          <p:nvPr/>
-        </p:nvSpPr>
-        <p:spPr>
-          <a:xfrm>
-            <a:off x="10150699" y="4992245"/>
-            <a:ext cx="1231427" cy="215444"/>
-          </a:xfrm>
-          <a:prstGeom prst="rect">
-            <a:avLst/>
-          </a:prstGeom>
-          <a:noFill/>
-        </p:spPr>
-        <p:txBody>
-          <a:bodyPr wrap="none" rtlCol="0">
-            <a:spAutoFit/>
-          </a:bodyPr>
-          <a:lstStyle/>
-          <a:p>
-            <a:r>
-              <a:rPr lang="es-CL" sz="800" dirty="0">
-                <a:latin typeface="Arial" panose="020B0604020202020204" pitchFamily="34" charset="0"/>
-                <a:cs typeface="Arial" panose="020B0604020202020204" pitchFamily="34" charset="0"/>
-              </a:rPr>
-              <a:t>Turismo y Hospitalidad</a:t>
-            </a:r>
+              <a:rPr lang="es-ES" dirty="0" err="1"/>
+              <a:t>tabla_resumen_escuela_en_cada_sede</a:t>
+            </a:r>
+            <a:endParaRPr lang="es-ES" dirty="0"/>
           </a:p>
         </p:txBody>
       </p:sp>
     </p:spTree>
     <p:extLst>
       <p:ext uri="{BB962C8B-B14F-4D97-AF65-F5344CB8AC3E}">
-        <p14:creationId xmlns:p14="http://schemas.microsoft.com/office/powerpoint/2010/main" val="704473501"/>
+        <p14:creationId xmlns:p14="http://schemas.microsoft.com/office/powerpoint/2010/main" val="301892137"/>
       </p:ext>
     </p:extLst>
   </p:cSld>

</xml_diff>

<commit_message>
tasa de respuestas almost donw
</commit_message>
<xml_diff>
--- a/templates/radiografia_bienestar_duoc_2025.pptx
+++ b/templates/radiografia_bienestar_duoc_2025.pptx
@@ -9,6 +9,16 @@
     <p:sldId id="257" r:id="rId3"/>
     <p:sldId id="258" r:id="rId4"/>
     <p:sldId id="259" r:id="rId5"/>
+    <p:sldId id="260" r:id="rId6"/>
+    <p:sldId id="261" r:id="rId7"/>
+    <p:sldId id="262" r:id="rId8"/>
+    <p:sldId id="263" r:id="rId9"/>
+    <p:sldId id="264" r:id="rId10"/>
+    <p:sldId id="265" r:id="rId11"/>
+    <p:sldId id="266" r:id="rId12"/>
+    <p:sldId id="267" r:id="rId13"/>
+    <p:sldId id="268" r:id="rId14"/>
+    <p:sldId id="269" r:id="rId15"/>
   </p:sldIdLst>
   <p:sldSz cx="12192000" cy="6858000"/>
   <p:notesSz cx="6858000" cy="9144000"/>
@@ -3772,6 +3782,2106 @@
 </p:sld>
 </file>
 
+<file path=ppt/slides/slide10.xml><?xml version="1.0" encoding="utf-8"?>
+<p:sld xmlns:a="http://schemas.openxmlformats.org/drawingml/2006/main" xmlns:r="http://schemas.openxmlformats.org/officeDocument/2006/relationships" xmlns:p="http://schemas.openxmlformats.org/presentationml/2006/main">
+  <p:cSld>
+    <p:spTree>
+      <p:nvGrpSpPr>
+        <p:cNvPr id="1" name="">
+          <a:extLst>
+            <a:ext uri="{FF2B5EF4-FFF2-40B4-BE49-F238E27FC236}">
+              <a16:creationId xmlns:a16="http://schemas.microsoft.com/office/drawing/2014/main" id="{F8F450EA-E9A8-C346-1AF3-0566495EB200}"/>
+            </a:ext>
+          </a:extLst>
+        </p:cNvPr>
+        <p:cNvGrpSpPr/>
+        <p:nvPr/>
+      </p:nvGrpSpPr>
+      <p:grpSpPr>
+        <a:xfrm>
+          <a:off x="0" y="0"/>
+          <a:ext cx="0" cy="0"/>
+          <a:chOff x="0" y="0"/>
+          <a:chExt cx="0" cy="0"/>
+        </a:xfrm>
+      </p:grpSpPr>
+      <p:sp>
+        <p:nvSpPr>
+          <p:cNvPr id="5" name="Rectángulo 4">
+            <a:extLst>
+              <a:ext uri="{FF2B5EF4-FFF2-40B4-BE49-F238E27FC236}">
+                <a16:creationId xmlns:a16="http://schemas.microsoft.com/office/drawing/2014/main" id="{CDC6EB73-7BEB-5137-F819-139F5E1BE0DF}"/>
+              </a:ext>
+            </a:extLst>
+          </p:cNvPr>
+          <p:cNvSpPr/>
+          <p:nvPr/>
+        </p:nvSpPr>
+        <p:spPr>
+          <a:xfrm>
+            <a:off x="678426" y="294968"/>
+            <a:ext cx="4168877" cy="127819"/>
+          </a:xfrm>
+          <a:prstGeom prst="rect">
+            <a:avLst/>
+          </a:prstGeom>
+          <a:solidFill>
+            <a:schemeClr val="tx1"/>
+          </a:solidFill>
+        </p:spPr>
+        <p:style>
+          <a:lnRef idx="2">
+            <a:schemeClr val="accent1">
+              <a:shade val="15000"/>
+            </a:schemeClr>
+          </a:lnRef>
+          <a:fillRef idx="1">
+            <a:schemeClr val="accent1"/>
+          </a:fillRef>
+          <a:effectRef idx="0">
+            <a:schemeClr val="accent1"/>
+          </a:effectRef>
+          <a:fontRef idx="minor">
+            <a:schemeClr val="lt1"/>
+          </a:fontRef>
+        </p:style>
+        <p:txBody>
+          <a:bodyPr rtlCol="0" anchor="ctr"/>
+          <a:lstStyle/>
+          <a:p>
+            <a:pPr algn="ctr"/>
+            <a:endParaRPr lang="es-CL"/>
+          </a:p>
+        </p:txBody>
+      </p:sp>
+      <p:sp>
+        <p:nvSpPr>
+          <p:cNvPr id="6" name="Rectángulo 5">
+            <a:extLst>
+              <a:ext uri="{FF2B5EF4-FFF2-40B4-BE49-F238E27FC236}">
+                <a16:creationId xmlns:a16="http://schemas.microsoft.com/office/drawing/2014/main" id="{2E0ECEC8-0AC4-F2CD-278E-6C7ED4D3B8D6}"/>
+              </a:ext>
+            </a:extLst>
+          </p:cNvPr>
+          <p:cNvSpPr/>
+          <p:nvPr/>
+        </p:nvSpPr>
+        <p:spPr>
+          <a:xfrm>
+            <a:off x="678426" y="6435213"/>
+            <a:ext cx="4168877" cy="127819"/>
+          </a:xfrm>
+          <a:prstGeom prst="rect">
+            <a:avLst/>
+          </a:prstGeom>
+          <a:solidFill>
+            <a:schemeClr val="tx1"/>
+          </a:solidFill>
+        </p:spPr>
+        <p:style>
+          <a:lnRef idx="2">
+            <a:schemeClr val="accent1">
+              <a:shade val="15000"/>
+            </a:schemeClr>
+          </a:lnRef>
+          <a:fillRef idx="1">
+            <a:schemeClr val="accent1"/>
+          </a:fillRef>
+          <a:effectRef idx="0">
+            <a:schemeClr val="accent1"/>
+          </a:effectRef>
+          <a:fontRef idx="minor">
+            <a:schemeClr val="lt1"/>
+          </a:fontRef>
+        </p:style>
+        <p:txBody>
+          <a:bodyPr rtlCol="0" anchor="ctr"/>
+          <a:lstStyle/>
+          <a:p>
+            <a:pPr algn="ctr"/>
+            <a:endParaRPr lang="es-CL"/>
+          </a:p>
+        </p:txBody>
+      </p:sp>
+      <p:sp>
+        <p:nvSpPr>
+          <p:cNvPr id="7" name="Rectángulo 6">
+            <a:extLst>
+              <a:ext uri="{FF2B5EF4-FFF2-40B4-BE49-F238E27FC236}">
+                <a16:creationId xmlns:a16="http://schemas.microsoft.com/office/drawing/2014/main" id="{63755499-CC07-D38F-7469-FEB53185EA5B}"/>
+              </a:ext>
+            </a:extLst>
+          </p:cNvPr>
+          <p:cNvSpPr/>
+          <p:nvPr/>
+        </p:nvSpPr>
+        <p:spPr>
+          <a:xfrm>
+            <a:off x="4847303" y="294967"/>
+            <a:ext cx="6666271" cy="127819"/>
+          </a:xfrm>
+          <a:prstGeom prst="rect">
+            <a:avLst/>
+          </a:prstGeom>
+          <a:solidFill>
+            <a:srgbClr val="F8B416"/>
+          </a:solidFill>
+        </p:spPr>
+        <p:style>
+          <a:lnRef idx="2">
+            <a:schemeClr val="accent1">
+              <a:shade val="15000"/>
+            </a:schemeClr>
+          </a:lnRef>
+          <a:fillRef idx="1">
+            <a:schemeClr val="accent1"/>
+          </a:fillRef>
+          <a:effectRef idx="0">
+            <a:schemeClr val="accent1"/>
+          </a:effectRef>
+          <a:fontRef idx="minor">
+            <a:schemeClr val="lt1"/>
+          </a:fontRef>
+        </p:style>
+        <p:txBody>
+          <a:bodyPr rtlCol="0" anchor="ctr"/>
+          <a:lstStyle/>
+          <a:p>
+            <a:pPr algn="ctr"/>
+            <a:endParaRPr lang="es-CL" dirty="0">
+              <a:solidFill>
+                <a:srgbClr val="F8B416"/>
+              </a:solidFill>
+              <a:highlight>
+                <a:srgbClr val="FFFF00"/>
+              </a:highlight>
+            </a:endParaRPr>
+          </a:p>
+        </p:txBody>
+      </p:sp>
+      <p:sp>
+        <p:nvSpPr>
+          <p:cNvPr id="8" name="Rectángulo 7">
+            <a:extLst>
+              <a:ext uri="{FF2B5EF4-FFF2-40B4-BE49-F238E27FC236}">
+                <a16:creationId xmlns:a16="http://schemas.microsoft.com/office/drawing/2014/main" id="{DF95DF78-ED12-AAD4-CBE3-5BBE7E6FDBBD}"/>
+              </a:ext>
+            </a:extLst>
+          </p:cNvPr>
+          <p:cNvSpPr/>
+          <p:nvPr/>
+        </p:nvSpPr>
+        <p:spPr>
+          <a:xfrm>
+            <a:off x="4847303" y="6435213"/>
+            <a:ext cx="6666271" cy="127819"/>
+          </a:xfrm>
+          <a:prstGeom prst="rect">
+            <a:avLst/>
+          </a:prstGeom>
+          <a:solidFill>
+            <a:srgbClr val="F8B416"/>
+          </a:solidFill>
+        </p:spPr>
+        <p:style>
+          <a:lnRef idx="2">
+            <a:schemeClr val="accent1">
+              <a:shade val="15000"/>
+            </a:schemeClr>
+          </a:lnRef>
+          <a:fillRef idx="1">
+            <a:schemeClr val="accent1"/>
+          </a:fillRef>
+          <a:effectRef idx="0">
+            <a:schemeClr val="accent1"/>
+          </a:effectRef>
+          <a:fontRef idx="minor">
+            <a:schemeClr val="lt1"/>
+          </a:fontRef>
+        </p:style>
+        <p:txBody>
+          <a:bodyPr rtlCol="0" anchor="ctr"/>
+          <a:lstStyle/>
+          <a:p>
+            <a:pPr algn="ctr"/>
+            <a:endParaRPr lang="es-CL"/>
+          </a:p>
+        </p:txBody>
+      </p:sp>
+      <p:sp>
+        <p:nvSpPr>
+          <p:cNvPr id="10" name="CuadroTexto 9">
+            <a:extLst>
+              <a:ext uri="{FF2B5EF4-FFF2-40B4-BE49-F238E27FC236}">
+                <a16:creationId xmlns:a16="http://schemas.microsoft.com/office/drawing/2014/main" id="{06B30D5E-C326-F280-8EC8-802EF16D1D8B}"/>
+              </a:ext>
+            </a:extLst>
+          </p:cNvPr>
+          <p:cNvSpPr txBox="1"/>
+          <p:nvPr/>
+        </p:nvSpPr>
+        <p:spPr>
+          <a:xfrm>
+            <a:off x="678426" y="523257"/>
+            <a:ext cx="5996694" cy="923330"/>
+          </a:xfrm>
+          <a:prstGeom prst="rect">
+            <a:avLst/>
+          </a:prstGeom>
+          <a:noFill/>
+        </p:spPr>
+        <p:txBody>
+          <a:bodyPr wrap="square" rtlCol="0">
+            <a:spAutoFit/>
+          </a:bodyPr>
+          <a:lstStyle/>
+          <a:p>
+            <a:r>
+              <a:rPr lang="es-CL" b="1" dirty="0">
+                <a:solidFill>
+                  <a:srgbClr val="F8B416"/>
+                </a:solidFill>
+                <a:latin typeface="Arial" panose="020B0604020202020204" pitchFamily="34" charset="0"/>
+                <a:cs typeface="Arial" panose="020B0604020202020204" pitchFamily="34" charset="0"/>
+              </a:rPr>
+              <a:t>RADIOGRAFÍA DEL BIENESTAR DUOC UC 2025</a:t>
+            </a:r>
+          </a:p>
+          <a:p>
+            <a:r>
+              <a:rPr lang="es-CL" b="1" dirty="0">
+                <a:solidFill>
+                  <a:schemeClr val="tx1">
+                    <a:lumMod val="50000"/>
+                    <a:lumOff val="50000"/>
+                  </a:schemeClr>
+                </a:solidFill>
+                <a:latin typeface="Arial" panose="020B0604020202020204" pitchFamily="34" charset="0"/>
+                <a:cs typeface="Arial" panose="020B0604020202020204" pitchFamily="34" charset="0"/>
+              </a:rPr>
+              <a:t>Tasa de respuestas por </a:t>
+            </a:r>
+            <a:r>
+              <a:rPr lang="es-CL" b="1" dirty="0">
+                <a:latin typeface="Arial" panose="020B0604020202020204" pitchFamily="34" charset="0"/>
+                <a:cs typeface="Arial" panose="020B0604020202020204" pitchFamily="34" charset="0"/>
+              </a:rPr>
+              <a:t>ESCUELA EN CADA SEDE</a:t>
+            </a:r>
+          </a:p>
+          <a:p>
+            <a:endParaRPr lang="es-CL" b="1" dirty="0">
+              <a:solidFill>
+                <a:srgbClr val="F8B416"/>
+              </a:solidFill>
+              <a:latin typeface="Arial" panose="020B0604020202020204" pitchFamily="34" charset="0"/>
+              <a:cs typeface="Arial" panose="020B0604020202020204" pitchFamily="34" charset="0"/>
+            </a:endParaRPr>
+          </a:p>
+        </p:txBody>
+      </p:sp>
+      <p:pic>
+        <p:nvPicPr>
+          <p:cNvPr id="15" name="Imagen 14" descr="Imagen que contiene Texto&#10;&#10;El contenido generado por IA puede ser incorrecto.">
+            <a:extLst>
+              <a:ext uri="{FF2B5EF4-FFF2-40B4-BE49-F238E27FC236}">
+                <a16:creationId xmlns:a16="http://schemas.microsoft.com/office/drawing/2014/main" id="{2F2512BD-F3DC-5C76-3043-F21F0C416BEC}"/>
+              </a:ext>
+            </a:extLst>
+          </p:cNvPr>
+          <p:cNvPicPr>
+            <a:picLocks noChangeAspect="1"/>
+          </p:cNvPicPr>
+          <p:nvPr/>
+        </p:nvPicPr>
+        <p:blipFill>
+          <a:blip r:embed="rId2">
+            <a:extLst>
+              <a:ext uri="{28A0092B-C50C-407E-A947-70E740481C1C}">
+                <a14:useLocalDpi xmlns:a14="http://schemas.microsoft.com/office/drawing/2010/main" val="0"/>
+              </a:ext>
+            </a:extLst>
+          </a:blip>
+          <a:stretch>
+            <a:fillRect/>
+          </a:stretch>
+        </p:blipFill>
+        <p:spPr>
+          <a:xfrm>
+            <a:off x="8062451" y="693767"/>
+            <a:ext cx="1502645" cy="353122"/>
+          </a:xfrm>
+          <a:prstGeom prst="rect">
+            <a:avLst/>
+          </a:prstGeom>
+        </p:spPr>
+      </p:pic>
+      <p:pic>
+        <p:nvPicPr>
+          <p:cNvPr id="17" name="Imagen 16" descr="Logotipo&#10;&#10;El contenido generado por IA puede ser incorrecto.">
+            <a:extLst>
+              <a:ext uri="{FF2B5EF4-FFF2-40B4-BE49-F238E27FC236}">
+                <a16:creationId xmlns:a16="http://schemas.microsoft.com/office/drawing/2014/main" id="{554EB127-37C3-5DAB-D5DC-D44CB47F198A}"/>
+              </a:ext>
+            </a:extLst>
+          </p:cNvPr>
+          <p:cNvPicPr>
+            <a:picLocks noChangeAspect="1"/>
+          </p:cNvPicPr>
+          <p:nvPr/>
+        </p:nvPicPr>
+        <p:blipFill>
+          <a:blip r:embed="rId3">
+            <a:extLst>
+              <a:ext uri="{28A0092B-C50C-407E-A947-70E740481C1C}">
+                <a14:useLocalDpi xmlns:a14="http://schemas.microsoft.com/office/drawing/2010/main" val="0"/>
+              </a:ext>
+            </a:extLst>
+          </a:blip>
+          <a:stretch>
+            <a:fillRect/>
+          </a:stretch>
+        </p:blipFill>
+        <p:spPr>
+          <a:xfrm>
+            <a:off x="9794655" y="693768"/>
+            <a:ext cx="1432628" cy="353122"/>
+          </a:xfrm>
+          <a:prstGeom prst="rect">
+            <a:avLst/>
+          </a:prstGeom>
+        </p:spPr>
+      </p:pic>
+      <p:sp>
+        <p:nvSpPr>
+          <p:cNvPr id="22" name="CuadroTexto 21">
+            <a:extLst>
+              <a:ext uri="{FF2B5EF4-FFF2-40B4-BE49-F238E27FC236}">
+                <a16:creationId xmlns:a16="http://schemas.microsoft.com/office/drawing/2014/main" id="{E647280A-3546-2299-EB6A-DB82129F95A1}"/>
+              </a:ext>
+            </a:extLst>
+          </p:cNvPr>
+          <p:cNvSpPr txBox="1">
+            <a:spLocks/>
+          </p:cNvSpPr>
+          <p:nvPr/>
+        </p:nvSpPr>
+        <p:spPr>
+          <a:xfrm>
+            <a:off x="1622973" y="1702750"/>
+            <a:ext cx="8171682" cy="4108359"/>
+          </a:xfrm>
+          <a:prstGeom prst="rect">
+            <a:avLst/>
+          </a:prstGeom>
+          <a:noFill/>
+        </p:spPr>
+        <p:txBody>
+          <a:bodyPr wrap="square" rtlCol="0">
+            <a:noAutofit/>
+          </a:bodyPr>
+          <a:lstStyle/>
+          <a:p>
+            <a:r>
+              <a:rPr lang="es-ES" dirty="0"/>
+              <a:t>tabla_resumen_escuela_en_cada_sede_7</a:t>
+            </a:r>
+          </a:p>
+        </p:txBody>
+      </p:sp>
+    </p:spTree>
+    <p:extLst>
+      <p:ext uri="{BB962C8B-B14F-4D97-AF65-F5344CB8AC3E}">
+        <p14:creationId xmlns:p14="http://schemas.microsoft.com/office/powerpoint/2010/main" val="3970580687"/>
+      </p:ext>
+    </p:extLst>
+  </p:cSld>
+  <p:clrMapOvr>
+    <a:masterClrMapping/>
+  </p:clrMapOvr>
+</p:sld>
+</file>
+
+<file path=ppt/slides/slide11.xml><?xml version="1.0" encoding="utf-8"?>
+<p:sld xmlns:a="http://schemas.openxmlformats.org/drawingml/2006/main" xmlns:r="http://schemas.openxmlformats.org/officeDocument/2006/relationships" xmlns:p="http://schemas.openxmlformats.org/presentationml/2006/main">
+  <p:cSld>
+    <p:spTree>
+      <p:nvGrpSpPr>
+        <p:cNvPr id="1" name="">
+          <a:extLst>
+            <a:ext uri="{FF2B5EF4-FFF2-40B4-BE49-F238E27FC236}">
+              <a16:creationId xmlns:a16="http://schemas.microsoft.com/office/drawing/2014/main" id="{B10032A8-0B80-C503-B360-4260198553E6}"/>
+            </a:ext>
+          </a:extLst>
+        </p:cNvPr>
+        <p:cNvGrpSpPr/>
+        <p:nvPr/>
+      </p:nvGrpSpPr>
+      <p:grpSpPr>
+        <a:xfrm>
+          <a:off x="0" y="0"/>
+          <a:ext cx="0" cy="0"/>
+          <a:chOff x="0" y="0"/>
+          <a:chExt cx="0" cy="0"/>
+        </a:xfrm>
+      </p:grpSpPr>
+      <p:sp>
+        <p:nvSpPr>
+          <p:cNvPr id="5" name="Rectángulo 4">
+            <a:extLst>
+              <a:ext uri="{FF2B5EF4-FFF2-40B4-BE49-F238E27FC236}">
+                <a16:creationId xmlns:a16="http://schemas.microsoft.com/office/drawing/2014/main" id="{9237EF44-39D8-E36D-B0DD-BC013C52614A}"/>
+              </a:ext>
+            </a:extLst>
+          </p:cNvPr>
+          <p:cNvSpPr/>
+          <p:nvPr/>
+        </p:nvSpPr>
+        <p:spPr>
+          <a:xfrm>
+            <a:off x="678426" y="294968"/>
+            <a:ext cx="4168877" cy="127819"/>
+          </a:xfrm>
+          <a:prstGeom prst="rect">
+            <a:avLst/>
+          </a:prstGeom>
+          <a:solidFill>
+            <a:schemeClr val="tx1"/>
+          </a:solidFill>
+        </p:spPr>
+        <p:style>
+          <a:lnRef idx="2">
+            <a:schemeClr val="accent1">
+              <a:shade val="15000"/>
+            </a:schemeClr>
+          </a:lnRef>
+          <a:fillRef idx="1">
+            <a:schemeClr val="accent1"/>
+          </a:fillRef>
+          <a:effectRef idx="0">
+            <a:schemeClr val="accent1"/>
+          </a:effectRef>
+          <a:fontRef idx="minor">
+            <a:schemeClr val="lt1"/>
+          </a:fontRef>
+        </p:style>
+        <p:txBody>
+          <a:bodyPr rtlCol="0" anchor="ctr"/>
+          <a:lstStyle/>
+          <a:p>
+            <a:pPr algn="ctr"/>
+            <a:endParaRPr lang="es-CL"/>
+          </a:p>
+        </p:txBody>
+      </p:sp>
+      <p:sp>
+        <p:nvSpPr>
+          <p:cNvPr id="6" name="Rectángulo 5">
+            <a:extLst>
+              <a:ext uri="{FF2B5EF4-FFF2-40B4-BE49-F238E27FC236}">
+                <a16:creationId xmlns:a16="http://schemas.microsoft.com/office/drawing/2014/main" id="{B2E5D375-AB93-9D45-6907-B73EAFCDF383}"/>
+              </a:ext>
+            </a:extLst>
+          </p:cNvPr>
+          <p:cNvSpPr/>
+          <p:nvPr/>
+        </p:nvSpPr>
+        <p:spPr>
+          <a:xfrm>
+            <a:off x="678426" y="6435213"/>
+            <a:ext cx="4168877" cy="127819"/>
+          </a:xfrm>
+          <a:prstGeom prst="rect">
+            <a:avLst/>
+          </a:prstGeom>
+          <a:solidFill>
+            <a:schemeClr val="tx1"/>
+          </a:solidFill>
+        </p:spPr>
+        <p:style>
+          <a:lnRef idx="2">
+            <a:schemeClr val="accent1">
+              <a:shade val="15000"/>
+            </a:schemeClr>
+          </a:lnRef>
+          <a:fillRef idx="1">
+            <a:schemeClr val="accent1"/>
+          </a:fillRef>
+          <a:effectRef idx="0">
+            <a:schemeClr val="accent1"/>
+          </a:effectRef>
+          <a:fontRef idx="minor">
+            <a:schemeClr val="lt1"/>
+          </a:fontRef>
+        </p:style>
+        <p:txBody>
+          <a:bodyPr rtlCol="0" anchor="ctr"/>
+          <a:lstStyle/>
+          <a:p>
+            <a:pPr algn="ctr"/>
+            <a:endParaRPr lang="es-CL"/>
+          </a:p>
+        </p:txBody>
+      </p:sp>
+      <p:sp>
+        <p:nvSpPr>
+          <p:cNvPr id="7" name="Rectángulo 6">
+            <a:extLst>
+              <a:ext uri="{FF2B5EF4-FFF2-40B4-BE49-F238E27FC236}">
+                <a16:creationId xmlns:a16="http://schemas.microsoft.com/office/drawing/2014/main" id="{80A8B1F9-E7DA-FC1B-42C0-708EB562750B}"/>
+              </a:ext>
+            </a:extLst>
+          </p:cNvPr>
+          <p:cNvSpPr/>
+          <p:nvPr/>
+        </p:nvSpPr>
+        <p:spPr>
+          <a:xfrm>
+            <a:off x="4847303" y="294967"/>
+            <a:ext cx="6666271" cy="127819"/>
+          </a:xfrm>
+          <a:prstGeom prst="rect">
+            <a:avLst/>
+          </a:prstGeom>
+          <a:solidFill>
+            <a:srgbClr val="F8B416"/>
+          </a:solidFill>
+        </p:spPr>
+        <p:style>
+          <a:lnRef idx="2">
+            <a:schemeClr val="accent1">
+              <a:shade val="15000"/>
+            </a:schemeClr>
+          </a:lnRef>
+          <a:fillRef idx="1">
+            <a:schemeClr val="accent1"/>
+          </a:fillRef>
+          <a:effectRef idx="0">
+            <a:schemeClr val="accent1"/>
+          </a:effectRef>
+          <a:fontRef idx="minor">
+            <a:schemeClr val="lt1"/>
+          </a:fontRef>
+        </p:style>
+        <p:txBody>
+          <a:bodyPr rtlCol="0" anchor="ctr"/>
+          <a:lstStyle/>
+          <a:p>
+            <a:pPr algn="ctr"/>
+            <a:endParaRPr lang="es-CL" dirty="0">
+              <a:solidFill>
+                <a:srgbClr val="F8B416"/>
+              </a:solidFill>
+              <a:highlight>
+                <a:srgbClr val="FFFF00"/>
+              </a:highlight>
+            </a:endParaRPr>
+          </a:p>
+        </p:txBody>
+      </p:sp>
+      <p:sp>
+        <p:nvSpPr>
+          <p:cNvPr id="8" name="Rectángulo 7">
+            <a:extLst>
+              <a:ext uri="{FF2B5EF4-FFF2-40B4-BE49-F238E27FC236}">
+                <a16:creationId xmlns:a16="http://schemas.microsoft.com/office/drawing/2014/main" id="{EEC3F972-41D7-E2F3-E4F9-A102352AB194}"/>
+              </a:ext>
+            </a:extLst>
+          </p:cNvPr>
+          <p:cNvSpPr/>
+          <p:nvPr/>
+        </p:nvSpPr>
+        <p:spPr>
+          <a:xfrm>
+            <a:off x="4847303" y="6435213"/>
+            <a:ext cx="6666271" cy="127819"/>
+          </a:xfrm>
+          <a:prstGeom prst="rect">
+            <a:avLst/>
+          </a:prstGeom>
+          <a:solidFill>
+            <a:srgbClr val="F8B416"/>
+          </a:solidFill>
+        </p:spPr>
+        <p:style>
+          <a:lnRef idx="2">
+            <a:schemeClr val="accent1">
+              <a:shade val="15000"/>
+            </a:schemeClr>
+          </a:lnRef>
+          <a:fillRef idx="1">
+            <a:schemeClr val="accent1"/>
+          </a:fillRef>
+          <a:effectRef idx="0">
+            <a:schemeClr val="accent1"/>
+          </a:effectRef>
+          <a:fontRef idx="minor">
+            <a:schemeClr val="lt1"/>
+          </a:fontRef>
+        </p:style>
+        <p:txBody>
+          <a:bodyPr rtlCol="0" anchor="ctr"/>
+          <a:lstStyle/>
+          <a:p>
+            <a:pPr algn="ctr"/>
+            <a:endParaRPr lang="es-CL"/>
+          </a:p>
+        </p:txBody>
+      </p:sp>
+      <p:sp>
+        <p:nvSpPr>
+          <p:cNvPr id="10" name="CuadroTexto 9">
+            <a:extLst>
+              <a:ext uri="{FF2B5EF4-FFF2-40B4-BE49-F238E27FC236}">
+                <a16:creationId xmlns:a16="http://schemas.microsoft.com/office/drawing/2014/main" id="{0A94C92F-FB47-2895-22AD-20CBDBA87CA8}"/>
+              </a:ext>
+            </a:extLst>
+          </p:cNvPr>
+          <p:cNvSpPr txBox="1"/>
+          <p:nvPr/>
+        </p:nvSpPr>
+        <p:spPr>
+          <a:xfrm>
+            <a:off x="678426" y="523257"/>
+            <a:ext cx="5996694" cy="923330"/>
+          </a:xfrm>
+          <a:prstGeom prst="rect">
+            <a:avLst/>
+          </a:prstGeom>
+          <a:noFill/>
+        </p:spPr>
+        <p:txBody>
+          <a:bodyPr wrap="square" rtlCol="0">
+            <a:spAutoFit/>
+          </a:bodyPr>
+          <a:lstStyle/>
+          <a:p>
+            <a:r>
+              <a:rPr lang="es-CL" b="1" dirty="0">
+                <a:solidFill>
+                  <a:srgbClr val="F8B416"/>
+                </a:solidFill>
+                <a:latin typeface="Arial" panose="020B0604020202020204" pitchFamily="34" charset="0"/>
+                <a:cs typeface="Arial" panose="020B0604020202020204" pitchFamily="34" charset="0"/>
+              </a:rPr>
+              <a:t>RADIOGRAFÍA DEL BIENESTAR DUOC UC 2025</a:t>
+            </a:r>
+          </a:p>
+          <a:p>
+            <a:r>
+              <a:rPr lang="es-CL" b="1" dirty="0">
+                <a:solidFill>
+                  <a:schemeClr val="tx1">
+                    <a:lumMod val="50000"/>
+                    <a:lumOff val="50000"/>
+                  </a:schemeClr>
+                </a:solidFill>
+                <a:latin typeface="Arial" panose="020B0604020202020204" pitchFamily="34" charset="0"/>
+                <a:cs typeface="Arial" panose="020B0604020202020204" pitchFamily="34" charset="0"/>
+              </a:rPr>
+              <a:t>Tasa de respuestas por </a:t>
+            </a:r>
+            <a:r>
+              <a:rPr lang="es-CL" b="1" dirty="0">
+                <a:latin typeface="Arial" panose="020B0604020202020204" pitchFamily="34" charset="0"/>
+                <a:cs typeface="Arial" panose="020B0604020202020204" pitchFamily="34" charset="0"/>
+              </a:rPr>
+              <a:t>ESCUELA EN CADA SEDE</a:t>
+            </a:r>
+          </a:p>
+          <a:p>
+            <a:endParaRPr lang="es-CL" b="1" dirty="0">
+              <a:solidFill>
+                <a:srgbClr val="F8B416"/>
+              </a:solidFill>
+              <a:latin typeface="Arial" panose="020B0604020202020204" pitchFamily="34" charset="0"/>
+              <a:cs typeface="Arial" panose="020B0604020202020204" pitchFamily="34" charset="0"/>
+            </a:endParaRPr>
+          </a:p>
+        </p:txBody>
+      </p:sp>
+      <p:pic>
+        <p:nvPicPr>
+          <p:cNvPr id="15" name="Imagen 14" descr="Imagen que contiene Texto&#10;&#10;El contenido generado por IA puede ser incorrecto.">
+            <a:extLst>
+              <a:ext uri="{FF2B5EF4-FFF2-40B4-BE49-F238E27FC236}">
+                <a16:creationId xmlns:a16="http://schemas.microsoft.com/office/drawing/2014/main" id="{BE571C03-04B0-84A7-FEC0-50AB2AB96FED}"/>
+              </a:ext>
+            </a:extLst>
+          </p:cNvPr>
+          <p:cNvPicPr>
+            <a:picLocks noChangeAspect="1"/>
+          </p:cNvPicPr>
+          <p:nvPr/>
+        </p:nvPicPr>
+        <p:blipFill>
+          <a:blip r:embed="rId2">
+            <a:extLst>
+              <a:ext uri="{28A0092B-C50C-407E-A947-70E740481C1C}">
+                <a14:useLocalDpi xmlns:a14="http://schemas.microsoft.com/office/drawing/2010/main" val="0"/>
+              </a:ext>
+            </a:extLst>
+          </a:blip>
+          <a:stretch>
+            <a:fillRect/>
+          </a:stretch>
+        </p:blipFill>
+        <p:spPr>
+          <a:xfrm>
+            <a:off x="8062451" y="693767"/>
+            <a:ext cx="1502645" cy="353122"/>
+          </a:xfrm>
+          <a:prstGeom prst="rect">
+            <a:avLst/>
+          </a:prstGeom>
+        </p:spPr>
+      </p:pic>
+      <p:pic>
+        <p:nvPicPr>
+          <p:cNvPr id="17" name="Imagen 16" descr="Logotipo&#10;&#10;El contenido generado por IA puede ser incorrecto.">
+            <a:extLst>
+              <a:ext uri="{FF2B5EF4-FFF2-40B4-BE49-F238E27FC236}">
+                <a16:creationId xmlns:a16="http://schemas.microsoft.com/office/drawing/2014/main" id="{90136395-68D5-AA4D-728A-3ADB665B969D}"/>
+              </a:ext>
+            </a:extLst>
+          </p:cNvPr>
+          <p:cNvPicPr>
+            <a:picLocks noChangeAspect="1"/>
+          </p:cNvPicPr>
+          <p:nvPr/>
+        </p:nvPicPr>
+        <p:blipFill>
+          <a:blip r:embed="rId3">
+            <a:extLst>
+              <a:ext uri="{28A0092B-C50C-407E-A947-70E740481C1C}">
+                <a14:useLocalDpi xmlns:a14="http://schemas.microsoft.com/office/drawing/2010/main" val="0"/>
+              </a:ext>
+            </a:extLst>
+          </a:blip>
+          <a:stretch>
+            <a:fillRect/>
+          </a:stretch>
+        </p:blipFill>
+        <p:spPr>
+          <a:xfrm>
+            <a:off x="9794655" y="693768"/>
+            <a:ext cx="1432628" cy="353122"/>
+          </a:xfrm>
+          <a:prstGeom prst="rect">
+            <a:avLst/>
+          </a:prstGeom>
+        </p:spPr>
+      </p:pic>
+      <p:sp>
+        <p:nvSpPr>
+          <p:cNvPr id="22" name="CuadroTexto 21">
+            <a:extLst>
+              <a:ext uri="{FF2B5EF4-FFF2-40B4-BE49-F238E27FC236}">
+                <a16:creationId xmlns:a16="http://schemas.microsoft.com/office/drawing/2014/main" id="{25EDD9CD-30C6-1198-6BD2-065F8E368B98}"/>
+              </a:ext>
+            </a:extLst>
+          </p:cNvPr>
+          <p:cNvSpPr txBox="1">
+            <a:spLocks/>
+          </p:cNvSpPr>
+          <p:nvPr/>
+        </p:nvSpPr>
+        <p:spPr>
+          <a:xfrm>
+            <a:off x="1622973" y="1702750"/>
+            <a:ext cx="8171682" cy="4108359"/>
+          </a:xfrm>
+          <a:prstGeom prst="rect">
+            <a:avLst/>
+          </a:prstGeom>
+          <a:noFill/>
+        </p:spPr>
+        <p:txBody>
+          <a:bodyPr wrap="square" rtlCol="0">
+            <a:noAutofit/>
+          </a:bodyPr>
+          <a:lstStyle/>
+          <a:p>
+            <a:r>
+              <a:rPr lang="es-ES" dirty="0"/>
+              <a:t>tabla_resumen_escuela_en_cada_sede_8</a:t>
+            </a:r>
+          </a:p>
+        </p:txBody>
+      </p:sp>
+    </p:spTree>
+    <p:extLst>
+      <p:ext uri="{BB962C8B-B14F-4D97-AF65-F5344CB8AC3E}">
+        <p14:creationId xmlns:p14="http://schemas.microsoft.com/office/powerpoint/2010/main" val="924715826"/>
+      </p:ext>
+    </p:extLst>
+  </p:cSld>
+  <p:clrMapOvr>
+    <a:masterClrMapping/>
+  </p:clrMapOvr>
+</p:sld>
+</file>
+
+<file path=ppt/slides/slide12.xml><?xml version="1.0" encoding="utf-8"?>
+<p:sld xmlns:a="http://schemas.openxmlformats.org/drawingml/2006/main" xmlns:r="http://schemas.openxmlformats.org/officeDocument/2006/relationships" xmlns:p="http://schemas.openxmlformats.org/presentationml/2006/main">
+  <p:cSld>
+    <p:spTree>
+      <p:nvGrpSpPr>
+        <p:cNvPr id="1" name="">
+          <a:extLst>
+            <a:ext uri="{FF2B5EF4-FFF2-40B4-BE49-F238E27FC236}">
+              <a16:creationId xmlns:a16="http://schemas.microsoft.com/office/drawing/2014/main" id="{88209CA2-B2E4-6000-20CC-6412F9954201}"/>
+            </a:ext>
+          </a:extLst>
+        </p:cNvPr>
+        <p:cNvGrpSpPr/>
+        <p:nvPr/>
+      </p:nvGrpSpPr>
+      <p:grpSpPr>
+        <a:xfrm>
+          <a:off x="0" y="0"/>
+          <a:ext cx="0" cy="0"/>
+          <a:chOff x="0" y="0"/>
+          <a:chExt cx="0" cy="0"/>
+        </a:xfrm>
+      </p:grpSpPr>
+      <p:sp>
+        <p:nvSpPr>
+          <p:cNvPr id="5" name="Rectángulo 4">
+            <a:extLst>
+              <a:ext uri="{FF2B5EF4-FFF2-40B4-BE49-F238E27FC236}">
+                <a16:creationId xmlns:a16="http://schemas.microsoft.com/office/drawing/2014/main" id="{F9EB7718-81B9-7096-7AB6-07DE2E9E9E34}"/>
+              </a:ext>
+            </a:extLst>
+          </p:cNvPr>
+          <p:cNvSpPr/>
+          <p:nvPr/>
+        </p:nvSpPr>
+        <p:spPr>
+          <a:xfrm>
+            <a:off x="678426" y="294968"/>
+            <a:ext cx="4168877" cy="127819"/>
+          </a:xfrm>
+          <a:prstGeom prst="rect">
+            <a:avLst/>
+          </a:prstGeom>
+          <a:solidFill>
+            <a:schemeClr val="tx1"/>
+          </a:solidFill>
+        </p:spPr>
+        <p:style>
+          <a:lnRef idx="2">
+            <a:schemeClr val="accent1">
+              <a:shade val="15000"/>
+            </a:schemeClr>
+          </a:lnRef>
+          <a:fillRef idx="1">
+            <a:schemeClr val="accent1"/>
+          </a:fillRef>
+          <a:effectRef idx="0">
+            <a:schemeClr val="accent1"/>
+          </a:effectRef>
+          <a:fontRef idx="minor">
+            <a:schemeClr val="lt1"/>
+          </a:fontRef>
+        </p:style>
+        <p:txBody>
+          <a:bodyPr rtlCol="0" anchor="ctr"/>
+          <a:lstStyle/>
+          <a:p>
+            <a:pPr algn="ctr"/>
+            <a:endParaRPr lang="es-CL"/>
+          </a:p>
+        </p:txBody>
+      </p:sp>
+      <p:sp>
+        <p:nvSpPr>
+          <p:cNvPr id="6" name="Rectángulo 5">
+            <a:extLst>
+              <a:ext uri="{FF2B5EF4-FFF2-40B4-BE49-F238E27FC236}">
+                <a16:creationId xmlns:a16="http://schemas.microsoft.com/office/drawing/2014/main" id="{0B1C2923-C68A-D2DA-40C3-0E1AF4562ECB}"/>
+              </a:ext>
+            </a:extLst>
+          </p:cNvPr>
+          <p:cNvSpPr/>
+          <p:nvPr/>
+        </p:nvSpPr>
+        <p:spPr>
+          <a:xfrm>
+            <a:off x="678426" y="6435213"/>
+            <a:ext cx="4168877" cy="127819"/>
+          </a:xfrm>
+          <a:prstGeom prst="rect">
+            <a:avLst/>
+          </a:prstGeom>
+          <a:solidFill>
+            <a:schemeClr val="tx1"/>
+          </a:solidFill>
+        </p:spPr>
+        <p:style>
+          <a:lnRef idx="2">
+            <a:schemeClr val="accent1">
+              <a:shade val="15000"/>
+            </a:schemeClr>
+          </a:lnRef>
+          <a:fillRef idx="1">
+            <a:schemeClr val="accent1"/>
+          </a:fillRef>
+          <a:effectRef idx="0">
+            <a:schemeClr val="accent1"/>
+          </a:effectRef>
+          <a:fontRef idx="minor">
+            <a:schemeClr val="lt1"/>
+          </a:fontRef>
+        </p:style>
+        <p:txBody>
+          <a:bodyPr rtlCol="0" anchor="ctr"/>
+          <a:lstStyle/>
+          <a:p>
+            <a:pPr algn="ctr"/>
+            <a:endParaRPr lang="es-CL"/>
+          </a:p>
+        </p:txBody>
+      </p:sp>
+      <p:sp>
+        <p:nvSpPr>
+          <p:cNvPr id="7" name="Rectángulo 6">
+            <a:extLst>
+              <a:ext uri="{FF2B5EF4-FFF2-40B4-BE49-F238E27FC236}">
+                <a16:creationId xmlns:a16="http://schemas.microsoft.com/office/drawing/2014/main" id="{9D80C9B7-9547-35CF-75C2-07EB37E2AAFB}"/>
+              </a:ext>
+            </a:extLst>
+          </p:cNvPr>
+          <p:cNvSpPr/>
+          <p:nvPr/>
+        </p:nvSpPr>
+        <p:spPr>
+          <a:xfrm>
+            <a:off x="4847303" y="294967"/>
+            <a:ext cx="6666271" cy="127819"/>
+          </a:xfrm>
+          <a:prstGeom prst="rect">
+            <a:avLst/>
+          </a:prstGeom>
+          <a:solidFill>
+            <a:srgbClr val="F8B416"/>
+          </a:solidFill>
+        </p:spPr>
+        <p:style>
+          <a:lnRef idx="2">
+            <a:schemeClr val="accent1">
+              <a:shade val="15000"/>
+            </a:schemeClr>
+          </a:lnRef>
+          <a:fillRef idx="1">
+            <a:schemeClr val="accent1"/>
+          </a:fillRef>
+          <a:effectRef idx="0">
+            <a:schemeClr val="accent1"/>
+          </a:effectRef>
+          <a:fontRef idx="minor">
+            <a:schemeClr val="lt1"/>
+          </a:fontRef>
+        </p:style>
+        <p:txBody>
+          <a:bodyPr rtlCol="0" anchor="ctr"/>
+          <a:lstStyle/>
+          <a:p>
+            <a:pPr algn="ctr"/>
+            <a:endParaRPr lang="es-CL" dirty="0">
+              <a:solidFill>
+                <a:srgbClr val="F8B416"/>
+              </a:solidFill>
+              <a:highlight>
+                <a:srgbClr val="FFFF00"/>
+              </a:highlight>
+            </a:endParaRPr>
+          </a:p>
+        </p:txBody>
+      </p:sp>
+      <p:sp>
+        <p:nvSpPr>
+          <p:cNvPr id="8" name="Rectángulo 7">
+            <a:extLst>
+              <a:ext uri="{FF2B5EF4-FFF2-40B4-BE49-F238E27FC236}">
+                <a16:creationId xmlns:a16="http://schemas.microsoft.com/office/drawing/2014/main" id="{BEE674F8-25BF-129E-0D66-8E1CB0E74AC9}"/>
+              </a:ext>
+            </a:extLst>
+          </p:cNvPr>
+          <p:cNvSpPr/>
+          <p:nvPr/>
+        </p:nvSpPr>
+        <p:spPr>
+          <a:xfrm>
+            <a:off x="4847303" y="6435213"/>
+            <a:ext cx="6666271" cy="127819"/>
+          </a:xfrm>
+          <a:prstGeom prst="rect">
+            <a:avLst/>
+          </a:prstGeom>
+          <a:solidFill>
+            <a:srgbClr val="F8B416"/>
+          </a:solidFill>
+        </p:spPr>
+        <p:style>
+          <a:lnRef idx="2">
+            <a:schemeClr val="accent1">
+              <a:shade val="15000"/>
+            </a:schemeClr>
+          </a:lnRef>
+          <a:fillRef idx="1">
+            <a:schemeClr val="accent1"/>
+          </a:fillRef>
+          <a:effectRef idx="0">
+            <a:schemeClr val="accent1"/>
+          </a:effectRef>
+          <a:fontRef idx="minor">
+            <a:schemeClr val="lt1"/>
+          </a:fontRef>
+        </p:style>
+        <p:txBody>
+          <a:bodyPr rtlCol="0" anchor="ctr"/>
+          <a:lstStyle/>
+          <a:p>
+            <a:pPr algn="ctr"/>
+            <a:endParaRPr lang="es-CL"/>
+          </a:p>
+        </p:txBody>
+      </p:sp>
+      <p:sp>
+        <p:nvSpPr>
+          <p:cNvPr id="10" name="CuadroTexto 9">
+            <a:extLst>
+              <a:ext uri="{FF2B5EF4-FFF2-40B4-BE49-F238E27FC236}">
+                <a16:creationId xmlns:a16="http://schemas.microsoft.com/office/drawing/2014/main" id="{3A8748BA-C7BF-D83D-9C7F-43BA148E84C0}"/>
+              </a:ext>
+            </a:extLst>
+          </p:cNvPr>
+          <p:cNvSpPr txBox="1"/>
+          <p:nvPr/>
+        </p:nvSpPr>
+        <p:spPr>
+          <a:xfrm>
+            <a:off x="678426" y="523257"/>
+            <a:ext cx="5996694" cy="923330"/>
+          </a:xfrm>
+          <a:prstGeom prst="rect">
+            <a:avLst/>
+          </a:prstGeom>
+          <a:noFill/>
+        </p:spPr>
+        <p:txBody>
+          <a:bodyPr wrap="square" rtlCol="0">
+            <a:spAutoFit/>
+          </a:bodyPr>
+          <a:lstStyle/>
+          <a:p>
+            <a:r>
+              <a:rPr lang="es-CL" b="1" dirty="0">
+                <a:solidFill>
+                  <a:srgbClr val="F8B416"/>
+                </a:solidFill>
+                <a:latin typeface="Arial" panose="020B0604020202020204" pitchFamily="34" charset="0"/>
+                <a:cs typeface="Arial" panose="020B0604020202020204" pitchFamily="34" charset="0"/>
+              </a:rPr>
+              <a:t>RADIOGRAFÍA DEL BIENESTAR DUOC UC 2025</a:t>
+            </a:r>
+          </a:p>
+          <a:p>
+            <a:r>
+              <a:rPr lang="es-CL" b="1" dirty="0">
+                <a:solidFill>
+                  <a:schemeClr val="tx1">
+                    <a:lumMod val="50000"/>
+                    <a:lumOff val="50000"/>
+                  </a:schemeClr>
+                </a:solidFill>
+                <a:latin typeface="Arial" panose="020B0604020202020204" pitchFamily="34" charset="0"/>
+                <a:cs typeface="Arial" panose="020B0604020202020204" pitchFamily="34" charset="0"/>
+              </a:rPr>
+              <a:t>Tasa de respuestas por </a:t>
+            </a:r>
+            <a:r>
+              <a:rPr lang="es-CL" b="1" dirty="0">
+                <a:latin typeface="Arial" panose="020B0604020202020204" pitchFamily="34" charset="0"/>
+                <a:cs typeface="Arial" panose="020B0604020202020204" pitchFamily="34" charset="0"/>
+              </a:rPr>
+              <a:t>ESCUELA EN CADA SEDE</a:t>
+            </a:r>
+          </a:p>
+          <a:p>
+            <a:endParaRPr lang="es-CL" b="1" dirty="0">
+              <a:solidFill>
+                <a:srgbClr val="F8B416"/>
+              </a:solidFill>
+              <a:latin typeface="Arial" panose="020B0604020202020204" pitchFamily="34" charset="0"/>
+              <a:cs typeface="Arial" panose="020B0604020202020204" pitchFamily="34" charset="0"/>
+            </a:endParaRPr>
+          </a:p>
+        </p:txBody>
+      </p:sp>
+      <p:pic>
+        <p:nvPicPr>
+          <p:cNvPr id="15" name="Imagen 14" descr="Imagen que contiene Texto&#10;&#10;El contenido generado por IA puede ser incorrecto.">
+            <a:extLst>
+              <a:ext uri="{FF2B5EF4-FFF2-40B4-BE49-F238E27FC236}">
+                <a16:creationId xmlns:a16="http://schemas.microsoft.com/office/drawing/2014/main" id="{9AE34A6D-96A7-EA43-03FB-0BC3DD28CEAC}"/>
+              </a:ext>
+            </a:extLst>
+          </p:cNvPr>
+          <p:cNvPicPr>
+            <a:picLocks noChangeAspect="1"/>
+          </p:cNvPicPr>
+          <p:nvPr/>
+        </p:nvPicPr>
+        <p:blipFill>
+          <a:blip r:embed="rId2">
+            <a:extLst>
+              <a:ext uri="{28A0092B-C50C-407E-A947-70E740481C1C}">
+                <a14:useLocalDpi xmlns:a14="http://schemas.microsoft.com/office/drawing/2010/main" val="0"/>
+              </a:ext>
+            </a:extLst>
+          </a:blip>
+          <a:stretch>
+            <a:fillRect/>
+          </a:stretch>
+        </p:blipFill>
+        <p:spPr>
+          <a:xfrm>
+            <a:off x="8062451" y="693767"/>
+            <a:ext cx="1502645" cy="353122"/>
+          </a:xfrm>
+          <a:prstGeom prst="rect">
+            <a:avLst/>
+          </a:prstGeom>
+        </p:spPr>
+      </p:pic>
+      <p:pic>
+        <p:nvPicPr>
+          <p:cNvPr id="17" name="Imagen 16" descr="Logotipo&#10;&#10;El contenido generado por IA puede ser incorrecto.">
+            <a:extLst>
+              <a:ext uri="{FF2B5EF4-FFF2-40B4-BE49-F238E27FC236}">
+                <a16:creationId xmlns:a16="http://schemas.microsoft.com/office/drawing/2014/main" id="{4D5A63E9-12A2-B5AE-E38D-2BBB5ADF35BE}"/>
+              </a:ext>
+            </a:extLst>
+          </p:cNvPr>
+          <p:cNvPicPr>
+            <a:picLocks noChangeAspect="1"/>
+          </p:cNvPicPr>
+          <p:nvPr/>
+        </p:nvPicPr>
+        <p:blipFill>
+          <a:blip r:embed="rId3">
+            <a:extLst>
+              <a:ext uri="{28A0092B-C50C-407E-A947-70E740481C1C}">
+                <a14:useLocalDpi xmlns:a14="http://schemas.microsoft.com/office/drawing/2010/main" val="0"/>
+              </a:ext>
+            </a:extLst>
+          </a:blip>
+          <a:stretch>
+            <a:fillRect/>
+          </a:stretch>
+        </p:blipFill>
+        <p:spPr>
+          <a:xfrm>
+            <a:off x="9794655" y="693768"/>
+            <a:ext cx="1432628" cy="353122"/>
+          </a:xfrm>
+          <a:prstGeom prst="rect">
+            <a:avLst/>
+          </a:prstGeom>
+        </p:spPr>
+      </p:pic>
+      <p:sp>
+        <p:nvSpPr>
+          <p:cNvPr id="22" name="CuadroTexto 21">
+            <a:extLst>
+              <a:ext uri="{FF2B5EF4-FFF2-40B4-BE49-F238E27FC236}">
+                <a16:creationId xmlns:a16="http://schemas.microsoft.com/office/drawing/2014/main" id="{9B6BF0B7-1379-6C94-7362-8CC1E8B774BB}"/>
+              </a:ext>
+            </a:extLst>
+          </p:cNvPr>
+          <p:cNvSpPr txBox="1">
+            <a:spLocks/>
+          </p:cNvSpPr>
+          <p:nvPr/>
+        </p:nvSpPr>
+        <p:spPr>
+          <a:xfrm>
+            <a:off x="1622973" y="1702750"/>
+            <a:ext cx="8171682" cy="4108359"/>
+          </a:xfrm>
+          <a:prstGeom prst="rect">
+            <a:avLst/>
+          </a:prstGeom>
+          <a:noFill/>
+        </p:spPr>
+        <p:txBody>
+          <a:bodyPr wrap="square" rtlCol="0">
+            <a:noAutofit/>
+          </a:bodyPr>
+          <a:lstStyle/>
+          <a:p>
+            <a:r>
+              <a:rPr lang="es-ES" dirty="0"/>
+              <a:t>tabla_resumen_escuela_en_cada_sede_9</a:t>
+            </a:r>
+          </a:p>
+        </p:txBody>
+      </p:sp>
+    </p:spTree>
+    <p:extLst>
+      <p:ext uri="{BB962C8B-B14F-4D97-AF65-F5344CB8AC3E}">
+        <p14:creationId xmlns:p14="http://schemas.microsoft.com/office/powerpoint/2010/main" val="1413913867"/>
+      </p:ext>
+    </p:extLst>
+  </p:cSld>
+  <p:clrMapOvr>
+    <a:masterClrMapping/>
+  </p:clrMapOvr>
+</p:sld>
+</file>
+
+<file path=ppt/slides/slide13.xml><?xml version="1.0" encoding="utf-8"?>
+<p:sld xmlns:a="http://schemas.openxmlformats.org/drawingml/2006/main" xmlns:r="http://schemas.openxmlformats.org/officeDocument/2006/relationships" xmlns:p="http://schemas.openxmlformats.org/presentationml/2006/main">
+  <p:cSld>
+    <p:spTree>
+      <p:nvGrpSpPr>
+        <p:cNvPr id="1" name="">
+          <a:extLst>
+            <a:ext uri="{FF2B5EF4-FFF2-40B4-BE49-F238E27FC236}">
+              <a16:creationId xmlns:a16="http://schemas.microsoft.com/office/drawing/2014/main" id="{7EEE68D9-551F-4FE1-EF4B-9B735B47BBB5}"/>
+            </a:ext>
+          </a:extLst>
+        </p:cNvPr>
+        <p:cNvGrpSpPr/>
+        <p:nvPr/>
+      </p:nvGrpSpPr>
+      <p:grpSpPr>
+        <a:xfrm>
+          <a:off x="0" y="0"/>
+          <a:ext cx="0" cy="0"/>
+          <a:chOff x="0" y="0"/>
+          <a:chExt cx="0" cy="0"/>
+        </a:xfrm>
+      </p:grpSpPr>
+      <p:sp>
+        <p:nvSpPr>
+          <p:cNvPr id="5" name="Rectángulo 4">
+            <a:extLst>
+              <a:ext uri="{FF2B5EF4-FFF2-40B4-BE49-F238E27FC236}">
+                <a16:creationId xmlns:a16="http://schemas.microsoft.com/office/drawing/2014/main" id="{8F3507A5-541C-C0D6-0FA1-778E04E32DF5}"/>
+              </a:ext>
+            </a:extLst>
+          </p:cNvPr>
+          <p:cNvSpPr/>
+          <p:nvPr/>
+        </p:nvSpPr>
+        <p:spPr>
+          <a:xfrm>
+            <a:off x="678426" y="294968"/>
+            <a:ext cx="4168877" cy="127819"/>
+          </a:xfrm>
+          <a:prstGeom prst="rect">
+            <a:avLst/>
+          </a:prstGeom>
+          <a:solidFill>
+            <a:schemeClr val="tx1"/>
+          </a:solidFill>
+        </p:spPr>
+        <p:style>
+          <a:lnRef idx="2">
+            <a:schemeClr val="accent1">
+              <a:shade val="15000"/>
+            </a:schemeClr>
+          </a:lnRef>
+          <a:fillRef idx="1">
+            <a:schemeClr val="accent1"/>
+          </a:fillRef>
+          <a:effectRef idx="0">
+            <a:schemeClr val="accent1"/>
+          </a:effectRef>
+          <a:fontRef idx="minor">
+            <a:schemeClr val="lt1"/>
+          </a:fontRef>
+        </p:style>
+        <p:txBody>
+          <a:bodyPr rtlCol="0" anchor="ctr"/>
+          <a:lstStyle/>
+          <a:p>
+            <a:pPr algn="ctr"/>
+            <a:endParaRPr lang="es-CL"/>
+          </a:p>
+        </p:txBody>
+      </p:sp>
+      <p:sp>
+        <p:nvSpPr>
+          <p:cNvPr id="6" name="Rectángulo 5">
+            <a:extLst>
+              <a:ext uri="{FF2B5EF4-FFF2-40B4-BE49-F238E27FC236}">
+                <a16:creationId xmlns:a16="http://schemas.microsoft.com/office/drawing/2014/main" id="{AD0E5985-2304-3B67-D370-2F0FA81ADDE0}"/>
+              </a:ext>
+            </a:extLst>
+          </p:cNvPr>
+          <p:cNvSpPr/>
+          <p:nvPr/>
+        </p:nvSpPr>
+        <p:spPr>
+          <a:xfrm>
+            <a:off x="678426" y="6435213"/>
+            <a:ext cx="4168877" cy="127819"/>
+          </a:xfrm>
+          <a:prstGeom prst="rect">
+            <a:avLst/>
+          </a:prstGeom>
+          <a:solidFill>
+            <a:schemeClr val="tx1"/>
+          </a:solidFill>
+        </p:spPr>
+        <p:style>
+          <a:lnRef idx="2">
+            <a:schemeClr val="accent1">
+              <a:shade val="15000"/>
+            </a:schemeClr>
+          </a:lnRef>
+          <a:fillRef idx="1">
+            <a:schemeClr val="accent1"/>
+          </a:fillRef>
+          <a:effectRef idx="0">
+            <a:schemeClr val="accent1"/>
+          </a:effectRef>
+          <a:fontRef idx="minor">
+            <a:schemeClr val="lt1"/>
+          </a:fontRef>
+        </p:style>
+        <p:txBody>
+          <a:bodyPr rtlCol="0" anchor="ctr"/>
+          <a:lstStyle/>
+          <a:p>
+            <a:pPr algn="ctr"/>
+            <a:endParaRPr lang="es-CL"/>
+          </a:p>
+        </p:txBody>
+      </p:sp>
+      <p:sp>
+        <p:nvSpPr>
+          <p:cNvPr id="7" name="Rectángulo 6">
+            <a:extLst>
+              <a:ext uri="{FF2B5EF4-FFF2-40B4-BE49-F238E27FC236}">
+                <a16:creationId xmlns:a16="http://schemas.microsoft.com/office/drawing/2014/main" id="{77B54906-DCC0-02D0-BC0D-7604CA8A795F}"/>
+              </a:ext>
+            </a:extLst>
+          </p:cNvPr>
+          <p:cNvSpPr/>
+          <p:nvPr/>
+        </p:nvSpPr>
+        <p:spPr>
+          <a:xfrm>
+            <a:off x="4847303" y="294967"/>
+            <a:ext cx="6666271" cy="127819"/>
+          </a:xfrm>
+          <a:prstGeom prst="rect">
+            <a:avLst/>
+          </a:prstGeom>
+          <a:solidFill>
+            <a:srgbClr val="F8B416"/>
+          </a:solidFill>
+        </p:spPr>
+        <p:style>
+          <a:lnRef idx="2">
+            <a:schemeClr val="accent1">
+              <a:shade val="15000"/>
+            </a:schemeClr>
+          </a:lnRef>
+          <a:fillRef idx="1">
+            <a:schemeClr val="accent1"/>
+          </a:fillRef>
+          <a:effectRef idx="0">
+            <a:schemeClr val="accent1"/>
+          </a:effectRef>
+          <a:fontRef idx="minor">
+            <a:schemeClr val="lt1"/>
+          </a:fontRef>
+        </p:style>
+        <p:txBody>
+          <a:bodyPr rtlCol="0" anchor="ctr"/>
+          <a:lstStyle/>
+          <a:p>
+            <a:pPr algn="ctr"/>
+            <a:endParaRPr lang="es-CL" dirty="0">
+              <a:solidFill>
+                <a:srgbClr val="F8B416"/>
+              </a:solidFill>
+              <a:highlight>
+                <a:srgbClr val="FFFF00"/>
+              </a:highlight>
+            </a:endParaRPr>
+          </a:p>
+        </p:txBody>
+      </p:sp>
+      <p:sp>
+        <p:nvSpPr>
+          <p:cNvPr id="8" name="Rectángulo 7">
+            <a:extLst>
+              <a:ext uri="{FF2B5EF4-FFF2-40B4-BE49-F238E27FC236}">
+                <a16:creationId xmlns:a16="http://schemas.microsoft.com/office/drawing/2014/main" id="{F62CB2F5-3CF5-EAD9-B1AF-CE13D6617112}"/>
+              </a:ext>
+            </a:extLst>
+          </p:cNvPr>
+          <p:cNvSpPr/>
+          <p:nvPr/>
+        </p:nvSpPr>
+        <p:spPr>
+          <a:xfrm>
+            <a:off x="4847303" y="6435213"/>
+            <a:ext cx="6666271" cy="127819"/>
+          </a:xfrm>
+          <a:prstGeom prst="rect">
+            <a:avLst/>
+          </a:prstGeom>
+          <a:solidFill>
+            <a:srgbClr val="F8B416"/>
+          </a:solidFill>
+        </p:spPr>
+        <p:style>
+          <a:lnRef idx="2">
+            <a:schemeClr val="accent1">
+              <a:shade val="15000"/>
+            </a:schemeClr>
+          </a:lnRef>
+          <a:fillRef idx="1">
+            <a:schemeClr val="accent1"/>
+          </a:fillRef>
+          <a:effectRef idx="0">
+            <a:schemeClr val="accent1"/>
+          </a:effectRef>
+          <a:fontRef idx="minor">
+            <a:schemeClr val="lt1"/>
+          </a:fontRef>
+        </p:style>
+        <p:txBody>
+          <a:bodyPr rtlCol="0" anchor="ctr"/>
+          <a:lstStyle/>
+          <a:p>
+            <a:pPr algn="ctr"/>
+            <a:endParaRPr lang="es-CL"/>
+          </a:p>
+        </p:txBody>
+      </p:sp>
+      <p:sp>
+        <p:nvSpPr>
+          <p:cNvPr id="10" name="CuadroTexto 9">
+            <a:extLst>
+              <a:ext uri="{FF2B5EF4-FFF2-40B4-BE49-F238E27FC236}">
+                <a16:creationId xmlns:a16="http://schemas.microsoft.com/office/drawing/2014/main" id="{64955C6B-68EE-C1D7-6B06-1C81E9E64712}"/>
+              </a:ext>
+            </a:extLst>
+          </p:cNvPr>
+          <p:cNvSpPr txBox="1"/>
+          <p:nvPr/>
+        </p:nvSpPr>
+        <p:spPr>
+          <a:xfrm>
+            <a:off x="678426" y="523257"/>
+            <a:ext cx="5996694" cy="923330"/>
+          </a:xfrm>
+          <a:prstGeom prst="rect">
+            <a:avLst/>
+          </a:prstGeom>
+          <a:noFill/>
+        </p:spPr>
+        <p:txBody>
+          <a:bodyPr wrap="square" rtlCol="0">
+            <a:spAutoFit/>
+          </a:bodyPr>
+          <a:lstStyle/>
+          <a:p>
+            <a:r>
+              <a:rPr lang="es-CL" b="1" dirty="0">
+                <a:solidFill>
+                  <a:srgbClr val="F8B416"/>
+                </a:solidFill>
+                <a:latin typeface="Arial" panose="020B0604020202020204" pitchFamily="34" charset="0"/>
+                <a:cs typeface="Arial" panose="020B0604020202020204" pitchFamily="34" charset="0"/>
+              </a:rPr>
+              <a:t>RADIOGRAFÍA DEL BIENESTAR DUOC UC 2025</a:t>
+            </a:r>
+          </a:p>
+          <a:p>
+            <a:r>
+              <a:rPr lang="es-CL" b="1" dirty="0">
+                <a:solidFill>
+                  <a:schemeClr val="tx1">
+                    <a:lumMod val="50000"/>
+                    <a:lumOff val="50000"/>
+                  </a:schemeClr>
+                </a:solidFill>
+                <a:latin typeface="Arial" panose="020B0604020202020204" pitchFamily="34" charset="0"/>
+                <a:cs typeface="Arial" panose="020B0604020202020204" pitchFamily="34" charset="0"/>
+              </a:rPr>
+              <a:t>Tasa de respuestas por </a:t>
+            </a:r>
+            <a:r>
+              <a:rPr lang="es-CL" b="1" dirty="0">
+                <a:latin typeface="Arial" panose="020B0604020202020204" pitchFamily="34" charset="0"/>
+                <a:cs typeface="Arial" panose="020B0604020202020204" pitchFamily="34" charset="0"/>
+              </a:rPr>
+              <a:t>ESCUELA EN CADA SEDE</a:t>
+            </a:r>
+          </a:p>
+          <a:p>
+            <a:endParaRPr lang="es-CL" b="1" dirty="0">
+              <a:solidFill>
+                <a:srgbClr val="F8B416"/>
+              </a:solidFill>
+              <a:latin typeface="Arial" panose="020B0604020202020204" pitchFamily="34" charset="0"/>
+              <a:cs typeface="Arial" panose="020B0604020202020204" pitchFamily="34" charset="0"/>
+            </a:endParaRPr>
+          </a:p>
+        </p:txBody>
+      </p:sp>
+      <p:pic>
+        <p:nvPicPr>
+          <p:cNvPr id="15" name="Imagen 14" descr="Imagen que contiene Texto&#10;&#10;El contenido generado por IA puede ser incorrecto.">
+            <a:extLst>
+              <a:ext uri="{FF2B5EF4-FFF2-40B4-BE49-F238E27FC236}">
+                <a16:creationId xmlns:a16="http://schemas.microsoft.com/office/drawing/2014/main" id="{A5DB1840-F31E-7659-A18B-84E7DE4CB747}"/>
+              </a:ext>
+            </a:extLst>
+          </p:cNvPr>
+          <p:cNvPicPr>
+            <a:picLocks noChangeAspect="1"/>
+          </p:cNvPicPr>
+          <p:nvPr/>
+        </p:nvPicPr>
+        <p:blipFill>
+          <a:blip r:embed="rId2">
+            <a:extLst>
+              <a:ext uri="{28A0092B-C50C-407E-A947-70E740481C1C}">
+                <a14:useLocalDpi xmlns:a14="http://schemas.microsoft.com/office/drawing/2010/main" val="0"/>
+              </a:ext>
+            </a:extLst>
+          </a:blip>
+          <a:stretch>
+            <a:fillRect/>
+          </a:stretch>
+        </p:blipFill>
+        <p:spPr>
+          <a:xfrm>
+            <a:off x="8062451" y="693767"/>
+            <a:ext cx="1502645" cy="353122"/>
+          </a:xfrm>
+          <a:prstGeom prst="rect">
+            <a:avLst/>
+          </a:prstGeom>
+        </p:spPr>
+      </p:pic>
+      <p:pic>
+        <p:nvPicPr>
+          <p:cNvPr id="17" name="Imagen 16" descr="Logotipo&#10;&#10;El contenido generado por IA puede ser incorrecto.">
+            <a:extLst>
+              <a:ext uri="{FF2B5EF4-FFF2-40B4-BE49-F238E27FC236}">
+                <a16:creationId xmlns:a16="http://schemas.microsoft.com/office/drawing/2014/main" id="{B55B3664-E25D-F68D-8AAC-F770C520DD4D}"/>
+              </a:ext>
+            </a:extLst>
+          </p:cNvPr>
+          <p:cNvPicPr>
+            <a:picLocks noChangeAspect="1"/>
+          </p:cNvPicPr>
+          <p:nvPr/>
+        </p:nvPicPr>
+        <p:blipFill>
+          <a:blip r:embed="rId3">
+            <a:extLst>
+              <a:ext uri="{28A0092B-C50C-407E-A947-70E740481C1C}">
+                <a14:useLocalDpi xmlns:a14="http://schemas.microsoft.com/office/drawing/2010/main" val="0"/>
+              </a:ext>
+            </a:extLst>
+          </a:blip>
+          <a:stretch>
+            <a:fillRect/>
+          </a:stretch>
+        </p:blipFill>
+        <p:spPr>
+          <a:xfrm>
+            <a:off x="9794655" y="693768"/>
+            <a:ext cx="1432628" cy="353122"/>
+          </a:xfrm>
+          <a:prstGeom prst="rect">
+            <a:avLst/>
+          </a:prstGeom>
+        </p:spPr>
+      </p:pic>
+      <p:sp>
+        <p:nvSpPr>
+          <p:cNvPr id="22" name="CuadroTexto 21">
+            <a:extLst>
+              <a:ext uri="{FF2B5EF4-FFF2-40B4-BE49-F238E27FC236}">
+                <a16:creationId xmlns:a16="http://schemas.microsoft.com/office/drawing/2014/main" id="{0CF07933-B54C-10C1-54E2-6D0FD06F91A4}"/>
+              </a:ext>
+            </a:extLst>
+          </p:cNvPr>
+          <p:cNvSpPr txBox="1">
+            <a:spLocks/>
+          </p:cNvSpPr>
+          <p:nvPr/>
+        </p:nvSpPr>
+        <p:spPr>
+          <a:xfrm>
+            <a:off x="1622973" y="1702750"/>
+            <a:ext cx="8171682" cy="4108359"/>
+          </a:xfrm>
+          <a:prstGeom prst="rect">
+            <a:avLst/>
+          </a:prstGeom>
+          <a:noFill/>
+        </p:spPr>
+        <p:txBody>
+          <a:bodyPr wrap="square" rtlCol="0">
+            <a:noAutofit/>
+          </a:bodyPr>
+          <a:lstStyle/>
+          <a:p>
+            <a:r>
+              <a:rPr lang="es-ES" dirty="0"/>
+              <a:t>tabla_resumen_escuela_en_cada_sede_10</a:t>
+            </a:r>
+          </a:p>
+        </p:txBody>
+      </p:sp>
+    </p:spTree>
+    <p:extLst>
+      <p:ext uri="{BB962C8B-B14F-4D97-AF65-F5344CB8AC3E}">
+        <p14:creationId xmlns:p14="http://schemas.microsoft.com/office/powerpoint/2010/main" val="661849596"/>
+      </p:ext>
+    </p:extLst>
+  </p:cSld>
+  <p:clrMapOvr>
+    <a:masterClrMapping/>
+  </p:clrMapOvr>
+</p:sld>
+</file>
+
+<file path=ppt/slides/slide14.xml><?xml version="1.0" encoding="utf-8"?>
+<p:sld xmlns:a="http://schemas.openxmlformats.org/drawingml/2006/main" xmlns:r="http://schemas.openxmlformats.org/officeDocument/2006/relationships" xmlns:p="http://schemas.openxmlformats.org/presentationml/2006/main">
+  <p:cSld>
+    <p:spTree>
+      <p:nvGrpSpPr>
+        <p:cNvPr id="1" name="">
+          <a:extLst>
+            <a:ext uri="{FF2B5EF4-FFF2-40B4-BE49-F238E27FC236}">
+              <a16:creationId xmlns:a16="http://schemas.microsoft.com/office/drawing/2014/main" id="{57D02931-3F74-BA53-5135-4A8E5E791CC2}"/>
+            </a:ext>
+          </a:extLst>
+        </p:cNvPr>
+        <p:cNvGrpSpPr/>
+        <p:nvPr/>
+      </p:nvGrpSpPr>
+      <p:grpSpPr>
+        <a:xfrm>
+          <a:off x="0" y="0"/>
+          <a:ext cx="0" cy="0"/>
+          <a:chOff x="0" y="0"/>
+          <a:chExt cx="0" cy="0"/>
+        </a:xfrm>
+      </p:grpSpPr>
+      <p:sp>
+        <p:nvSpPr>
+          <p:cNvPr id="5" name="Rectángulo 4">
+            <a:extLst>
+              <a:ext uri="{FF2B5EF4-FFF2-40B4-BE49-F238E27FC236}">
+                <a16:creationId xmlns:a16="http://schemas.microsoft.com/office/drawing/2014/main" id="{3FF375EA-994A-16BA-DE68-7485E99C3C00}"/>
+              </a:ext>
+            </a:extLst>
+          </p:cNvPr>
+          <p:cNvSpPr/>
+          <p:nvPr/>
+        </p:nvSpPr>
+        <p:spPr>
+          <a:xfrm>
+            <a:off x="678426" y="294968"/>
+            <a:ext cx="4168877" cy="127819"/>
+          </a:xfrm>
+          <a:prstGeom prst="rect">
+            <a:avLst/>
+          </a:prstGeom>
+          <a:solidFill>
+            <a:schemeClr val="tx1"/>
+          </a:solidFill>
+        </p:spPr>
+        <p:style>
+          <a:lnRef idx="2">
+            <a:schemeClr val="accent1">
+              <a:shade val="15000"/>
+            </a:schemeClr>
+          </a:lnRef>
+          <a:fillRef idx="1">
+            <a:schemeClr val="accent1"/>
+          </a:fillRef>
+          <a:effectRef idx="0">
+            <a:schemeClr val="accent1"/>
+          </a:effectRef>
+          <a:fontRef idx="minor">
+            <a:schemeClr val="lt1"/>
+          </a:fontRef>
+        </p:style>
+        <p:txBody>
+          <a:bodyPr rtlCol="0" anchor="ctr"/>
+          <a:lstStyle/>
+          <a:p>
+            <a:pPr algn="ctr"/>
+            <a:endParaRPr lang="es-CL"/>
+          </a:p>
+        </p:txBody>
+      </p:sp>
+      <p:sp>
+        <p:nvSpPr>
+          <p:cNvPr id="6" name="Rectángulo 5">
+            <a:extLst>
+              <a:ext uri="{FF2B5EF4-FFF2-40B4-BE49-F238E27FC236}">
+                <a16:creationId xmlns:a16="http://schemas.microsoft.com/office/drawing/2014/main" id="{1BDF2406-372F-6C5D-B791-D69CA3DDE254}"/>
+              </a:ext>
+            </a:extLst>
+          </p:cNvPr>
+          <p:cNvSpPr/>
+          <p:nvPr/>
+        </p:nvSpPr>
+        <p:spPr>
+          <a:xfrm>
+            <a:off x="678426" y="6435213"/>
+            <a:ext cx="4168877" cy="127819"/>
+          </a:xfrm>
+          <a:prstGeom prst="rect">
+            <a:avLst/>
+          </a:prstGeom>
+          <a:solidFill>
+            <a:schemeClr val="tx1"/>
+          </a:solidFill>
+        </p:spPr>
+        <p:style>
+          <a:lnRef idx="2">
+            <a:schemeClr val="accent1">
+              <a:shade val="15000"/>
+            </a:schemeClr>
+          </a:lnRef>
+          <a:fillRef idx="1">
+            <a:schemeClr val="accent1"/>
+          </a:fillRef>
+          <a:effectRef idx="0">
+            <a:schemeClr val="accent1"/>
+          </a:effectRef>
+          <a:fontRef idx="minor">
+            <a:schemeClr val="lt1"/>
+          </a:fontRef>
+        </p:style>
+        <p:txBody>
+          <a:bodyPr rtlCol="0" anchor="ctr"/>
+          <a:lstStyle/>
+          <a:p>
+            <a:pPr algn="ctr"/>
+            <a:endParaRPr lang="es-CL"/>
+          </a:p>
+        </p:txBody>
+      </p:sp>
+      <p:sp>
+        <p:nvSpPr>
+          <p:cNvPr id="7" name="Rectángulo 6">
+            <a:extLst>
+              <a:ext uri="{FF2B5EF4-FFF2-40B4-BE49-F238E27FC236}">
+                <a16:creationId xmlns:a16="http://schemas.microsoft.com/office/drawing/2014/main" id="{68E567A7-1EDE-3B3A-7973-BFAA2830D6EE}"/>
+              </a:ext>
+            </a:extLst>
+          </p:cNvPr>
+          <p:cNvSpPr/>
+          <p:nvPr/>
+        </p:nvSpPr>
+        <p:spPr>
+          <a:xfrm>
+            <a:off x="4847303" y="294967"/>
+            <a:ext cx="6666271" cy="127819"/>
+          </a:xfrm>
+          <a:prstGeom prst="rect">
+            <a:avLst/>
+          </a:prstGeom>
+          <a:solidFill>
+            <a:srgbClr val="F8B416"/>
+          </a:solidFill>
+        </p:spPr>
+        <p:style>
+          <a:lnRef idx="2">
+            <a:schemeClr val="accent1">
+              <a:shade val="15000"/>
+            </a:schemeClr>
+          </a:lnRef>
+          <a:fillRef idx="1">
+            <a:schemeClr val="accent1"/>
+          </a:fillRef>
+          <a:effectRef idx="0">
+            <a:schemeClr val="accent1"/>
+          </a:effectRef>
+          <a:fontRef idx="minor">
+            <a:schemeClr val="lt1"/>
+          </a:fontRef>
+        </p:style>
+        <p:txBody>
+          <a:bodyPr rtlCol="0" anchor="ctr"/>
+          <a:lstStyle/>
+          <a:p>
+            <a:pPr algn="ctr"/>
+            <a:endParaRPr lang="es-CL" dirty="0">
+              <a:solidFill>
+                <a:srgbClr val="F8B416"/>
+              </a:solidFill>
+              <a:highlight>
+                <a:srgbClr val="FFFF00"/>
+              </a:highlight>
+            </a:endParaRPr>
+          </a:p>
+        </p:txBody>
+      </p:sp>
+      <p:sp>
+        <p:nvSpPr>
+          <p:cNvPr id="8" name="Rectángulo 7">
+            <a:extLst>
+              <a:ext uri="{FF2B5EF4-FFF2-40B4-BE49-F238E27FC236}">
+                <a16:creationId xmlns:a16="http://schemas.microsoft.com/office/drawing/2014/main" id="{DF3BB76E-5824-D773-9D5C-2E2CDE61011F}"/>
+              </a:ext>
+            </a:extLst>
+          </p:cNvPr>
+          <p:cNvSpPr/>
+          <p:nvPr/>
+        </p:nvSpPr>
+        <p:spPr>
+          <a:xfrm>
+            <a:off x="4847303" y="6435213"/>
+            <a:ext cx="6666271" cy="127819"/>
+          </a:xfrm>
+          <a:prstGeom prst="rect">
+            <a:avLst/>
+          </a:prstGeom>
+          <a:solidFill>
+            <a:srgbClr val="F8B416"/>
+          </a:solidFill>
+        </p:spPr>
+        <p:style>
+          <a:lnRef idx="2">
+            <a:schemeClr val="accent1">
+              <a:shade val="15000"/>
+            </a:schemeClr>
+          </a:lnRef>
+          <a:fillRef idx="1">
+            <a:schemeClr val="accent1"/>
+          </a:fillRef>
+          <a:effectRef idx="0">
+            <a:schemeClr val="accent1"/>
+          </a:effectRef>
+          <a:fontRef idx="minor">
+            <a:schemeClr val="lt1"/>
+          </a:fontRef>
+        </p:style>
+        <p:txBody>
+          <a:bodyPr rtlCol="0" anchor="ctr"/>
+          <a:lstStyle/>
+          <a:p>
+            <a:pPr algn="ctr"/>
+            <a:endParaRPr lang="es-CL"/>
+          </a:p>
+        </p:txBody>
+      </p:sp>
+      <p:sp>
+        <p:nvSpPr>
+          <p:cNvPr id="10" name="CuadroTexto 9">
+            <a:extLst>
+              <a:ext uri="{FF2B5EF4-FFF2-40B4-BE49-F238E27FC236}">
+                <a16:creationId xmlns:a16="http://schemas.microsoft.com/office/drawing/2014/main" id="{E39905D6-8D43-A983-779E-53916D3AA373}"/>
+              </a:ext>
+            </a:extLst>
+          </p:cNvPr>
+          <p:cNvSpPr txBox="1"/>
+          <p:nvPr/>
+        </p:nvSpPr>
+        <p:spPr>
+          <a:xfrm>
+            <a:off x="678426" y="523257"/>
+            <a:ext cx="5996694" cy="923330"/>
+          </a:xfrm>
+          <a:prstGeom prst="rect">
+            <a:avLst/>
+          </a:prstGeom>
+          <a:noFill/>
+        </p:spPr>
+        <p:txBody>
+          <a:bodyPr wrap="square" rtlCol="0">
+            <a:spAutoFit/>
+          </a:bodyPr>
+          <a:lstStyle/>
+          <a:p>
+            <a:r>
+              <a:rPr lang="es-CL" b="1" dirty="0">
+                <a:solidFill>
+                  <a:srgbClr val="F8B416"/>
+                </a:solidFill>
+                <a:latin typeface="Arial" panose="020B0604020202020204" pitchFamily="34" charset="0"/>
+                <a:cs typeface="Arial" panose="020B0604020202020204" pitchFamily="34" charset="0"/>
+              </a:rPr>
+              <a:t>RADIOGRAFÍA DEL BIENESTAR DUOC UC 2025</a:t>
+            </a:r>
+          </a:p>
+          <a:p>
+            <a:r>
+              <a:rPr lang="es-CL" b="1" dirty="0">
+                <a:solidFill>
+                  <a:schemeClr val="tx1">
+                    <a:lumMod val="50000"/>
+                    <a:lumOff val="50000"/>
+                  </a:schemeClr>
+                </a:solidFill>
+                <a:latin typeface="Arial" panose="020B0604020202020204" pitchFamily="34" charset="0"/>
+                <a:cs typeface="Arial" panose="020B0604020202020204" pitchFamily="34" charset="0"/>
+              </a:rPr>
+              <a:t>Tasa de respuestas por </a:t>
+            </a:r>
+            <a:r>
+              <a:rPr lang="es-CL" b="1" dirty="0">
+                <a:latin typeface="Arial" panose="020B0604020202020204" pitchFamily="34" charset="0"/>
+                <a:cs typeface="Arial" panose="020B0604020202020204" pitchFamily="34" charset="0"/>
+              </a:rPr>
+              <a:t>ESCUELA EN CADA SEDE</a:t>
+            </a:r>
+          </a:p>
+          <a:p>
+            <a:endParaRPr lang="es-CL" b="1" dirty="0">
+              <a:solidFill>
+                <a:srgbClr val="F8B416"/>
+              </a:solidFill>
+              <a:latin typeface="Arial" panose="020B0604020202020204" pitchFamily="34" charset="0"/>
+              <a:cs typeface="Arial" panose="020B0604020202020204" pitchFamily="34" charset="0"/>
+            </a:endParaRPr>
+          </a:p>
+        </p:txBody>
+      </p:sp>
+      <p:pic>
+        <p:nvPicPr>
+          <p:cNvPr id="15" name="Imagen 14" descr="Imagen que contiene Texto&#10;&#10;El contenido generado por IA puede ser incorrecto.">
+            <a:extLst>
+              <a:ext uri="{FF2B5EF4-FFF2-40B4-BE49-F238E27FC236}">
+                <a16:creationId xmlns:a16="http://schemas.microsoft.com/office/drawing/2014/main" id="{E5AE9DEF-0588-892B-5C97-018768571078}"/>
+              </a:ext>
+            </a:extLst>
+          </p:cNvPr>
+          <p:cNvPicPr>
+            <a:picLocks noChangeAspect="1"/>
+          </p:cNvPicPr>
+          <p:nvPr/>
+        </p:nvPicPr>
+        <p:blipFill>
+          <a:blip r:embed="rId2">
+            <a:extLst>
+              <a:ext uri="{28A0092B-C50C-407E-A947-70E740481C1C}">
+                <a14:useLocalDpi xmlns:a14="http://schemas.microsoft.com/office/drawing/2010/main" val="0"/>
+              </a:ext>
+            </a:extLst>
+          </a:blip>
+          <a:stretch>
+            <a:fillRect/>
+          </a:stretch>
+        </p:blipFill>
+        <p:spPr>
+          <a:xfrm>
+            <a:off x="8062451" y="693767"/>
+            <a:ext cx="1502645" cy="353122"/>
+          </a:xfrm>
+          <a:prstGeom prst="rect">
+            <a:avLst/>
+          </a:prstGeom>
+        </p:spPr>
+      </p:pic>
+      <p:pic>
+        <p:nvPicPr>
+          <p:cNvPr id="17" name="Imagen 16" descr="Logotipo&#10;&#10;El contenido generado por IA puede ser incorrecto.">
+            <a:extLst>
+              <a:ext uri="{FF2B5EF4-FFF2-40B4-BE49-F238E27FC236}">
+                <a16:creationId xmlns:a16="http://schemas.microsoft.com/office/drawing/2014/main" id="{D6AA83B0-B689-709D-860A-13E0E245A7D8}"/>
+              </a:ext>
+            </a:extLst>
+          </p:cNvPr>
+          <p:cNvPicPr>
+            <a:picLocks noChangeAspect="1"/>
+          </p:cNvPicPr>
+          <p:nvPr/>
+        </p:nvPicPr>
+        <p:blipFill>
+          <a:blip r:embed="rId3">
+            <a:extLst>
+              <a:ext uri="{28A0092B-C50C-407E-A947-70E740481C1C}">
+                <a14:useLocalDpi xmlns:a14="http://schemas.microsoft.com/office/drawing/2010/main" val="0"/>
+              </a:ext>
+            </a:extLst>
+          </a:blip>
+          <a:stretch>
+            <a:fillRect/>
+          </a:stretch>
+        </p:blipFill>
+        <p:spPr>
+          <a:xfrm>
+            <a:off x="9794655" y="693768"/>
+            <a:ext cx="1432628" cy="353122"/>
+          </a:xfrm>
+          <a:prstGeom prst="rect">
+            <a:avLst/>
+          </a:prstGeom>
+        </p:spPr>
+      </p:pic>
+      <p:sp>
+        <p:nvSpPr>
+          <p:cNvPr id="22" name="CuadroTexto 21">
+            <a:extLst>
+              <a:ext uri="{FF2B5EF4-FFF2-40B4-BE49-F238E27FC236}">
+                <a16:creationId xmlns:a16="http://schemas.microsoft.com/office/drawing/2014/main" id="{CB164736-B540-D920-9BD1-AE71EF1F902F}"/>
+              </a:ext>
+            </a:extLst>
+          </p:cNvPr>
+          <p:cNvSpPr txBox="1">
+            <a:spLocks/>
+          </p:cNvSpPr>
+          <p:nvPr/>
+        </p:nvSpPr>
+        <p:spPr>
+          <a:xfrm>
+            <a:off x="1622973" y="1702750"/>
+            <a:ext cx="8171682" cy="4108359"/>
+          </a:xfrm>
+          <a:prstGeom prst="rect">
+            <a:avLst/>
+          </a:prstGeom>
+          <a:noFill/>
+        </p:spPr>
+        <p:txBody>
+          <a:bodyPr wrap="square" rtlCol="0">
+            <a:noAutofit/>
+          </a:bodyPr>
+          <a:lstStyle/>
+          <a:p>
+            <a:r>
+              <a:rPr lang="es-ES" dirty="0"/>
+              <a:t>tabla_resumen_escuela_en_cada_sede_11</a:t>
+            </a:r>
+          </a:p>
+        </p:txBody>
+      </p:sp>
+    </p:spTree>
+    <p:extLst>
+      <p:ext uri="{BB962C8B-B14F-4D97-AF65-F5344CB8AC3E}">
+        <p14:creationId xmlns:p14="http://schemas.microsoft.com/office/powerpoint/2010/main" val="2214213226"/>
+      </p:ext>
+    </p:extLst>
+  </p:cSld>
+  <p:clrMapOvr>
+    <a:masterClrMapping/>
+  </p:clrMapOvr>
+</p:sld>
+</file>
+
 <file path=ppt/slides/slide2.xml><?xml version="1.0" encoding="utf-8"?>
 <p:sld xmlns:a="http://schemas.openxmlformats.org/drawingml/2006/main" xmlns:r="http://schemas.openxmlformats.org/officeDocument/2006/relationships" xmlns:p="http://schemas.openxmlformats.org/presentationml/2006/main">
   <p:cSld>
@@ -5189,10 +7299,9 @@
           <a:lstStyle/>
           <a:p>
             <a:r>
-              <a:rPr lang="es-ES" dirty="0" err="1"/>
-              <a:t>tabla_resumen_escuela_en_cada_sede</a:t>
-            </a:r>
-            <a:endParaRPr lang="es-ES" dirty="0"/>
+              <a:rPr lang="es-ES" dirty="0"/>
+              <a:t>tabla_resumen_escuela_en_cada_sede_1</a:t>
+            </a:r>
           </a:p>
         </p:txBody>
       </p:sp>
@@ -5200,6 +7309,2106 @@
     <p:extLst>
       <p:ext uri="{BB962C8B-B14F-4D97-AF65-F5344CB8AC3E}">
         <p14:creationId xmlns:p14="http://schemas.microsoft.com/office/powerpoint/2010/main" val="301892137"/>
+      </p:ext>
+    </p:extLst>
+  </p:cSld>
+  <p:clrMapOvr>
+    <a:masterClrMapping/>
+  </p:clrMapOvr>
+</p:sld>
+</file>
+
+<file path=ppt/slides/slide5.xml><?xml version="1.0" encoding="utf-8"?>
+<p:sld xmlns:a="http://schemas.openxmlformats.org/drawingml/2006/main" xmlns:r="http://schemas.openxmlformats.org/officeDocument/2006/relationships" xmlns:p="http://schemas.openxmlformats.org/presentationml/2006/main">
+  <p:cSld>
+    <p:spTree>
+      <p:nvGrpSpPr>
+        <p:cNvPr id="1" name="">
+          <a:extLst>
+            <a:ext uri="{FF2B5EF4-FFF2-40B4-BE49-F238E27FC236}">
+              <a16:creationId xmlns:a16="http://schemas.microsoft.com/office/drawing/2014/main" id="{C2B15048-34A7-F09B-94EA-BB9E471877AA}"/>
+            </a:ext>
+          </a:extLst>
+        </p:cNvPr>
+        <p:cNvGrpSpPr/>
+        <p:nvPr/>
+      </p:nvGrpSpPr>
+      <p:grpSpPr>
+        <a:xfrm>
+          <a:off x="0" y="0"/>
+          <a:ext cx="0" cy="0"/>
+          <a:chOff x="0" y="0"/>
+          <a:chExt cx="0" cy="0"/>
+        </a:xfrm>
+      </p:grpSpPr>
+      <p:sp>
+        <p:nvSpPr>
+          <p:cNvPr id="5" name="Rectángulo 4">
+            <a:extLst>
+              <a:ext uri="{FF2B5EF4-FFF2-40B4-BE49-F238E27FC236}">
+                <a16:creationId xmlns:a16="http://schemas.microsoft.com/office/drawing/2014/main" id="{68FF454C-E443-42B9-3BD0-C45723EF1BFB}"/>
+              </a:ext>
+            </a:extLst>
+          </p:cNvPr>
+          <p:cNvSpPr/>
+          <p:nvPr/>
+        </p:nvSpPr>
+        <p:spPr>
+          <a:xfrm>
+            <a:off x="678426" y="294968"/>
+            <a:ext cx="4168877" cy="127819"/>
+          </a:xfrm>
+          <a:prstGeom prst="rect">
+            <a:avLst/>
+          </a:prstGeom>
+          <a:solidFill>
+            <a:schemeClr val="tx1"/>
+          </a:solidFill>
+        </p:spPr>
+        <p:style>
+          <a:lnRef idx="2">
+            <a:schemeClr val="accent1">
+              <a:shade val="15000"/>
+            </a:schemeClr>
+          </a:lnRef>
+          <a:fillRef idx="1">
+            <a:schemeClr val="accent1"/>
+          </a:fillRef>
+          <a:effectRef idx="0">
+            <a:schemeClr val="accent1"/>
+          </a:effectRef>
+          <a:fontRef idx="minor">
+            <a:schemeClr val="lt1"/>
+          </a:fontRef>
+        </p:style>
+        <p:txBody>
+          <a:bodyPr rtlCol="0" anchor="ctr"/>
+          <a:lstStyle/>
+          <a:p>
+            <a:pPr algn="ctr"/>
+            <a:endParaRPr lang="es-CL"/>
+          </a:p>
+        </p:txBody>
+      </p:sp>
+      <p:sp>
+        <p:nvSpPr>
+          <p:cNvPr id="6" name="Rectángulo 5">
+            <a:extLst>
+              <a:ext uri="{FF2B5EF4-FFF2-40B4-BE49-F238E27FC236}">
+                <a16:creationId xmlns:a16="http://schemas.microsoft.com/office/drawing/2014/main" id="{72A1CD60-53AD-FCE7-3EC5-F00B1D9B685D}"/>
+              </a:ext>
+            </a:extLst>
+          </p:cNvPr>
+          <p:cNvSpPr/>
+          <p:nvPr/>
+        </p:nvSpPr>
+        <p:spPr>
+          <a:xfrm>
+            <a:off x="678426" y="6435213"/>
+            <a:ext cx="4168877" cy="127819"/>
+          </a:xfrm>
+          <a:prstGeom prst="rect">
+            <a:avLst/>
+          </a:prstGeom>
+          <a:solidFill>
+            <a:schemeClr val="tx1"/>
+          </a:solidFill>
+        </p:spPr>
+        <p:style>
+          <a:lnRef idx="2">
+            <a:schemeClr val="accent1">
+              <a:shade val="15000"/>
+            </a:schemeClr>
+          </a:lnRef>
+          <a:fillRef idx="1">
+            <a:schemeClr val="accent1"/>
+          </a:fillRef>
+          <a:effectRef idx="0">
+            <a:schemeClr val="accent1"/>
+          </a:effectRef>
+          <a:fontRef idx="minor">
+            <a:schemeClr val="lt1"/>
+          </a:fontRef>
+        </p:style>
+        <p:txBody>
+          <a:bodyPr rtlCol="0" anchor="ctr"/>
+          <a:lstStyle/>
+          <a:p>
+            <a:pPr algn="ctr"/>
+            <a:endParaRPr lang="es-CL"/>
+          </a:p>
+        </p:txBody>
+      </p:sp>
+      <p:sp>
+        <p:nvSpPr>
+          <p:cNvPr id="7" name="Rectángulo 6">
+            <a:extLst>
+              <a:ext uri="{FF2B5EF4-FFF2-40B4-BE49-F238E27FC236}">
+                <a16:creationId xmlns:a16="http://schemas.microsoft.com/office/drawing/2014/main" id="{CF211CE6-074B-B09C-6F89-18372CED2A44}"/>
+              </a:ext>
+            </a:extLst>
+          </p:cNvPr>
+          <p:cNvSpPr/>
+          <p:nvPr/>
+        </p:nvSpPr>
+        <p:spPr>
+          <a:xfrm>
+            <a:off x="4847303" y="294967"/>
+            <a:ext cx="6666271" cy="127819"/>
+          </a:xfrm>
+          <a:prstGeom prst="rect">
+            <a:avLst/>
+          </a:prstGeom>
+          <a:solidFill>
+            <a:srgbClr val="F8B416"/>
+          </a:solidFill>
+        </p:spPr>
+        <p:style>
+          <a:lnRef idx="2">
+            <a:schemeClr val="accent1">
+              <a:shade val="15000"/>
+            </a:schemeClr>
+          </a:lnRef>
+          <a:fillRef idx="1">
+            <a:schemeClr val="accent1"/>
+          </a:fillRef>
+          <a:effectRef idx="0">
+            <a:schemeClr val="accent1"/>
+          </a:effectRef>
+          <a:fontRef idx="minor">
+            <a:schemeClr val="lt1"/>
+          </a:fontRef>
+        </p:style>
+        <p:txBody>
+          <a:bodyPr rtlCol="0" anchor="ctr"/>
+          <a:lstStyle/>
+          <a:p>
+            <a:pPr algn="ctr"/>
+            <a:endParaRPr lang="es-CL" dirty="0">
+              <a:solidFill>
+                <a:srgbClr val="F8B416"/>
+              </a:solidFill>
+              <a:highlight>
+                <a:srgbClr val="FFFF00"/>
+              </a:highlight>
+            </a:endParaRPr>
+          </a:p>
+        </p:txBody>
+      </p:sp>
+      <p:sp>
+        <p:nvSpPr>
+          <p:cNvPr id="8" name="Rectángulo 7">
+            <a:extLst>
+              <a:ext uri="{FF2B5EF4-FFF2-40B4-BE49-F238E27FC236}">
+                <a16:creationId xmlns:a16="http://schemas.microsoft.com/office/drawing/2014/main" id="{75C5F0B7-23D6-8FB7-B7ED-CC71AEFC1346}"/>
+              </a:ext>
+            </a:extLst>
+          </p:cNvPr>
+          <p:cNvSpPr/>
+          <p:nvPr/>
+        </p:nvSpPr>
+        <p:spPr>
+          <a:xfrm>
+            <a:off x="4847303" y="6435213"/>
+            <a:ext cx="6666271" cy="127819"/>
+          </a:xfrm>
+          <a:prstGeom prst="rect">
+            <a:avLst/>
+          </a:prstGeom>
+          <a:solidFill>
+            <a:srgbClr val="F8B416"/>
+          </a:solidFill>
+        </p:spPr>
+        <p:style>
+          <a:lnRef idx="2">
+            <a:schemeClr val="accent1">
+              <a:shade val="15000"/>
+            </a:schemeClr>
+          </a:lnRef>
+          <a:fillRef idx="1">
+            <a:schemeClr val="accent1"/>
+          </a:fillRef>
+          <a:effectRef idx="0">
+            <a:schemeClr val="accent1"/>
+          </a:effectRef>
+          <a:fontRef idx="minor">
+            <a:schemeClr val="lt1"/>
+          </a:fontRef>
+        </p:style>
+        <p:txBody>
+          <a:bodyPr rtlCol="0" anchor="ctr"/>
+          <a:lstStyle/>
+          <a:p>
+            <a:pPr algn="ctr"/>
+            <a:endParaRPr lang="es-CL"/>
+          </a:p>
+        </p:txBody>
+      </p:sp>
+      <p:sp>
+        <p:nvSpPr>
+          <p:cNvPr id="10" name="CuadroTexto 9">
+            <a:extLst>
+              <a:ext uri="{FF2B5EF4-FFF2-40B4-BE49-F238E27FC236}">
+                <a16:creationId xmlns:a16="http://schemas.microsoft.com/office/drawing/2014/main" id="{96EDA7FE-350C-D5AB-012B-DCEACD26F0D8}"/>
+              </a:ext>
+            </a:extLst>
+          </p:cNvPr>
+          <p:cNvSpPr txBox="1"/>
+          <p:nvPr/>
+        </p:nvSpPr>
+        <p:spPr>
+          <a:xfrm>
+            <a:off x="678426" y="523257"/>
+            <a:ext cx="5996694" cy="923330"/>
+          </a:xfrm>
+          <a:prstGeom prst="rect">
+            <a:avLst/>
+          </a:prstGeom>
+          <a:noFill/>
+        </p:spPr>
+        <p:txBody>
+          <a:bodyPr wrap="square" rtlCol="0">
+            <a:spAutoFit/>
+          </a:bodyPr>
+          <a:lstStyle/>
+          <a:p>
+            <a:r>
+              <a:rPr lang="es-CL" b="1" dirty="0">
+                <a:solidFill>
+                  <a:srgbClr val="F8B416"/>
+                </a:solidFill>
+                <a:latin typeface="Arial" panose="020B0604020202020204" pitchFamily="34" charset="0"/>
+                <a:cs typeface="Arial" panose="020B0604020202020204" pitchFamily="34" charset="0"/>
+              </a:rPr>
+              <a:t>RADIOGRAFÍA DEL BIENESTAR DUOC UC 2025</a:t>
+            </a:r>
+          </a:p>
+          <a:p>
+            <a:r>
+              <a:rPr lang="es-CL" b="1" dirty="0">
+                <a:solidFill>
+                  <a:schemeClr val="tx1">
+                    <a:lumMod val="50000"/>
+                    <a:lumOff val="50000"/>
+                  </a:schemeClr>
+                </a:solidFill>
+                <a:latin typeface="Arial" panose="020B0604020202020204" pitchFamily="34" charset="0"/>
+                <a:cs typeface="Arial" panose="020B0604020202020204" pitchFamily="34" charset="0"/>
+              </a:rPr>
+              <a:t>Tasa de respuestas por </a:t>
+            </a:r>
+            <a:r>
+              <a:rPr lang="es-CL" b="1" dirty="0">
+                <a:latin typeface="Arial" panose="020B0604020202020204" pitchFamily="34" charset="0"/>
+                <a:cs typeface="Arial" panose="020B0604020202020204" pitchFamily="34" charset="0"/>
+              </a:rPr>
+              <a:t>ESCUELA EN CADA SEDE</a:t>
+            </a:r>
+          </a:p>
+          <a:p>
+            <a:endParaRPr lang="es-CL" b="1" dirty="0">
+              <a:solidFill>
+                <a:srgbClr val="F8B416"/>
+              </a:solidFill>
+              <a:latin typeface="Arial" panose="020B0604020202020204" pitchFamily="34" charset="0"/>
+              <a:cs typeface="Arial" panose="020B0604020202020204" pitchFamily="34" charset="0"/>
+            </a:endParaRPr>
+          </a:p>
+        </p:txBody>
+      </p:sp>
+      <p:pic>
+        <p:nvPicPr>
+          <p:cNvPr id="15" name="Imagen 14" descr="Imagen que contiene Texto&#10;&#10;El contenido generado por IA puede ser incorrecto.">
+            <a:extLst>
+              <a:ext uri="{FF2B5EF4-FFF2-40B4-BE49-F238E27FC236}">
+                <a16:creationId xmlns:a16="http://schemas.microsoft.com/office/drawing/2014/main" id="{A81B8725-7E88-E321-5610-EFBDD096848F}"/>
+              </a:ext>
+            </a:extLst>
+          </p:cNvPr>
+          <p:cNvPicPr>
+            <a:picLocks noChangeAspect="1"/>
+          </p:cNvPicPr>
+          <p:nvPr/>
+        </p:nvPicPr>
+        <p:blipFill>
+          <a:blip r:embed="rId2">
+            <a:extLst>
+              <a:ext uri="{28A0092B-C50C-407E-A947-70E740481C1C}">
+                <a14:useLocalDpi xmlns:a14="http://schemas.microsoft.com/office/drawing/2010/main" val="0"/>
+              </a:ext>
+            </a:extLst>
+          </a:blip>
+          <a:stretch>
+            <a:fillRect/>
+          </a:stretch>
+        </p:blipFill>
+        <p:spPr>
+          <a:xfrm>
+            <a:off x="8062451" y="693767"/>
+            <a:ext cx="1502645" cy="353122"/>
+          </a:xfrm>
+          <a:prstGeom prst="rect">
+            <a:avLst/>
+          </a:prstGeom>
+        </p:spPr>
+      </p:pic>
+      <p:pic>
+        <p:nvPicPr>
+          <p:cNvPr id="17" name="Imagen 16" descr="Logotipo&#10;&#10;El contenido generado por IA puede ser incorrecto.">
+            <a:extLst>
+              <a:ext uri="{FF2B5EF4-FFF2-40B4-BE49-F238E27FC236}">
+                <a16:creationId xmlns:a16="http://schemas.microsoft.com/office/drawing/2014/main" id="{E956BE6F-095F-D128-806E-35F831A952F8}"/>
+              </a:ext>
+            </a:extLst>
+          </p:cNvPr>
+          <p:cNvPicPr>
+            <a:picLocks noChangeAspect="1"/>
+          </p:cNvPicPr>
+          <p:nvPr/>
+        </p:nvPicPr>
+        <p:blipFill>
+          <a:blip r:embed="rId3">
+            <a:extLst>
+              <a:ext uri="{28A0092B-C50C-407E-A947-70E740481C1C}">
+                <a14:useLocalDpi xmlns:a14="http://schemas.microsoft.com/office/drawing/2010/main" val="0"/>
+              </a:ext>
+            </a:extLst>
+          </a:blip>
+          <a:stretch>
+            <a:fillRect/>
+          </a:stretch>
+        </p:blipFill>
+        <p:spPr>
+          <a:xfrm>
+            <a:off x="9794655" y="693768"/>
+            <a:ext cx="1432628" cy="353122"/>
+          </a:xfrm>
+          <a:prstGeom prst="rect">
+            <a:avLst/>
+          </a:prstGeom>
+        </p:spPr>
+      </p:pic>
+      <p:sp>
+        <p:nvSpPr>
+          <p:cNvPr id="22" name="CuadroTexto 21">
+            <a:extLst>
+              <a:ext uri="{FF2B5EF4-FFF2-40B4-BE49-F238E27FC236}">
+                <a16:creationId xmlns:a16="http://schemas.microsoft.com/office/drawing/2014/main" id="{E9C0249B-3424-3B2C-25CA-9FABC87C2540}"/>
+              </a:ext>
+            </a:extLst>
+          </p:cNvPr>
+          <p:cNvSpPr txBox="1">
+            <a:spLocks/>
+          </p:cNvSpPr>
+          <p:nvPr/>
+        </p:nvSpPr>
+        <p:spPr>
+          <a:xfrm>
+            <a:off x="1622973" y="1702750"/>
+            <a:ext cx="8171682" cy="4108359"/>
+          </a:xfrm>
+          <a:prstGeom prst="rect">
+            <a:avLst/>
+          </a:prstGeom>
+          <a:noFill/>
+        </p:spPr>
+        <p:txBody>
+          <a:bodyPr wrap="square" rtlCol="0">
+            <a:noAutofit/>
+          </a:bodyPr>
+          <a:lstStyle/>
+          <a:p>
+            <a:r>
+              <a:rPr lang="es-ES" dirty="0"/>
+              <a:t>tabla_resumen_escuela_en_cada_sede_2</a:t>
+            </a:r>
+          </a:p>
+        </p:txBody>
+      </p:sp>
+    </p:spTree>
+    <p:extLst>
+      <p:ext uri="{BB962C8B-B14F-4D97-AF65-F5344CB8AC3E}">
+        <p14:creationId xmlns:p14="http://schemas.microsoft.com/office/powerpoint/2010/main" val="3172857500"/>
+      </p:ext>
+    </p:extLst>
+  </p:cSld>
+  <p:clrMapOvr>
+    <a:masterClrMapping/>
+  </p:clrMapOvr>
+</p:sld>
+</file>
+
+<file path=ppt/slides/slide6.xml><?xml version="1.0" encoding="utf-8"?>
+<p:sld xmlns:a="http://schemas.openxmlformats.org/drawingml/2006/main" xmlns:r="http://schemas.openxmlformats.org/officeDocument/2006/relationships" xmlns:p="http://schemas.openxmlformats.org/presentationml/2006/main">
+  <p:cSld>
+    <p:spTree>
+      <p:nvGrpSpPr>
+        <p:cNvPr id="1" name="">
+          <a:extLst>
+            <a:ext uri="{FF2B5EF4-FFF2-40B4-BE49-F238E27FC236}">
+              <a16:creationId xmlns:a16="http://schemas.microsoft.com/office/drawing/2014/main" id="{14AAF7CD-60B4-F23B-11DC-624EF648285D}"/>
+            </a:ext>
+          </a:extLst>
+        </p:cNvPr>
+        <p:cNvGrpSpPr/>
+        <p:nvPr/>
+      </p:nvGrpSpPr>
+      <p:grpSpPr>
+        <a:xfrm>
+          <a:off x="0" y="0"/>
+          <a:ext cx="0" cy="0"/>
+          <a:chOff x="0" y="0"/>
+          <a:chExt cx="0" cy="0"/>
+        </a:xfrm>
+      </p:grpSpPr>
+      <p:sp>
+        <p:nvSpPr>
+          <p:cNvPr id="5" name="Rectángulo 4">
+            <a:extLst>
+              <a:ext uri="{FF2B5EF4-FFF2-40B4-BE49-F238E27FC236}">
+                <a16:creationId xmlns:a16="http://schemas.microsoft.com/office/drawing/2014/main" id="{ACC86897-E3C3-A87F-E39E-7410B6EDE4AE}"/>
+              </a:ext>
+            </a:extLst>
+          </p:cNvPr>
+          <p:cNvSpPr/>
+          <p:nvPr/>
+        </p:nvSpPr>
+        <p:spPr>
+          <a:xfrm>
+            <a:off x="678426" y="294968"/>
+            <a:ext cx="4168877" cy="127819"/>
+          </a:xfrm>
+          <a:prstGeom prst="rect">
+            <a:avLst/>
+          </a:prstGeom>
+          <a:solidFill>
+            <a:schemeClr val="tx1"/>
+          </a:solidFill>
+        </p:spPr>
+        <p:style>
+          <a:lnRef idx="2">
+            <a:schemeClr val="accent1">
+              <a:shade val="15000"/>
+            </a:schemeClr>
+          </a:lnRef>
+          <a:fillRef idx="1">
+            <a:schemeClr val="accent1"/>
+          </a:fillRef>
+          <a:effectRef idx="0">
+            <a:schemeClr val="accent1"/>
+          </a:effectRef>
+          <a:fontRef idx="minor">
+            <a:schemeClr val="lt1"/>
+          </a:fontRef>
+        </p:style>
+        <p:txBody>
+          <a:bodyPr rtlCol="0" anchor="ctr"/>
+          <a:lstStyle/>
+          <a:p>
+            <a:pPr algn="ctr"/>
+            <a:endParaRPr lang="es-CL"/>
+          </a:p>
+        </p:txBody>
+      </p:sp>
+      <p:sp>
+        <p:nvSpPr>
+          <p:cNvPr id="6" name="Rectángulo 5">
+            <a:extLst>
+              <a:ext uri="{FF2B5EF4-FFF2-40B4-BE49-F238E27FC236}">
+                <a16:creationId xmlns:a16="http://schemas.microsoft.com/office/drawing/2014/main" id="{17BA4EE8-8F84-5D3D-2118-C9E5F2F2F609}"/>
+              </a:ext>
+            </a:extLst>
+          </p:cNvPr>
+          <p:cNvSpPr/>
+          <p:nvPr/>
+        </p:nvSpPr>
+        <p:spPr>
+          <a:xfrm>
+            <a:off x="678426" y="6435213"/>
+            <a:ext cx="4168877" cy="127819"/>
+          </a:xfrm>
+          <a:prstGeom prst="rect">
+            <a:avLst/>
+          </a:prstGeom>
+          <a:solidFill>
+            <a:schemeClr val="tx1"/>
+          </a:solidFill>
+        </p:spPr>
+        <p:style>
+          <a:lnRef idx="2">
+            <a:schemeClr val="accent1">
+              <a:shade val="15000"/>
+            </a:schemeClr>
+          </a:lnRef>
+          <a:fillRef idx="1">
+            <a:schemeClr val="accent1"/>
+          </a:fillRef>
+          <a:effectRef idx="0">
+            <a:schemeClr val="accent1"/>
+          </a:effectRef>
+          <a:fontRef idx="minor">
+            <a:schemeClr val="lt1"/>
+          </a:fontRef>
+        </p:style>
+        <p:txBody>
+          <a:bodyPr rtlCol="0" anchor="ctr"/>
+          <a:lstStyle/>
+          <a:p>
+            <a:pPr algn="ctr"/>
+            <a:endParaRPr lang="es-CL"/>
+          </a:p>
+        </p:txBody>
+      </p:sp>
+      <p:sp>
+        <p:nvSpPr>
+          <p:cNvPr id="7" name="Rectángulo 6">
+            <a:extLst>
+              <a:ext uri="{FF2B5EF4-FFF2-40B4-BE49-F238E27FC236}">
+                <a16:creationId xmlns:a16="http://schemas.microsoft.com/office/drawing/2014/main" id="{E9EECD14-0683-ED41-A1DD-78D61AF766EF}"/>
+              </a:ext>
+            </a:extLst>
+          </p:cNvPr>
+          <p:cNvSpPr/>
+          <p:nvPr/>
+        </p:nvSpPr>
+        <p:spPr>
+          <a:xfrm>
+            <a:off x="4847303" y="294967"/>
+            <a:ext cx="6666271" cy="127819"/>
+          </a:xfrm>
+          <a:prstGeom prst="rect">
+            <a:avLst/>
+          </a:prstGeom>
+          <a:solidFill>
+            <a:srgbClr val="F8B416"/>
+          </a:solidFill>
+        </p:spPr>
+        <p:style>
+          <a:lnRef idx="2">
+            <a:schemeClr val="accent1">
+              <a:shade val="15000"/>
+            </a:schemeClr>
+          </a:lnRef>
+          <a:fillRef idx="1">
+            <a:schemeClr val="accent1"/>
+          </a:fillRef>
+          <a:effectRef idx="0">
+            <a:schemeClr val="accent1"/>
+          </a:effectRef>
+          <a:fontRef idx="minor">
+            <a:schemeClr val="lt1"/>
+          </a:fontRef>
+        </p:style>
+        <p:txBody>
+          <a:bodyPr rtlCol="0" anchor="ctr"/>
+          <a:lstStyle/>
+          <a:p>
+            <a:pPr algn="ctr"/>
+            <a:endParaRPr lang="es-CL" dirty="0">
+              <a:solidFill>
+                <a:srgbClr val="F8B416"/>
+              </a:solidFill>
+              <a:highlight>
+                <a:srgbClr val="FFFF00"/>
+              </a:highlight>
+            </a:endParaRPr>
+          </a:p>
+        </p:txBody>
+      </p:sp>
+      <p:sp>
+        <p:nvSpPr>
+          <p:cNvPr id="8" name="Rectángulo 7">
+            <a:extLst>
+              <a:ext uri="{FF2B5EF4-FFF2-40B4-BE49-F238E27FC236}">
+                <a16:creationId xmlns:a16="http://schemas.microsoft.com/office/drawing/2014/main" id="{6BC9DA89-B4AE-8A26-F0BC-53BE55E8A0B8}"/>
+              </a:ext>
+            </a:extLst>
+          </p:cNvPr>
+          <p:cNvSpPr/>
+          <p:nvPr/>
+        </p:nvSpPr>
+        <p:spPr>
+          <a:xfrm>
+            <a:off x="4847303" y="6435213"/>
+            <a:ext cx="6666271" cy="127819"/>
+          </a:xfrm>
+          <a:prstGeom prst="rect">
+            <a:avLst/>
+          </a:prstGeom>
+          <a:solidFill>
+            <a:srgbClr val="F8B416"/>
+          </a:solidFill>
+        </p:spPr>
+        <p:style>
+          <a:lnRef idx="2">
+            <a:schemeClr val="accent1">
+              <a:shade val="15000"/>
+            </a:schemeClr>
+          </a:lnRef>
+          <a:fillRef idx="1">
+            <a:schemeClr val="accent1"/>
+          </a:fillRef>
+          <a:effectRef idx="0">
+            <a:schemeClr val="accent1"/>
+          </a:effectRef>
+          <a:fontRef idx="minor">
+            <a:schemeClr val="lt1"/>
+          </a:fontRef>
+        </p:style>
+        <p:txBody>
+          <a:bodyPr rtlCol="0" anchor="ctr"/>
+          <a:lstStyle/>
+          <a:p>
+            <a:pPr algn="ctr"/>
+            <a:endParaRPr lang="es-CL"/>
+          </a:p>
+        </p:txBody>
+      </p:sp>
+      <p:sp>
+        <p:nvSpPr>
+          <p:cNvPr id="10" name="CuadroTexto 9">
+            <a:extLst>
+              <a:ext uri="{FF2B5EF4-FFF2-40B4-BE49-F238E27FC236}">
+                <a16:creationId xmlns:a16="http://schemas.microsoft.com/office/drawing/2014/main" id="{36A46A88-CB50-AA38-1963-1CA706CC5FC4}"/>
+              </a:ext>
+            </a:extLst>
+          </p:cNvPr>
+          <p:cNvSpPr txBox="1"/>
+          <p:nvPr/>
+        </p:nvSpPr>
+        <p:spPr>
+          <a:xfrm>
+            <a:off x="678426" y="523257"/>
+            <a:ext cx="5996694" cy="923330"/>
+          </a:xfrm>
+          <a:prstGeom prst="rect">
+            <a:avLst/>
+          </a:prstGeom>
+          <a:noFill/>
+        </p:spPr>
+        <p:txBody>
+          <a:bodyPr wrap="square" rtlCol="0">
+            <a:spAutoFit/>
+          </a:bodyPr>
+          <a:lstStyle/>
+          <a:p>
+            <a:r>
+              <a:rPr lang="es-CL" b="1" dirty="0">
+                <a:solidFill>
+                  <a:srgbClr val="F8B416"/>
+                </a:solidFill>
+                <a:latin typeface="Arial" panose="020B0604020202020204" pitchFamily="34" charset="0"/>
+                <a:cs typeface="Arial" panose="020B0604020202020204" pitchFamily="34" charset="0"/>
+              </a:rPr>
+              <a:t>RADIOGRAFÍA DEL BIENESTAR DUOC UC 2025</a:t>
+            </a:r>
+          </a:p>
+          <a:p>
+            <a:r>
+              <a:rPr lang="es-CL" b="1" dirty="0">
+                <a:solidFill>
+                  <a:schemeClr val="tx1">
+                    <a:lumMod val="50000"/>
+                    <a:lumOff val="50000"/>
+                  </a:schemeClr>
+                </a:solidFill>
+                <a:latin typeface="Arial" panose="020B0604020202020204" pitchFamily="34" charset="0"/>
+                <a:cs typeface="Arial" panose="020B0604020202020204" pitchFamily="34" charset="0"/>
+              </a:rPr>
+              <a:t>Tasa de respuestas por </a:t>
+            </a:r>
+            <a:r>
+              <a:rPr lang="es-CL" b="1" dirty="0">
+                <a:latin typeface="Arial" panose="020B0604020202020204" pitchFamily="34" charset="0"/>
+                <a:cs typeface="Arial" panose="020B0604020202020204" pitchFamily="34" charset="0"/>
+              </a:rPr>
+              <a:t>ESCUELA EN CADA SEDE</a:t>
+            </a:r>
+          </a:p>
+          <a:p>
+            <a:endParaRPr lang="es-CL" b="1" dirty="0">
+              <a:solidFill>
+                <a:srgbClr val="F8B416"/>
+              </a:solidFill>
+              <a:latin typeface="Arial" panose="020B0604020202020204" pitchFamily="34" charset="0"/>
+              <a:cs typeface="Arial" panose="020B0604020202020204" pitchFamily="34" charset="0"/>
+            </a:endParaRPr>
+          </a:p>
+        </p:txBody>
+      </p:sp>
+      <p:pic>
+        <p:nvPicPr>
+          <p:cNvPr id="15" name="Imagen 14" descr="Imagen que contiene Texto&#10;&#10;El contenido generado por IA puede ser incorrecto.">
+            <a:extLst>
+              <a:ext uri="{FF2B5EF4-FFF2-40B4-BE49-F238E27FC236}">
+                <a16:creationId xmlns:a16="http://schemas.microsoft.com/office/drawing/2014/main" id="{C67528F8-FDC7-7E73-4E87-BD914712017B}"/>
+              </a:ext>
+            </a:extLst>
+          </p:cNvPr>
+          <p:cNvPicPr>
+            <a:picLocks noChangeAspect="1"/>
+          </p:cNvPicPr>
+          <p:nvPr/>
+        </p:nvPicPr>
+        <p:blipFill>
+          <a:blip r:embed="rId2">
+            <a:extLst>
+              <a:ext uri="{28A0092B-C50C-407E-A947-70E740481C1C}">
+                <a14:useLocalDpi xmlns:a14="http://schemas.microsoft.com/office/drawing/2010/main" val="0"/>
+              </a:ext>
+            </a:extLst>
+          </a:blip>
+          <a:stretch>
+            <a:fillRect/>
+          </a:stretch>
+        </p:blipFill>
+        <p:spPr>
+          <a:xfrm>
+            <a:off x="8062451" y="693767"/>
+            <a:ext cx="1502645" cy="353122"/>
+          </a:xfrm>
+          <a:prstGeom prst="rect">
+            <a:avLst/>
+          </a:prstGeom>
+        </p:spPr>
+      </p:pic>
+      <p:pic>
+        <p:nvPicPr>
+          <p:cNvPr id="17" name="Imagen 16" descr="Logotipo&#10;&#10;El contenido generado por IA puede ser incorrecto.">
+            <a:extLst>
+              <a:ext uri="{FF2B5EF4-FFF2-40B4-BE49-F238E27FC236}">
+                <a16:creationId xmlns:a16="http://schemas.microsoft.com/office/drawing/2014/main" id="{F018623C-4685-FEBA-9A4D-1A4181C97CCA}"/>
+              </a:ext>
+            </a:extLst>
+          </p:cNvPr>
+          <p:cNvPicPr>
+            <a:picLocks noChangeAspect="1"/>
+          </p:cNvPicPr>
+          <p:nvPr/>
+        </p:nvPicPr>
+        <p:blipFill>
+          <a:blip r:embed="rId3">
+            <a:extLst>
+              <a:ext uri="{28A0092B-C50C-407E-A947-70E740481C1C}">
+                <a14:useLocalDpi xmlns:a14="http://schemas.microsoft.com/office/drawing/2010/main" val="0"/>
+              </a:ext>
+            </a:extLst>
+          </a:blip>
+          <a:stretch>
+            <a:fillRect/>
+          </a:stretch>
+        </p:blipFill>
+        <p:spPr>
+          <a:xfrm>
+            <a:off x="9794655" y="693768"/>
+            <a:ext cx="1432628" cy="353122"/>
+          </a:xfrm>
+          <a:prstGeom prst="rect">
+            <a:avLst/>
+          </a:prstGeom>
+        </p:spPr>
+      </p:pic>
+      <p:sp>
+        <p:nvSpPr>
+          <p:cNvPr id="22" name="CuadroTexto 21">
+            <a:extLst>
+              <a:ext uri="{FF2B5EF4-FFF2-40B4-BE49-F238E27FC236}">
+                <a16:creationId xmlns:a16="http://schemas.microsoft.com/office/drawing/2014/main" id="{BC7D93D9-0E8B-E38E-5D7B-69F20F705EB2}"/>
+              </a:ext>
+            </a:extLst>
+          </p:cNvPr>
+          <p:cNvSpPr txBox="1">
+            <a:spLocks/>
+          </p:cNvSpPr>
+          <p:nvPr/>
+        </p:nvSpPr>
+        <p:spPr>
+          <a:xfrm>
+            <a:off x="1622973" y="1702750"/>
+            <a:ext cx="8171682" cy="4108359"/>
+          </a:xfrm>
+          <a:prstGeom prst="rect">
+            <a:avLst/>
+          </a:prstGeom>
+          <a:noFill/>
+        </p:spPr>
+        <p:txBody>
+          <a:bodyPr wrap="square" rtlCol="0">
+            <a:noAutofit/>
+          </a:bodyPr>
+          <a:lstStyle/>
+          <a:p>
+            <a:r>
+              <a:rPr lang="es-ES" dirty="0"/>
+              <a:t>tabla_resumen_escuela_en_cada_sede_3</a:t>
+            </a:r>
+          </a:p>
+        </p:txBody>
+      </p:sp>
+    </p:spTree>
+    <p:extLst>
+      <p:ext uri="{BB962C8B-B14F-4D97-AF65-F5344CB8AC3E}">
+        <p14:creationId xmlns:p14="http://schemas.microsoft.com/office/powerpoint/2010/main" val="3859492082"/>
+      </p:ext>
+    </p:extLst>
+  </p:cSld>
+  <p:clrMapOvr>
+    <a:masterClrMapping/>
+  </p:clrMapOvr>
+</p:sld>
+</file>
+
+<file path=ppt/slides/slide7.xml><?xml version="1.0" encoding="utf-8"?>
+<p:sld xmlns:a="http://schemas.openxmlformats.org/drawingml/2006/main" xmlns:r="http://schemas.openxmlformats.org/officeDocument/2006/relationships" xmlns:p="http://schemas.openxmlformats.org/presentationml/2006/main">
+  <p:cSld>
+    <p:spTree>
+      <p:nvGrpSpPr>
+        <p:cNvPr id="1" name="">
+          <a:extLst>
+            <a:ext uri="{FF2B5EF4-FFF2-40B4-BE49-F238E27FC236}">
+              <a16:creationId xmlns:a16="http://schemas.microsoft.com/office/drawing/2014/main" id="{E381F126-E062-682F-C536-50A86D7680C3}"/>
+            </a:ext>
+          </a:extLst>
+        </p:cNvPr>
+        <p:cNvGrpSpPr/>
+        <p:nvPr/>
+      </p:nvGrpSpPr>
+      <p:grpSpPr>
+        <a:xfrm>
+          <a:off x="0" y="0"/>
+          <a:ext cx="0" cy="0"/>
+          <a:chOff x="0" y="0"/>
+          <a:chExt cx="0" cy="0"/>
+        </a:xfrm>
+      </p:grpSpPr>
+      <p:sp>
+        <p:nvSpPr>
+          <p:cNvPr id="5" name="Rectángulo 4">
+            <a:extLst>
+              <a:ext uri="{FF2B5EF4-FFF2-40B4-BE49-F238E27FC236}">
+                <a16:creationId xmlns:a16="http://schemas.microsoft.com/office/drawing/2014/main" id="{5CF94BB0-9F36-DD1F-D6FF-253F81F8A9C6}"/>
+              </a:ext>
+            </a:extLst>
+          </p:cNvPr>
+          <p:cNvSpPr/>
+          <p:nvPr/>
+        </p:nvSpPr>
+        <p:spPr>
+          <a:xfrm>
+            <a:off x="678426" y="294968"/>
+            <a:ext cx="4168877" cy="127819"/>
+          </a:xfrm>
+          <a:prstGeom prst="rect">
+            <a:avLst/>
+          </a:prstGeom>
+          <a:solidFill>
+            <a:schemeClr val="tx1"/>
+          </a:solidFill>
+        </p:spPr>
+        <p:style>
+          <a:lnRef idx="2">
+            <a:schemeClr val="accent1">
+              <a:shade val="15000"/>
+            </a:schemeClr>
+          </a:lnRef>
+          <a:fillRef idx="1">
+            <a:schemeClr val="accent1"/>
+          </a:fillRef>
+          <a:effectRef idx="0">
+            <a:schemeClr val="accent1"/>
+          </a:effectRef>
+          <a:fontRef idx="minor">
+            <a:schemeClr val="lt1"/>
+          </a:fontRef>
+        </p:style>
+        <p:txBody>
+          <a:bodyPr rtlCol="0" anchor="ctr"/>
+          <a:lstStyle/>
+          <a:p>
+            <a:pPr algn="ctr"/>
+            <a:endParaRPr lang="es-CL"/>
+          </a:p>
+        </p:txBody>
+      </p:sp>
+      <p:sp>
+        <p:nvSpPr>
+          <p:cNvPr id="6" name="Rectángulo 5">
+            <a:extLst>
+              <a:ext uri="{FF2B5EF4-FFF2-40B4-BE49-F238E27FC236}">
+                <a16:creationId xmlns:a16="http://schemas.microsoft.com/office/drawing/2014/main" id="{2A8B6DCB-DAB6-D1AE-E7A8-89D269D6DB41}"/>
+              </a:ext>
+            </a:extLst>
+          </p:cNvPr>
+          <p:cNvSpPr/>
+          <p:nvPr/>
+        </p:nvSpPr>
+        <p:spPr>
+          <a:xfrm>
+            <a:off x="678426" y="6435213"/>
+            <a:ext cx="4168877" cy="127819"/>
+          </a:xfrm>
+          <a:prstGeom prst="rect">
+            <a:avLst/>
+          </a:prstGeom>
+          <a:solidFill>
+            <a:schemeClr val="tx1"/>
+          </a:solidFill>
+        </p:spPr>
+        <p:style>
+          <a:lnRef idx="2">
+            <a:schemeClr val="accent1">
+              <a:shade val="15000"/>
+            </a:schemeClr>
+          </a:lnRef>
+          <a:fillRef idx="1">
+            <a:schemeClr val="accent1"/>
+          </a:fillRef>
+          <a:effectRef idx="0">
+            <a:schemeClr val="accent1"/>
+          </a:effectRef>
+          <a:fontRef idx="minor">
+            <a:schemeClr val="lt1"/>
+          </a:fontRef>
+        </p:style>
+        <p:txBody>
+          <a:bodyPr rtlCol="0" anchor="ctr"/>
+          <a:lstStyle/>
+          <a:p>
+            <a:pPr algn="ctr"/>
+            <a:endParaRPr lang="es-CL"/>
+          </a:p>
+        </p:txBody>
+      </p:sp>
+      <p:sp>
+        <p:nvSpPr>
+          <p:cNvPr id="7" name="Rectángulo 6">
+            <a:extLst>
+              <a:ext uri="{FF2B5EF4-FFF2-40B4-BE49-F238E27FC236}">
+                <a16:creationId xmlns:a16="http://schemas.microsoft.com/office/drawing/2014/main" id="{03CDA40D-3CE7-0DC4-21A4-8A7DB1DBD117}"/>
+              </a:ext>
+            </a:extLst>
+          </p:cNvPr>
+          <p:cNvSpPr/>
+          <p:nvPr/>
+        </p:nvSpPr>
+        <p:spPr>
+          <a:xfrm>
+            <a:off x="4847303" y="294967"/>
+            <a:ext cx="6666271" cy="127819"/>
+          </a:xfrm>
+          <a:prstGeom prst="rect">
+            <a:avLst/>
+          </a:prstGeom>
+          <a:solidFill>
+            <a:srgbClr val="F8B416"/>
+          </a:solidFill>
+        </p:spPr>
+        <p:style>
+          <a:lnRef idx="2">
+            <a:schemeClr val="accent1">
+              <a:shade val="15000"/>
+            </a:schemeClr>
+          </a:lnRef>
+          <a:fillRef idx="1">
+            <a:schemeClr val="accent1"/>
+          </a:fillRef>
+          <a:effectRef idx="0">
+            <a:schemeClr val="accent1"/>
+          </a:effectRef>
+          <a:fontRef idx="minor">
+            <a:schemeClr val="lt1"/>
+          </a:fontRef>
+        </p:style>
+        <p:txBody>
+          <a:bodyPr rtlCol="0" anchor="ctr"/>
+          <a:lstStyle/>
+          <a:p>
+            <a:pPr algn="ctr"/>
+            <a:endParaRPr lang="es-CL" dirty="0">
+              <a:solidFill>
+                <a:srgbClr val="F8B416"/>
+              </a:solidFill>
+              <a:highlight>
+                <a:srgbClr val="FFFF00"/>
+              </a:highlight>
+            </a:endParaRPr>
+          </a:p>
+        </p:txBody>
+      </p:sp>
+      <p:sp>
+        <p:nvSpPr>
+          <p:cNvPr id="8" name="Rectángulo 7">
+            <a:extLst>
+              <a:ext uri="{FF2B5EF4-FFF2-40B4-BE49-F238E27FC236}">
+                <a16:creationId xmlns:a16="http://schemas.microsoft.com/office/drawing/2014/main" id="{3A18E446-9B3A-CB70-148D-050E55B1BECC}"/>
+              </a:ext>
+            </a:extLst>
+          </p:cNvPr>
+          <p:cNvSpPr/>
+          <p:nvPr/>
+        </p:nvSpPr>
+        <p:spPr>
+          <a:xfrm>
+            <a:off x="4847303" y="6435213"/>
+            <a:ext cx="6666271" cy="127819"/>
+          </a:xfrm>
+          <a:prstGeom prst="rect">
+            <a:avLst/>
+          </a:prstGeom>
+          <a:solidFill>
+            <a:srgbClr val="F8B416"/>
+          </a:solidFill>
+        </p:spPr>
+        <p:style>
+          <a:lnRef idx="2">
+            <a:schemeClr val="accent1">
+              <a:shade val="15000"/>
+            </a:schemeClr>
+          </a:lnRef>
+          <a:fillRef idx="1">
+            <a:schemeClr val="accent1"/>
+          </a:fillRef>
+          <a:effectRef idx="0">
+            <a:schemeClr val="accent1"/>
+          </a:effectRef>
+          <a:fontRef idx="minor">
+            <a:schemeClr val="lt1"/>
+          </a:fontRef>
+        </p:style>
+        <p:txBody>
+          <a:bodyPr rtlCol="0" anchor="ctr"/>
+          <a:lstStyle/>
+          <a:p>
+            <a:pPr algn="ctr"/>
+            <a:endParaRPr lang="es-CL"/>
+          </a:p>
+        </p:txBody>
+      </p:sp>
+      <p:sp>
+        <p:nvSpPr>
+          <p:cNvPr id="10" name="CuadroTexto 9">
+            <a:extLst>
+              <a:ext uri="{FF2B5EF4-FFF2-40B4-BE49-F238E27FC236}">
+                <a16:creationId xmlns:a16="http://schemas.microsoft.com/office/drawing/2014/main" id="{3779AB69-2FE1-CE0A-BE83-67971CAFA945}"/>
+              </a:ext>
+            </a:extLst>
+          </p:cNvPr>
+          <p:cNvSpPr txBox="1"/>
+          <p:nvPr/>
+        </p:nvSpPr>
+        <p:spPr>
+          <a:xfrm>
+            <a:off x="678426" y="523257"/>
+            <a:ext cx="5996694" cy="923330"/>
+          </a:xfrm>
+          <a:prstGeom prst="rect">
+            <a:avLst/>
+          </a:prstGeom>
+          <a:noFill/>
+        </p:spPr>
+        <p:txBody>
+          <a:bodyPr wrap="square" rtlCol="0">
+            <a:spAutoFit/>
+          </a:bodyPr>
+          <a:lstStyle/>
+          <a:p>
+            <a:r>
+              <a:rPr lang="es-CL" b="1" dirty="0">
+                <a:solidFill>
+                  <a:srgbClr val="F8B416"/>
+                </a:solidFill>
+                <a:latin typeface="Arial" panose="020B0604020202020204" pitchFamily="34" charset="0"/>
+                <a:cs typeface="Arial" panose="020B0604020202020204" pitchFamily="34" charset="0"/>
+              </a:rPr>
+              <a:t>RADIOGRAFÍA DEL BIENESTAR DUOC UC 2025</a:t>
+            </a:r>
+          </a:p>
+          <a:p>
+            <a:r>
+              <a:rPr lang="es-CL" b="1" dirty="0">
+                <a:solidFill>
+                  <a:schemeClr val="tx1">
+                    <a:lumMod val="50000"/>
+                    <a:lumOff val="50000"/>
+                  </a:schemeClr>
+                </a:solidFill>
+                <a:latin typeface="Arial" panose="020B0604020202020204" pitchFamily="34" charset="0"/>
+                <a:cs typeface="Arial" panose="020B0604020202020204" pitchFamily="34" charset="0"/>
+              </a:rPr>
+              <a:t>Tasa de respuestas por </a:t>
+            </a:r>
+            <a:r>
+              <a:rPr lang="es-CL" b="1" dirty="0">
+                <a:latin typeface="Arial" panose="020B0604020202020204" pitchFamily="34" charset="0"/>
+                <a:cs typeface="Arial" panose="020B0604020202020204" pitchFamily="34" charset="0"/>
+              </a:rPr>
+              <a:t>ESCUELA EN CADA SEDE</a:t>
+            </a:r>
+          </a:p>
+          <a:p>
+            <a:endParaRPr lang="es-CL" b="1" dirty="0">
+              <a:solidFill>
+                <a:srgbClr val="F8B416"/>
+              </a:solidFill>
+              <a:latin typeface="Arial" panose="020B0604020202020204" pitchFamily="34" charset="0"/>
+              <a:cs typeface="Arial" panose="020B0604020202020204" pitchFamily="34" charset="0"/>
+            </a:endParaRPr>
+          </a:p>
+        </p:txBody>
+      </p:sp>
+      <p:pic>
+        <p:nvPicPr>
+          <p:cNvPr id="15" name="Imagen 14" descr="Imagen que contiene Texto&#10;&#10;El contenido generado por IA puede ser incorrecto.">
+            <a:extLst>
+              <a:ext uri="{FF2B5EF4-FFF2-40B4-BE49-F238E27FC236}">
+                <a16:creationId xmlns:a16="http://schemas.microsoft.com/office/drawing/2014/main" id="{05CB1413-BA7B-84A4-D701-3458315BC891}"/>
+              </a:ext>
+            </a:extLst>
+          </p:cNvPr>
+          <p:cNvPicPr>
+            <a:picLocks noChangeAspect="1"/>
+          </p:cNvPicPr>
+          <p:nvPr/>
+        </p:nvPicPr>
+        <p:blipFill>
+          <a:blip r:embed="rId2">
+            <a:extLst>
+              <a:ext uri="{28A0092B-C50C-407E-A947-70E740481C1C}">
+                <a14:useLocalDpi xmlns:a14="http://schemas.microsoft.com/office/drawing/2010/main" val="0"/>
+              </a:ext>
+            </a:extLst>
+          </a:blip>
+          <a:stretch>
+            <a:fillRect/>
+          </a:stretch>
+        </p:blipFill>
+        <p:spPr>
+          <a:xfrm>
+            <a:off x="8062451" y="693767"/>
+            <a:ext cx="1502645" cy="353122"/>
+          </a:xfrm>
+          <a:prstGeom prst="rect">
+            <a:avLst/>
+          </a:prstGeom>
+        </p:spPr>
+      </p:pic>
+      <p:pic>
+        <p:nvPicPr>
+          <p:cNvPr id="17" name="Imagen 16" descr="Logotipo&#10;&#10;El contenido generado por IA puede ser incorrecto.">
+            <a:extLst>
+              <a:ext uri="{FF2B5EF4-FFF2-40B4-BE49-F238E27FC236}">
+                <a16:creationId xmlns:a16="http://schemas.microsoft.com/office/drawing/2014/main" id="{0C03C31E-21CB-5618-AA29-04500E3FCD2E}"/>
+              </a:ext>
+            </a:extLst>
+          </p:cNvPr>
+          <p:cNvPicPr>
+            <a:picLocks noChangeAspect="1"/>
+          </p:cNvPicPr>
+          <p:nvPr/>
+        </p:nvPicPr>
+        <p:blipFill>
+          <a:blip r:embed="rId3">
+            <a:extLst>
+              <a:ext uri="{28A0092B-C50C-407E-A947-70E740481C1C}">
+                <a14:useLocalDpi xmlns:a14="http://schemas.microsoft.com/office/drawing/2010/main" val="0"/>
+              </a:ext>
+            </a:extLst>
+          </a:blip>
+          <a:stretch>
+            <a:fillRect/>
+          </a:stretch>
+        </p:blipFill>
+        <p:spPr>
+          <a:xfrm>
+            <a:off x="9794655" y="693768"/>
+            <a:ext cx="1432628" cy="353122"/>
+          </a:xfrm>
+          <a:prstGeom prst="rect">
+            <a:avLst/>
+          </a:prstGeom>
+        </p:spPr>
+      </p:pic>
+      <p:sp>
+        <p:nvSpPr>
+          <p:cNvPr id="22" name="CuadroTexto 21">
+            <a:extLst>
+              <a:ext uri="{FF2B5EF4-FFF2-40B4-BE49-F238E27FC236}">
+                <a16:creationId xmlns:a16="http://schemas.microsoft.com/office/drawing/2014/main" id="{E464097C-E663-FD9C-D25A-1CF958F4D114}"/>
+              </a:ext>
+            </a:extLst>
+          </p:cNvPr>
+          <p:cNvSpPr txBox="1">
+            <a:spLocks/>
+          </p:cNvSpPr>
+          <p:nvPr/>
+        </p:nvSpPr>
+        <p:spPr>
+          <a:xfrm>
+            <a:off x="1622973" y="1702750"/>
+            <a:ext cx="8171682" cy="4108359"/>
+          </a:xfrm>
+          <a:prstGeom prst="rect">
+            <a:avLst/>
+          </a:prstGeom>
+          <a:noFill/>
+        </p:spPr>
+        <p:txBody>
+          <a:bodyPr wrap="square" rtlCol="0">
+            <a:noAutofit/>
+          </a:bodyPr>
+          <a:lstStyle/>
+          <a:p>
+            <a:r>
+              <a:rPr lang="es-ES" dirty="0"/>
+              <a:t>tabla_resumen_escuela_en_cada_sede_4</a:t>
+            </a:r>
+          </a:p>
+        </p:txBody>
+      </p:sp>
+    </p:spTree>
+    <p:extLst>
+      <p:ext uri="{BB962C8B-B14F-4D97-AF65-F5344CB8AC3E}">
+        <p14:creationId xmlns:p14="http://schemas.microsoft.com/office/powerpoint/2010/main" val="1019140337"/>
+      </p:ext>
+    </p:extLst>
+  </p:cSld>
+  <p:clrMapOvr>
+    <a:masterClrMapping/>
+  </p:clrMapOvr>
+</p:sld>
+</file>
+
+<file path=ppt/slides/slide8.xml><?xml version="1.0" encoding="utf-8"?>
+<p:sld xmlns:a="http://schemas.openxmlformats.org/drawingml/2006/main" xmlns:r="http://schemas.openxmlformats.org/officeDocument/2006/relationships" xmlns:p="http://schemas.openxmlformats.org/presentationml/2006/main">
+  <p:cSld>
+    <p:spTree>
+      <p:nvGrpSpPr>
+        <p:cNvPr id="1" name="">
+          <a:extLst>
+            <a:ext uri="{FF2B5EF4-FFF2-40B4-BE49-F238E27FC236}">
+              <a16:creationId xmlns:a16="http://schemas.microsoft.com/office/drawing/2014/main" id="{2C7655C6-9F33-EE28-0689-33D19BAB1B3D}"/>
+            </a:ext>
+          </a:extLst>
+        </p:cNvPr>
+        <p:cNvGrpSpPr/>
+        <p:nvPr/>
+      </p:nvGrpSpPr>
+      <p:grpSpPr>
+        <a:xfrm>
+          <a:off x="0" y="0"/>
+          <a:ext cx="0" cy="0"/>
+          <a:chOff x="0" y="0"/>
+          <a:chExt cx="0" cy="0"/>
+        </a:xfrm>
+      </p:grpSpPr>
+      <p:sp>
+        <p:nvSpPr>
+          <p:cNvPr id="5" name="Rectángulo 4">
+            <a:extLst>
+              <a:ext uri="{FF2B5EF4-FFF2-40B4-BE49-F238E27FC236}">
+                <a16:creationId xmlns:a16="http://schemas.microsoft.com/office/drawing/2014/main" id="{03BB1E84-982E-AFC3-9532-25A2C79BD34D}"/>
+              </a:ext>
+            </a:extLst>
+          </p:cNvPr>
+          <p:cNvSpPr/>
+          <p:nvPr/>
+        </p:nvSpPr>
+        <p:spPr>
+          <a:xfrm>
+            <a:off x="678426" y="294968"/>
+            <a:ext cx="4168877" cy="127819"/>
+          </a:xfrm>
+          <a:prstGeom prst="rect">
+            <a:avLst/>
+          </a:prstGeom>
+          <a:solidFill>
+            <a:schemeClr val="tx1"/>
+          </a:solidFill>
+        </p:spPr>
+        <p:style>
+          <a:lnRef idx="2">
+            <a:schemeClr val="accent1">
+              <a:shade val="15000"/>
+            </a:schemeClr>
+          </a:lnRef>
+          <a:fillRef idx="1">
+            <a:schemeClr val="accent1"/>
+          </a:fillRef>
+          <a:effectRef idx="0">
+            <a:schemeClr val="accent1"/>
+          </a:effectRef>
+          <a:fontRef idx="minor">
+            <a:schemeClr val="lt1"/>
+          </a:fontRef>
+        </p:style>
+        <p:txBody>
+          <a:bodyPr rtlCol="0" anchor="ctr"/>
+          <a:lstStyle/>
+          <a:p>
+            <a:pPr algn="ctr"/>
+            <a:endParaRPr lang="es-CL"/>
+          </a:p>
+        </p:txBody>
+      </p:sp>
+      <p:sp>
+        <p:nvSpPr>
+          <p:cNvPr id="6" name="Rectángulo 5">
+            <a:extLst>
+              <a:ext uri="{FF2B5EF4-FFF2-40B4-BE49-F238E27FC236}">
+                <a16:creationId xmlns:a16="http://schemas.microsoft.com/office/drawing/2014/main" id="{8366CB67-9CED-DD01-A2A3-080378A64F8B}"/>
+              </a:ext>
+            </a:extLst>
+          </p:cNvPr>
+          <p:cNvSpPr/>
+          <p:nvPr/>
+        </p:nvSpPr>
+        <p:spPr>
+          <a:xfrm>
+            <a:off x="678426" y="6435213"/>
+            <a:ext cx="4168877" cy="127819"/>
+          </a:xfrm>
+          <a:prstGeom prst="rect">
+            <a:avLst/>
+          </a:prstGeom>
+          <a:solidFill>
+            <a:schemeClr val="tx1"/>
+          </a:solidFill>
+        </p:spPr>
+        <p:style>
+          <a:lnRef idx="2">
+            <a:schemeClr val="accent1">
+              <a:shade val="15000"/>
+            </a:schemeClr>
+          </a:lnRef>
+          <a:fillRef idx="1">
+            <a:schemeClr val="accent1"/>
+          </a:fillRef>
+          <a:effectRef idx="0">
+            <a:schemeClr val="accent1"/>
+          </a:effectRef>
+          <a:fontRef idx="minor">
+            <a:schemeClr val="lt1"/>
+          </a:fontRef>
+        </p:style>
+        <p:txBody>
+          <a:bodyPr rtlCol="0" anchor="ctr"/>
+          <a:lstStyle/>
+          <a:p>
+            <a:pPr algn="ctr"/>
+            <a:endParaRPr lang="es-CL"/>
+          </a:p>
+        </p:txBody>
+      </p:sp>
+      <p:sp>
+        <p:nvSpPr>
+          <p:cNvPr id="7" name="Rectángulo 6">
+            <a:extLst>
+              <a:ext uri="{FF2B5EF4-FFF2-40B4-BE49-F238E27FC236}">
+                <a16:creationId xmlns:a16="http://schemas.microsoft.com/office/drawing/2014/main" id="{2EBFEE32-ECDF-CF54-E5E2-724FD9F930B2}"/>
+              </a:ext>
+            </a:extLst>
+          </p:cNvPr>
+          <p:cNvSpPr/>
+          <p:nvPr/>
+        </p:nvSpPr>
+        <p:spPr>
+          <a:xfrm>
+            <a:off x="4847303" y="294967"/>
+            <a:ext cx="6666271" cy="127819"/>
+          </a:xfrm>
+          <a:prstGeom prst="rect">
+            <a:avLst/>
+          </a:prstGeom>
+          <a:solidFill>
+            <a:srgbClr val="F8B416"/>
+          </a:solidFill>
+        </p:spPr>
+        <p:style>
+          <a:lnRef idx="2">
+            <a:schemeClr val="accent1">
+              <a:shade val="15000"/>
+            </a:schemeClr>
+          </a:lnRef>
+          <a:fillRef idx="1">
+            <a:schemeClr val="accent1"/>
+          </a:fillRef>
+          <a:effectRef idx="0">
+            <a:schemeClr val="accent1"/>
+          </a:effectRef>
+          <a:fontRef idx="minor">
+            <a:schemeClr val="lt1"/>
+          </a:fontRef>
+        </p:style>
+        <p:txBody>
+          <a:bodyPr rtlCol="0" anchor="ctr"/>
+          <a:lstStyle/>
+          <a:p>
+            <a:pPr algn="ctr"/>
+            <a:endParaRPr lang="es-CL" dirty="0">
+              <a:solidFill>
+                <a:srgbClr val="F8B416"/>
+              </a:solidFill>
+              <a:highlight>
+                <a:srgbClr val="FFFF00"/>
+              </a:highlight>
+            </a:endParaRPr>
+          </a:p>
+        </p:txBody>
+      </p:sp>
+      <p:sp>
+        <p:nvSpPr>
+          <p:cNvPr id="8" name="Rectángulo 7">
+            <a:extLst>
+              <a:ext uri="{FF2B5EF4-FFF2-40B4-BE49-F238E27FC236}">
+                <a16:creationId xmlns:a16="http://schemas.microsoft.com/office/drawing/2014/main" id="{933270CA-BA49-BA01-134F-F7C0C40B4ABA}"/>
+              </a:ext>
+            </a:extLst>
+          </p:cNvPr>
+          <p:cNvSpPr/>
+          <p:nvPr/>
+        </p:nvSpPr>
+        <p:spPr>
+          <a:xfrm>
+            <a:off x="4847303" y="6435213"/>
+            <a:ext cx="6666271" cy="127819"/>
+          </a:xfrm>
+          <a:prstGeom prst="rect">
+            <a:avLst/>
+          </a:prstGeom>
+          <a:solidFill>
+            <a:srgbClr val="F8B416"/>
+          </a:solidFill>
+        </p:spPr>
+        <p:style>
+          <a:lnRef idx="2">
+            <a:schemeClr val="accent1">
+              <a:shade val="15000"/>
+            </a:schemeClr>
+          </a:lnRef>
+          <a:fillRef idx="1">
+            <a:schemeClr val="accent1"/>
+          </a:fillRef>
+          <a:effectRef idx="0">
+            <a:schemeClr val="accent1"/>
+          </a:effectRef>
+          <a:fontRef idx="minor">
+            <a:schemeClr val="lt1"/>
+          </a:fontRef>
+        </p:style>
+        <p:txBody>
+          <a:bodyPr rtlCol="0" anchor="ctr"/>
+          <a:lstStyle/>
+          <a:p>
+            <a:pPr algn="ctr"/>
+            <a:endParaRPr lang="es-CL"/>
+          </a:p>
+        </p:txBody>
+      </p:sp>
+      <p:sp>
+        <p:nvSpPr>
+          <p:cNvPr id="10" name="CuadroTexto 9">
+            <a:extLst>
+              <a:ext uri="{FF2B5EF4-FFF2-40B4-BE49-F238E27FC236}">
+                <a16:creationId xmlns:a16="http://schemas.microsoft.com/office/drawing/2014/main" id="{33068882-8317-C178-C07B-67AF989998DB}"/>
+              </a:ext>
+            </a:extLst>
+          </p:cNvPr>
+          <p:cNvSpPr txBox="1"/>
+          <p:nvPr/>
+        </p:nvSpPr>
+        <p:spPr>
+          <a:xfrm>
+            <a:off x="678426" y="523257"/>
+            <a:ext cx="5996694" cy="923330"/>
+          </a:xfrm>
+          <a:prstGeom prst="rect">
+            <a:avLst/>
+          </a:prstGeom>
+          <a:noFill/>
+        </p:spPr>
+        <p:txBody>
+          <a:bodyPr wrap="square" rtlCol="0">
+            <a:spAutoFit/>
+          </a:bodyPr>
+          <a:lstStyle/>
+          <a:p>
+            <a:r>
+              <a:rPr lang="es-CL" b="1" dirty="0">
+                <a:solidFill>
+                  <a:srgbClr val="F8B416"/>
+                </a:solidFill>
+                <a:latin typeface="Arial" panose="020B0604020202020204" pitchFamily="34" charset="0"/>
+                <a:cs typeface="Arial" panose="020B0604020202020204" pitchFamily="34" charset="0"/>
+              </a:rPr>
+              <a:t>RADIOGRAFÍA DEL BIENESTAR DUOC UC 2025</a:t>
+            </a:r>
+          </a:p>
+          <a:p>
+            <a:r>
+              <a:rPr lang="es-CL" b="1" dirty="0">
+                <a:solidFill>
+                  <a:schemeClr val="tx1">
+                    <a:lumMod val="50000"/>
+                    <a:lumOff val="50000"/>
+                  </a:schemeClr>
+                </a:solidFill>
+                <a:latin typeface="Arial" panose="020B0604020202020204" pitchFamily="34" charset="0"/>
+                <a:cs typeface="Arial" panose="020B0604020202020204" pitchFamily="34" charset="0"/>
+              </a:rPr>
+              <a:t>Tasa de respuestas por </a:t>
+            </a:r>
+            <a:r>
+              <a:rPr lang="es-CL" b="1" dirty="0">
+                <a:latin typeface="Arial" panose="020B0604020202020204" pitchFamily="34" charset="0"/>
+                <a:cs typeface="Arial" panose="020B0604020202020204" pitchFamily="34" charset="0"/>
+              </a:rPr>
+              <a:t>ESCUELA EN CADA SEDE</a:t>
+            </a:r>
+          </a:p>
+          <a:p>
+            <a:endParaRPr lang="es-CL" b="1" dirty="0">
+              <a:solidFill>
+                <a:srgbClr val="F8B416"/>
+              </a:solidFill>
+              <a:latin typeface="Arial" panose="020B0604020202020204" pitchFamily="34" charset="0"/>
+              <a:cs typeface="Arial" panose="020B0604020202020204" pitchFamily="34" charset="0"/>
+            </a:endParaRPr>
+          </a:p>
+        </p:txBody>
+      </p:sp>
+      <p:pic>
+        <p:nvPicPr>
+          <p:cNvPr id="15" name="Imagen 14" descr="Imagen que contiene Texto&#10;&#10;El contenido generado por IA puede ser incorrecto.">
+            <a:extLst>
+              <a:ext uri="{FF2B5EF4-FFF2-40B4-BE49-F238E27FC236}">
+                <a16:creationId xmlns:a16="http://schemas.microsoft.com/office/drawing/2014/main" id="{B1CC6715-D374-2D30-79FF-C832BB4E5E6D}"/>
+              </a:ext>
+            </a:extLst>
+          </p:cNvPr>
+          <p:cNvPicPr>
+            <a:picLocks noChangeAspect="1"/>
+          </p:cNvPicPr>
+          <p:nvPr/>
+        </p:nvPicPr>
+        <p:blipFill>
+          <a:blip r:embed="rId2">
+            <a:extLst>
+              <a:ext uri="{28A0092B-C50C-407E-A947-70E740481C1C}">
+                <a14:useLocalDpi xmlns:a14="http://schemas.microsoft.com/office/drawing/2010/main" val="0"/>
+              </a:ext>
+            </a:extLst>
+          </a:blip>
+          <a:stretch>
+            <a:fillRect/>
+          </a:stretch>
+        </p:blipFill>
+        <p:spPr>
+          <a:xfrm>
+            <a:off x="8062451" y="693767"/>
+            <a:ext cx="1502645" cy="353122"/>
+          </a:xfrm>
+          <a:prstGeom prst="rect">
+            <a:avLst/>
+          </a:prstGeom>
+        </p:spPr>
+      </p:pic>
+      <p:pic>
+        <p:nvPicPr>
+          <p:cNvPr id="17" name="Imagen 16" descr="Logotipo&#10;&#10;El contenido generado por IA puede ser incorrecto.">
+            <a:extLst>
+              <a:ext uri="{FF2B5EF4-FFF2-40B4-BE49-F238E27FC236}">
+                <a16:creationId xmlns:a16="http://schemas.microsoft.com/office/drawing/2014/main" id="{BFF00B3E-3E42-B772-E03A-B34ADBCC2FB4}"/>
+              </a:ext>
+            </a:extLst>
+          </p:cNvPr>
+          <p:cNvPicPr>
+            <a:picLocks noChangeAspect="1"/>
+          </p:cNvPicPr>
+          <p:nvPr/>
+        </p:nvPicPr>
+        <p:blipFill>
+          <a:blip r:embed="rId3">
+            <a:extLst>
+              <a:ext uri="{28A0092B-C50C-407E-A947-70E740481C1C}">
+                <a14:useLocalDpi xmlns:a14="http://schemas.microsoft.com/office/drawing/2010/main" val="0"/>
+              </a:ext>
+            </a:extLst>
+          </a:blip>
+          <a:stretch>
+            <a:fillRect/>
+          </a:stretch>
+        </p:blipFill>
+        <p:spPr>
+          <a:xfrm>
+            <a:off x="9794655" y="693768"/>
+            <a:ext cx="1432628" cy="353122"/>
+          </a:xfrm>
+          <a:prstGeom prst="rect">
+            <a:avLst/>
+          </a:prstGeom>
+        </p:spPr>
+      </p:pic>
+      <p:sp>
+        <p:nvSpPr>
+          <p:cNvPr id="22" name="CuadroTexto 21">
+            <a:extLst>
+              <a:ext uri="{FF2B5EF4-FFF2-40B4-BE49-F238E27FC236}">
+                <a16:creationId xmlns:a16="http://schemas.microsoft.com/office/drawing/2014/main" id="{F4B34885-76ED-DB7B-DB36-9E42326922E4}"/>
+              </a:ext>
+            </a:extLst>
+          </p:cNvPr>
+          <p:cNvSpPr txBox="1">
+            <a:spLocks/>
+          </p:cNvSpPr>
+          <p:nvPr/>
+        </p:nvSpPr>
+        <p:spPr>
+          <a:xfrm>
+            <a:off x="1622973" y="1702750"/>
+            <a:ext cx="8171682" cy="4108359"/>
+          </a:xfrm>
+          <a:prstGeom prst="rect">
+            <a:avLst/>
+          </a:prstGeom>
+          <a:noFill/>
+        </p:spPr>
+        <p:txBody>
+          <a:bodyPr wrap="square" rtlCol="0">
+            <a:noAutofit/>
+          </a:bodyPr>
+          <a:lstStyle/>
+          <a:p>
+            <a:r>
+              <a:rPr lang="es-ES" dirty="0"/>
+              <a:t>tabla_resumen_escuela_en_cada_sede_5</a:t>
+            </a:r>
+          </a:p>
+        </p:txBody>
+      </p:sp>
+    </p:spTree>
+    <p:extLst>
+      <p:ext uri="{BB962C8B-B14F-4D97-AF65-F5344CB8AC3E}">
+        <p14:creationId xmlns:p14="http://schemas.microsoft.com/office/powerpoint/2010/main" val="1030537254"/>
+      </p:ext>
+    </p:extLst>
+  </p:cSld>
+  <p:clrMapOvr>
+    <a:masterClrMapping/>
+  </p:clrMapOvr>
+</p:sld>
+</file>
+
+<file path=ppt/slides/slide9.xml><?xml version="1.0" encoding="utf-8"?>
+<p:sld xmlns:a="http://schemas.openxmlformats.org/drawingml/2006/main" xmlns:r="http://schemas.openxmlformats.org/officeDocument/2006/relationships" xmlns:p="http://schemas.openxmlformats.org/presentationml/2006/main">
+  <p:cSld>
+    <p:spTree>
+      <p:nvGrpSpPr>
+        <p:cNvPr id="1" name="">
+          <a:extLst>
+            <a:ext uri="{FF2B5EF4-FFF2-40B4-BE49-F238E27FC236}">
+              <a16:creationId xmlns:a16="http://schemas.microsoft.com/office/drawing/2014/main" id="{A9DBD04F-4EAA-B75C-DF6A-8CD98543FF3A}"/>
+            </a:ext>
+          </a:extLst>
+        </p:cNvPr>
+        <p:cNvGrpSpPr/>
+        <p:nvPr/>
+      </p:nvGrpSpPr>
+      <p:grpSpPr>
+        <a:xfrm>
+          <a:off x="0" y="0"/>
+          <a:ext cx="0" cy="0"/>
+          <a:chOff x="0" y="0"/>
+          <a:chExt cx="0" cy="0"/>
+        </a:xfrm>
+      </p:grpSpPr>
+      <p:sp>
+        <p:nvSpPr>
+          <p:cNvPr id="5" name="Rectángulo 4">
+            <a:extLst>
+              <a:ext uri="{FF2B5EF4-FFF2-40B4-BE49-F238E27FC236}">
+                <a16:creationId xmlns:a16="http://schemas.microsoft.com/office/drawing/2014/main" id="{231A7B72-C301-0A49-C7DF-F163299195C8}"/>
+              </a:ext>
+            </a:extLst>
+          </p:cNvPr>
+          <p:cNvSpPr/>
+          <p:nvPr/>
+        </p:nvSpPr>
+        <p:spPr>
+          <a:xfrm>
+            <a:off x="678426" y="294968"/>
+            <a:ext cx="4168877" cy="127819"/>
+          </a:xfrm>
+          <a:prstGeom prst="rect">
+            <a:avLst/>
+          </a:prstGeom>
+          <a:solidFill>
+            <a:schemeClr val="tx1"/>
+          </a:solidFill>
+        </p:spPr>
+        <p:style>
+          <a:lnRef idx="2">
+            <a:schemeClr val="accent1">
+              <a:shade val="15000"/>
+            </a:schemeClr>
+          </a:lnRef>
+          <a:fillRef idx="1">
+            <a:schemeClr val="accent1"/>
+          </a:fillRef>
+          <a:effectRef idx="0">
+            <a:schemeClr val="accent1"/>
+          </a:effectRef>
+          <a:fontRef idx="minor">
+            <a:schemeClr val="lt1"/>
+          </a:fontRef>
+        </p:style>
+        <p:txBody>
+          <a:bodyPr rtlCol="0" anchor="ctr"/>
+          <a:lstStyle/>
+          <a:p>
+            <a:pPr algn="ctr"/>
+            <a:endParaRPr lang="es-CL"/>
+          </a:p>
+        </p:txBody>
+      </p:sp>
+      <p:sp>
+        <p:nvSpPr>
+          <p:cNvPr id="6" name="Rectángulo 5">
+            <a:extLst>
+              <a:ext uri="{FF2B5EF4-FFF2-40B4-BE49-F238E27FC236}">
+                <a16:creationId xmlns:a16="http://schemas.microsoft.com/office/drawing/2014/main" id="{D1AD4696-BDC1-7F73-3160-2ED864695E4D}"/>
+              </a:ext>
+            </a:extLst>
+          </p:cNvPr>
+          <p:cNvSpPr/>
+          <p:nvPr/>
+        </p:nvSpPr>
+        <p:spPr>
+          <a:xfrm>
+            <a:off x="678426" y="6435213"/>
+            <a:ext cx="4168877" cy="127819"/>
+          </a:xfrm>
+          <a:prstGeom prst="rect">
+            <a:avLst/>
+          </a:prstGeom>
+          <a:solidFill>
+            <a:schemeClr val="tx1"/>
+          </a:solidFill>
+        </p:spPr>
+        <p:style>
+          <a:lnRef idx="2">
+            <a:schemeClr val="accent1">
+              <a:shade val="15000"/>
+            </a:schemeClr>
+          </a:lnRef>
+          <a:fillRef idx="1">
+            <a:schemeClr val="accent1"/>
+          </a:fillRef>
+          <a:effectRef idx="0">
+            <a:schemeClr val="accent1"/>
+          </a:effectRef>
+          <a:fontRef idx="minor">
+            <a:schemeClr val="lt1"/>
+          </a:fontRef>
+        </p:style>
+        <p:txBody>
+          <a:bodyPr rtlCol="0" anchor="ctr"/>
+          <a:lstStyle/>
+          <a:p>
+            <a:pPr algn="ctr"/>
+            <a:endParaRPr lang="es-CL"/>
+          </a:p>
+        </p:txBody>
+      </p:sp>
+      <p:sp>
+        <p:nvSpPr>
+          <p:cNvPr id="7" name="Rectángulo 6">
+            <a:extLst>
+              <a:ext uri="{FF2B5EF4-FFF2-40B4-BE49-F238E27FC236}">
+                <a16:creationId xmlns:a16="http://schemas.microsoft.com/office/drawing/2014/main" id="{1AFB2D03-A932-B651-3CD7-672273B1ADE1}"/>
+              </a:ext>
+            </a:extLst>
+          </p:cNvPr>
+          <p:cNvSpPr/>
+          <p:nvPr/>
+        </p:nvSpPr>
+        <p:spPr>
+          <a:xfrm>
+            <a:off x="4847303" y="294967"/>
+            <a:ext cx="6666271" cy="127819"/>
+          </a:xfrm>
+          <a:prstGeom prst="rect">
+            <a:avLst/>
+          </a:prstGeom>
+          <a:solidFill>
+            <a:srgbClr val="F8B416"/>
+          </a:solidFill>
+        </p:spPr>
+        <p:style>
+          <a:lnRef idx="2">
+            <a:schemeClr val="accent1">
+              <a:shade val="15000"/>
+            </a:schemeClr>
+          </a:lnRef>
+          <a:fillRef idx="1">
+            <a:schemeClr val="accent1"/>
+          </a:fillRef>
+          <a:effectRef idx="0">
+            <a:schemeClr val="accent1"/>
+          </a:effectRef>
+          <a:fontRef idx="minor">
+            <a:schemeClr val="lt1"/>
+          </a:fontRef>
+        </p:style>
+        <p:txBody>
+          <a:bodyPr rtlCol="0" anchor="ctr"/>
+          <a:lstStyle/>
+          <a:p>
+            <a:pPr algn="ctr"/>
+            <a:endParaRPr lang="es-CL" dirty="0">
+              <a:solidFill>
+                <a:srgbClr val="F8B416"/>
+              </a:solidFill>
+              <a:highlight>
+                <a:srgbClr val="FFFF00"/>
+              </a:highlight>
+            </a:endParaRPr>
+          </a:p>
+        </p:txBody>
+      </p:sp>
+      <p:sp>
+        <p:nvSpPr>
+          <p:cNvPr id="8" name="Rectángulo 7">
+            <a:extLst>
+              <a:ext uri="{FF2B5EF4-FFF2-40B4-BE49-F238E27FC236}">
+                <a16:creationId xmlns:a16="http://schemas.microsoft.com/office/drawing/2014/main" id="{44AED8D6-5D7D-86BF-B39A-3F68DC5BFC3C}"/>
+              </a:ext>
+            </a:extLst>
+          </p:cNvPr>
+          <p:cNvSpPr/>
+          <p:nvPr/>
+        </p:nvSpPr>
+        <p:spPr>
+          <a:xfrm>
+            <a:off x="4847303" y="6435213"/>
+            <a:ext cx="6666271" cy="127819"/>
+          </a:xfrm>
+          <a:prstGeom prst="rect">
+            <a:avLst/>
+          </a:prstGeom>
+          <a:solidFill>
+            <a:srgbClr val="F8B416"/>
+          </a:solidFill>
+        </p:spPr>
+        <p:style>
+          <a:lnRef idx="2">
+            <a:schemeClr val="accent1">
+              <a:shade val="15000"/>
+            </a:schemeClr>
+          </a:lnRef>
+          <a:fillRef idx="1">
+            <a:schemeClr val="accent1"/>
+          </a:fillRef>
+          <a:effectRef idx="0">
+            <a:schemeClr val="accent1"/>
+          </a:effectRef>
+          <a:fontRef idx="minor">
+            <a:schemeClr val="lt1"/>
+          </a:fontRef>
+        </p:style>
+        <p:txBody>
+          <a:bodyPr rtlCol="0" anchor="ctr"/>
+          <a:lstStyle/>
+          <a:p>
+            <a:pPr algn="ctr"/>
+            <a:endParaRPr lang="es-CL"/>
+          </a:p>
+        </p:txBody>
+      </p:sp>
+      <p:sp>
+        <p:nvSpPr>
+          <p:cNvPr id="10" name="CuadroTexto 9">
+            <a:extLst>
+              <a:ext uri="{FF2B5EF4-FFF2-40B4-BE49-F238E27FC236}">
+                <a16:creationId xmlns:a16="http://schemas.microsoft.com/office/drawing/2014/main" id="{4474C0A1-FC8C-4726-7E1A-C183EA232130}"/>
+              </a:ext>
+            </a:extLst>
+          </p:cNvPr>
+          <p:cNvSpPr txBox="1"/>
+          <p:nvPr/>
+        </p:nvSpPr>
+        <p:spPr>
+          <a:xfrm>
+            <a:off x="678426" y="523257"/>
+            <a:ext cx="5996694" cy="923330"/>
+          </a:xfrm>
+          <a:prstGeom prst="rect">
+            <a:avLst/>
+          </a:prstGeom>
+          <a:noFill/>
+        </p:spPr>
+        <p:txBody>
+          <a:bodyPr wrap="square" rtlCol="0">
+            <a:spAutoFit/>
+          </a:bodyPr>
+          <a:lstStyle/>
+          <a:p>
+            <a:r>
+              <a:rPr lang="es-CL" b="1" dirty="0">
+                <a:solidFill>
+                  <a:srgbClr val="F8B416"/>
+                </a:solidFill>
+                <a:latin typeface="Arial" panose="020B0604020202020204" pitchFamily="34" charset="0"/>
+                <a:cs typeface="Arial" panose="020B0604020202020204" pitchFamily="34" charset="0"/>
+              </a:rPr>
+              <a:t>RADIOGRAFÍA DEL BIENESTAR DUOC UC 2025</a:t>
+            </a:r>
+          </a:p>
+          <a:p>
+            <a:r>
+              <a:rPr lang="es-CL" b="1" dirty="0">
+                <a:solidFill>
+                  <a:schemeClr val="tx1">
+                    <a:lumMod val="50000"/>
+                    <a:lumOff val="50000"/>
+                  </a:schemeClr>
+                </a:solidFill>
+                <a:latin typeface="Arial" panose="020B0604020202020204" pitchFamily="34" charset="0"/>
+                <a:cs typeface="Arial" panose="020B0604020202020204" pitchFamily="34" charset="0"/>
+              </a:rPr>
+              <a:t>Tasa de respuestas por </a:t>
+            </a:r>
+            <a:r>
+              <a:rPr lang="es-CL" b="1" dirty="0">
+                <a:latin typeface="Arial" panose="020B0604020202020204" pitchFamily="34" charset="0"/>
+                <a:cs typeface="Arial" panose="020B0604020202020204" pitchFamily="34" charset="0"/>
+              </a:rPr>
+              <a:t>ESCUELA EN CADA SEDE</a:t>
+            </a:r>
+          </a:p>
+          <a:p>
+            <a:endParaRPr lang="es-CL" b="1" dirty="0">
+              <a:solidFill>
+                <a:srgbClr val="F8B416"/>
+              </a:solidFill>
+              <a:latin typeface="Arial" panose="020B0604020202020204" pitchFamily="34" charset="0"/>
+              <a:cs typeface="Arial" panose="020B0604020202020204" pitchFamily="34" charset="0"/>
+            </a:endParaRPr>
+          </a:p>
+        </p:txBody>
+      </p:sp>
+      <p:pic>
+        <p:nvPicPr>
+          <p:cNvPr id="15" name="Imagen 14" descr="Imagen que contiene Texto&#10;&#10;El contenido generado por IA puede ser incorrecto.">
+            <a:extLst>
+              <a:ext uri="{FF2B5EF4-FFF2-40B4-BE49-F238E27FC236}">
+                <a16:creationId xmlns:a16="http://schemas.microsoft.com/office/drawing/2014/main" id="{632E297B-062D-FC36-BB5E-E4A11B7253A2}"/>
+              </a:ext>
+            </a:extLst>
+          </p:cNvPr>
+          <p:cNvPicPr>
+            <a:picLocks noChangeAspect="1"/>
+          </p:cNvPicPr>
+          <p:nvPr/>
+        </p:nvPicPr>
+        <p:blipFill>
+          <a:blip r:embed="rId2">
+            <a:extLst>
+              <a:ext uri="{28A0092B-C50C-407E-A947-70E740481C1C}">
+                <a14:useLocalDpi xmlns:a14="http://schemas.microsoft.com/office/drawing/2010/main" val="0"/>
+              </a:ext>
+            </a:extLst>
+          </a:blip>
+          <a:stretch>
+            <a:fillRect/>
+          </a:stretch>
+        </p:blipFill>
+        <p:spPr>
+          <a:xfrm>
+            <a:off x="8062451" y="693767"/>
+            <a:ext cx="1502645" cy="353122"/>
+          </a:xfrm>
+          <a:prstGeom prst="rect">
+            <a:avLst/>
+          </a:prstGeom>
+        </p:spPr>
+      </p:pic>
+      <p:pic>
+        <p:nvPicPr>
+          <p:cNvPr id="17" name="Imagen 16" descr="Logotipo&#10;&#10;El contenido generado por IA puede ser incorrecto.">
+            <a:extLst>
+              <a:ext uri="{FF2B5EF4-FFF2-40B4-BE49-F238E27FC236}">
+                <a16:creationId xmlns:a16="http://schemas.microsoft.com/office/drawing/2014/main" id="{DB99B868-9C3C-871C-8433-53E6DC3B3078}"/>
+              </a:ext>
+            </a:extLst>
+          </p:cNvPr>
+          <p:cNvPicPr>
+            <a:picLocks noChangeAspect="1"/>
+          </p:cNvPicPr>
+          <p:nvPr/>
+        </p:nvPicPr>
+        <p:blipFill>
+          <a:blip r:embed="rId3">
+            <a:extLst>
+              <a:ext uri="{28A0092B-C50C-407E-A947-70E740481C1C}">
+                <a14:useLocalDpi xmlns:a14="http://schemas.microsoft.com/office/drawing/2010/main" val="0"/>
+              </a:ext>
+            </a:extLst>
+          </a:blip>
+          <a:stretch>
+            <a:fillRect/>
+          </a:stretch>
+        </p:blipFill>
+        <p:spPr>
+          <a:xfrm>
+            <a:off x="9794655" y="693768"/>
+            <a:ext cx="1432628" cy="353122"/>
+          </a:xfrm>
+          <a:prstGeom prst="rect">
+            <a:avLst/>
+          </a:prstGeom>
+        </p:spPr>
+      </p:pic>
+      <p:sp>
+        <p:nvSpPr>
+          <p:cNvPr id="22" name="CuadroTexto 21">
+            <a:extLst>
+              <a:ext uri="{FF2B5EF4-FFF2-40B4-BE49-F238E27FC236}">
+                <a16:creationId xmlns:a16="http://schemas.microsoft.com/office/drawing/2014/main" id="{1872D45F-9775-BE8D-9A59-CB65F1B9FAFA}"/>
+              </a:ext>
+            </a:extLst>
+          </p:cNvPr>
+          <p:cNvSpPr txBox="1">
+            <a:spLocks/>
+          </p:cNvSpPr>
+          <p:nvPr/>
+        </p:nvSpPr>
+        <p:spPr>
+          <a:xfrm>
+            <a:off x="1632117" y="1702750"/>
+            <a:ext cx="8171682" cy="4108359"/>
+          </a:xfrm>
+          <a:prstGeom prst="rect">
+            <a:avLst/>
+          </a:prstGeom>
+          <a:noFill/>
+        </p:spPr>
+        <p:txBody>
+          <a:bodyPr wrap="square" rtlCol="0">
+            <a:noAutofit/>
+          </a:bodyPr>
+          <a:lstStyle/>
+          <a:p>
+            <a:r>
+              <a:rPr lang="es-ES" dirty="0"/>
+              <a:t>tabla_resumen_escuela_en_cada_sede_6</a:t>
+            </a:r>
+          </a:p>
+        </p:txBody>
+      </p:sp>
+    </p:spTree>
+    <p:extLst>
+      <p:ext uri="{BB962C8B-B14F-4D97-AF65-F5344CB8AC3E}">
+        <p14:creationId xmlns:p14="http://schemas.microsoft.com/office/powerpoint/2010/main" val="1204171888"/>
       </p:ext>
     </p:extLst>
   </p:cSld>

</xml_diff>

<commit_message>
hotfix: graphs and inconsistency fixed
</commit_message>
<xml_diff>
--- a/templates/radiografia_bienestar_duoc_2025.pptx
+++ b/templates/radiografia_bienestar_duoc_2025.pptx
@@ -274,7 +274,7 @@
           <a:p>
             <a:fld id="{2CF58384-DFEB-4258-9675-9D7D6D5DB838}" type="datetimeFigureOut">
               <a:rPr lang="es-CL" smtClean="0"/>
-              <a:t>29-09-2025</a:t>
+              <a:t>02-10-2025</a:t>
             </a:fld>
             <a:endParaRPr lang="es-CL"/>
           </a:p>
@@ -474,7 +474,7 @@
           <a:p>
             <a:fld id="{2CF58384-DFEB-4258-9675-9D7D6D5DB838}" type="datetimeFigureOut">
               <a:rPr lang="es-CL" smtClean="0"/>
-              <a:t>29-09-2025</a:t>
+              <a:t>02-10-2025</a:t>
             </a:fld>
             <a:endParaRPr lang="es-CL"/>
           </a:p>
@@ -684,7 +684,7 @@
           <a:p>
             <a:fld id="{2CF58384-DFEB-4258-9675-9D7D6D5DB838}" type="datetimeFigureOut">
               <a:rPr lang="es-CL" smtClean="0"/>
-              <a:t>29-09-2025</a:t>
+              <a:t>02-10-2025</a:t>
             </a:fld>
             <a:endParaRPr lang="es-CL"/>
           </a:p>
@@ -884,7 +884,7 @@
           <a:p>
             <a:fld id="{2CF58384-DFEB-4258-9675-9D7D6D5DB838}" type="datetimeFigureOut">
               <a:rPr lang="es-CL" smtClean="0"/>
-              <a:t>29-09-2025</a:t>
+              <a:t>02-10-2025</a:t>
             </a:fld>
             <a:endParaRPr lang="es-CL"/>
           </a:p>
@@ -1160,7 +1160,7 @@
           <a:p>
             <a:fld id="{2CF58384-DFEB-4258-9675-9D7D6D5DB838}" type="datetimeFigureOut">
               <a:rPr lang="es-CL" smtClean="0"/>
-              <a:t>29-09-2025</a:t>
+              <a:t>02-10-2025</a:t>
             </a:fld>
             <a:endParaRPr lang="es-CL"/>
           </a:p>
@@ -1428,7 +1428,7 @@
           <a:p>
             <a:fld id="{2CF58384-DFEB-4258-9675-9D7D6D5DB838}" type="datetimeFigureOut">
               <a:rPr lang="es-CL" smtClean="0"/>
-              <a:t>29-09-2025</a:t>
+              <a:t>02-10-2025</a:t>
             </a:fld>
             <a:endParaRPr lang="es-CL"/>
           </a:p>
@@ -1843,7 +1843,7 @@
           <a:p>
             <a:fld id="{2CF58384-DFEB-4258-9675-9D7D6D5DB838}" type="datetimeFigureOut">
               <a:rPr lang="es-CL" smtClean="0"/>
-              <a:t>29-09-2025</a:t>
+              <a:t>02-10-2025</a:t>
             </a:fld>
             <a:endParaRPr lang="es-CL"/>
           </a:p>
@@ -1985,7 +1985,7 @@
           <a:p>
             <a:fld id="{2CF58384-DFEB-4258-9675-9D7D6D5DB838}" type="datetimeFigureOut">
               <a:rPr lang="es-CL" smtClean="0"/>
-              <a:t>29-09-2025</a:t>
+              <a:t>02-10-2025</a:t>
             </a:fld>
             <a:endParaRPr lang="es-CL"/>
           </a:p>
@@ -2098,7 +2098,7 @@
           <a:p>
             <a:fld id="{2CF58384-DFEB-4258-9675-9D7D6D5DB838}" type="datetimeFigureOut">
               <a:rPr lang="es-CL" smtClean="0"/>
-              <a:t>29-09-2025</a:t>
+              <a:t>02-10-2025</a:t>
             </a:fld>
             <a:endParaRPr lang="es-CL"/>
           </a:p>
@@ -2411,7 +2411,7 @@
           <a:p>
             <a:fld id="{2CF58384-DFEB-4258-9675-9D7D6D5DB838}" type="datetimeFigureOut">
               <a:rPr lang="es-CL" smtClean="0"/>
-              <a:t>29-09-2025</a:t>
+              <a:t>02-10-2025</a:t>
             </a:fld>
             <a:endParaRPr lang="es-CL"/>
           </a:p>
@@ -2700,7 +2700,7 @@
           <a:p>
             <a:fld id="{2CF58384-DFEB-4258-9675-9D7D6D5DB838}" type="datetimeFigureOut">
               <a:rPr lang="es-CL" smtClean="0"/>
-              <a:t>29-09-2025</a:t>
+              <a:t>02-10-2025</a:t>
             </a:fld>
             <a:endParaRPr lang="es-CL"/>
           </a:p>
@@ -2943,7 +2943,7 @@
           <a:p>
             <a:fld id="{2CF58384-DFEB-4258-9675-9D7D6D5DB838}" type="datetimeFigureOut">
               <a:rPr lang="es-CL" smtClean="0"/>
-              <a:t>29-09-2025</a:t>
+              <a:t>02-10-2025</a:t>
             </a:fld>
             <a:endParaRPr lang="es-CL"/>
           </a:p>
@@ -3748,7 +3748,7 @@
         <p:spPr>
           <a:xfrm>
             <a:off x="1824180" y="1702750"/>
-            <a:ext cx="4107600" cy="4108359"/>
+            <a:ext cx="4753600" cy="4108359"/>
           </a:xfrm>
           <a:prstGeom prst="rect">
             <a:avLst/>

</xml_diff>